<commit_message>
New version of architecture diagram.
</commit_message>
<xml_diff>
--- a/figs/figs.pptx
+++ b/figs/figs.pptx
@@ -5,10 +5,12 @@
     <p:sldMasterId id="2147483648" r:id="rId1"/>
   </p:sldMasterIdLst>
   <p:notesMasterIdLst>
-    <p:notesMasterId r:id="rId3"/>
+    <p:notesMasterId r:id="rId5"/>
   </p:notesMasterIdLst>
   <p:sldIdLst>
     <p:sldId id="259" r:id="rId2"/>
+    <p:sldId id="260" r:id="rId3"/>
+    <p:sldId id="261" r:id="rId4"/>
   </p:sldIdLst>
   <p:sldSz cx="9144000" cy="6858000" type="screen4x3"/>
   <p:notesSz cx="6858000" cy="9144000"/>
@@ -563,6 +565,127 @@
             <a:fld id="{9317A4E5-CFAE-0E4E-84E6-7C203BDA35E7}" type="slidenum">
               <a:rPr lang="en-US" smtClean="0"/>
               <a:t>1</a:t>
+            </a:fld>
+            <a:endParaRPr lang="en-US"/>
+          </a:p>
+        </p:txBody>
+      </p:sp>
+    </p:spTree>
+    <p:extLst>
+      <p:ext uri="{BB962C8B-B14F-4D97-AF65-F5344CB8AC3E}">
+        <p14:creationId xmlns:p14="http://schemas.microsoft.com/office/powerpoint/2010/main" val="3029365184"/>
+      </p:ext>
+    </p:extLst>
+  </p:cSld>
+  <p:clrMapOvr>
+    <a:masterClrMapping/>
+  </p:clrMapOvr>
+</p:notes>
+</file>
+
+<file path=ppt/notesSlides/notesSlide2.xml><?xml version="1.0" encoding="utf-8"?>
+<p:notes xmlns:a="http://schemas.openxmlformats.org/drawingml/2006/main" xmlns:r="http://schemas.openxmlformats.org/officeDocument/2006/relationships" xmlns:p="http://schemas.openxmlformats.org/presentationml/2006/main">
+  <p:cSld>
+    <p:spTree>
+      <p:nvGrpSpPr>
+        <p:cNvPr id="1" name=""/>
+        <p:cNvGrpSpPr/>
+        <p:nvPr/>
+      </p:nvGrpSpPr>
+      <p:grpSpPr>
+        <a:xfrm>
+          <a:off x="0" y="0"/>
+          <a:ext cx="0" cy="0"/>
+          <a:chOff x="0" y="0"/>
+          <a:chExt cx="0" cy="0"/>
+        </a:xfrm>
+      </p:grpSpPr>
+      <p:sp>
+        <p:nvSpPr>
+          <p:cNvPr id="2" name="Slide Image Placeholder 1"/>
+          <p:cNvSpPr>
+            <a:spLocks noGrp="1" noRot="1" noChangeAspect="1"/>
+          </p:cNvSpPr>
+          <p:nvPr>
+            <p:ph type="sldImg"/>
+          </p:nvPr>
+        </p:nvSpPr>
+        <p:spPr/>
+      </p:sp>
+      <p:sp>
+        <p:nvSpPr>
+          <p:cNvPr id="3" name="Notes Placeholder 2"/>
+          <p:cNvSpPr>
+            <a:spLocks noGrp="1"/>
+          </p:cNvSpPr>
+          <p:nvPr>
+            <p:ph type="body" idx="1"/>
+          </p:nvPr>
+        </p:nvSpPr>
+        <p:spPr/>
+        <p:txBody>
+          <a:bodyPr/>
+          <a:lstStyle/>
+          <a:p>
+            <a:r>
+              <a:rPr lang="en-US" dirty="0" smtClean="0"/>
+              <a:t>How</a:t>
+            </a:r>
+            <a:r>
+              <a:rPr lang="en-US" baseline="0" dirty="0" smtClean="0"/>
+              <a:t> to make feedback more explicit?</a:t>
+            </a:r>
+          </a:p>
+          <a:p>
+            <a:pPr marL="0" marR="0" indent="0" algn="l" defTabSz="457200" rtl="0" eaLnBrk="1" fontAlgn="auto" latinLnBrk="0" hangingPunct="1">
+              <a:lnSpc>
+                <a:spcPct val="100000"/>
+              </a:lnSpc>
+              <a:spcBef>
+                <a:spcPts val="0"/>
+              </a:spcBef>
+              <a:spcAft>
+                <a:spcPts val="0"/>
+              </a:spcAft>
+              <a:buClrTx/>
+              <a:buSzTx/>
+              <a:buFontTx/>
+              <a:buNone/>
+              <a:tabLst/>
+              <a:defRPr/>
+            </a:pPr>
+            <a:r>
+              <a:rPr lang="en-US" baseline="0" smtClean="0"/>
+              <a:t>Where does data itself live in the diagram?</a:t>
+            </a:r>
+            <a:endParaRPr lang="en-US" baseline="0" dirty="0" smtClean="0"/>
+          </a:p>
+          <a:p>
+            <a:r>
+              <a:rPr lang="en-US" baseline="0" dirty="0" smtClean="0"/>
+              <a:t>How to connect SAQP /sampling to the actual data? </a:t>
+            </a:r>
+          </a:p>
+        </p:txBody>
+      </p:sp>
+      <p:sp>
+        <p:nvSpPr>
+          <p:cNvPr id="4" name="Slide Number Placeholder 3"/>
+          <p:cNvSpPr>
+            <a:spLocks noGrp="1"/>
+          </p:cNvSpPr>
+          <p:nvPr>
+            <p:ph type="sldNum" sz="quarter" idx="10"/>
+          </p:nvPr>
+        </p:nvSpPr>
+        <p:spPr/>
+        <p:txBody>
+          <a:bodyPr/>
+          <a:lstStyle/>
+          <a:p>
+            <a:fld id="{9317A4E5-CFAE-0E4E-84E6-7C203BDA35E7}" type="slidenum">
+              <a:rPr lang="en-US" smtClean="0"/>
+              <a:t>2</a:t>
             </a:fld>
             <a:endParaRPr lang="en-US"/>
           </a:p>
@@ -3811,13 +3934,6 @@
                 </a:rPr>
                 <a:t>User</a:t>
               </a:r>
-              <a:endParaRPr lang="en-US" sz="1600" dirty="0" smtClean="0">
-                <a:solidFill>
-                  <a:srgbClr val="000000"/>
-                </a:solidFill>
-                <a:latin typeface="Bariol Regular"/>
-                <a:cs typeface="Bariol Regular"/>
-              </a:endParaRPr>
             </a:p>
           </p:txBody>
         </p:sp>
@@ -4293,13 +4409,6 @@
                 </a:rPr>
                 <a:t>Cleaning Pipelines</a:t>
               </a:r>
-              <a:endParaRPr lang="en-US" sz="1600" dirty="0" smtClean="0">
-                <a:solidFill>
-                  <a:srgbClr val="000000"/>
-                </a:solidFill>
-                <a:latin typeface="Bariol Regular"/>
-                <a:cs typeface="Bariol Regular"/>
-              </a:endParaRPr>
             </a:p>
           </p:txBody>
         </p:sp>
@@ -4638,7 +4747,17 @@
                 <a:latin typeface="Bariol Regular"/>
                 <a:cs typeface="Bariol Regular"/>
               </a:rPr>
-              <a:t>Tuple Cleaning UI</a:t>
+              <a:t>Cleaning </a:t>
+            </a:r>
+            <a:r>
+              <a:rPr lang="en-US" sz="2000" dirty="0" smtClean="0">
+                <a:solidFill>
+                  <a:schemeClr val="tx1"/>
+                </a:solidFill>
+                <a:latin typeface="Bariol Regular"/>
+                <a:cs typeface="Bariol Regular"/>
+              </a:rPr>
+              <a:t>UI</a:t>
             </a:r>
             <a:endParaRPr lang="en-US" sz="2000" dirty="0">
               <a:solidFill>
@@ -4740,13 +4859,6 @@
               </a:rPr>
               <a:t>Lineage</a:t>
             </a:r>
-            <a:endParaRPr lang="en-US" sz="1600" dirty="0" smtClean="0">
-              <a:solidFill>
-                <a:srgbClr val="000000"/>
-              </a:solidFill>
-              <a:latin typeface="Bariol Regular"/>
-              <a:cs typeface="Bariol Regular"/>
-            </a:endParaRPr>
           </a:p>
         </p:txBody>
       </p:sp>
@@ -5047,13 +5159,6 @@
                 </a:rPr>
                 <a:t>Physical Primitives</a:t>
               </a:r>
-              <a:endParaRPr lang="en-US" sz="1600" dirty="0" smtClean="0">
-                <a:solidFill>
-                  <a:srgbClr val="000000"/>
-                </a:solidFill>
-                <a:latin typeface="Bariol Regular"/>
-                <a:cs typeface="Bariol Regular"/>
-              </a:endParaRPr>
             </a:p>
           </p:txBody>
         </p:sp>
@@ -5362,13 +5467,6 @@
               </a:rPr>
               <a:t>Dynamic Optimization</a:t>
             </a:r>
-            <a:endParaRPr lang="en-US" sz="1600" dirty="0" smtClean="0">
-              <a:solidFill>
-                <a:srgbClr val="000000"/>
-              </a:solidFill>
-              <a:latin typeface="Bariol Regular"/>
-              <a:cs typeface="Bariol Regular"/>
-            </a:endParaRPr>
           </a:p>
         </p:txBody>
       </p:sp>
@@ -5508,6 +5606,2604 @@
       </p:par>
     </p:tnLst>
   </p:timing>
+</p:sld>
+</file>
+
+<file path=ppt/slides/slide2.xml><?xml version="1.0" encoding="utf-8"?>
+<p:sld xmlns:a="http://schemas.openxmlformats.org/drawingml/2006/main" xmlns:r="http://schemas.openxmlformats.org/officeDocument/2006/relationships" xmlns:p="http://schemas.openxmlformats.org/presentationml/2006/main">
+  <p:cSld>
+    <p:spTree>
+      <p:nvGrpSpPr>
+        <p:cNvPr id="1" name=""/>
+        <p:cNvGrpSpPr/>
+        <p:nvPr/>
+      </p:nvGrpSpPr>
+      <p:grpSpPr>
+        <a:xfrm>
+          <a:off x="0" y="0"/>
+          <a:ext cx="0" cy="0"/>
+          <a:chOff x="0" y="0"/>
+          <a:chExt cx="0" cy="0"/>
+        </a:xfrm>
+      </p:grpSpPr>
+      <p:sp>
+        <p:nvSpPr>
+          <p:cNvPr id="34" name="Rectangle 33"/>
+          <p:cNvSpPr/>
+          <p:nvPr/>
+        </p:nvSpPr>
+        <p:spPr>
+          <a:xfrm>
+            <a:off x="738990" y="1612600"/>
+            <a:ext cx="4225013" cy="649285"/>
+          </a:xfrm>
+          <a:prstGeom prst="rect">
+            <a:avLst/>
+          </a:prstGeom>
+          <a:noFill/>
+          <a:ln>
+            <a:solidFill>
+              <a:schemeClr val="tx1"/>
+            </a:solidFill>
+          </a:ln>
+          <a:effectLst/>
+        </p:spPr>
+        <p:style>
+          <a:lnRef idx="1">
+            <a:schemeClr val="accent1"/>
+          </a:lnRef>
+          <a:fillRef idx="3">
+            <a:schemeClr val="accent1"/>
+          </a:fillRef>
+          <a:effectRef idx="2">
+            <a:schemeClr val="accent1"/>
+          </a:effectRef>
+          <a:fontRef idx="minor">
+            <a:schemeClr val="lt1"/>
+          </a:fontRef>
+        </p:style>
+        <p:txBody>
+          <a:bodyPr rtlCol="0" anchor="ctr"/>
+          <a:lstStyle/>
+          <a:p>
+            <a:pPr algn="ctr"/>
+            <a:r>
+              <a:rPr lang="en-US" sz="2000" dirty="0" smtClean="0">
+                <a:solidFill>
+                  <a:schemeClr val="tx1"/>
+                </a:solidFill>
+                <a:latin typeface="Bariol Regular"/>
+                <a:cs typeface="Bariol Regular"/>
+              </a:rPr>
+              <a:t>Pipeline </a:t>
+            </a:r>
+            <a:r>
+              <a:rPr lang="en-US" sz="2000" dirty="0" smtClean="0">
+                <a:solidFill>
+                  <a:schemeClr val="tx1"/>
+                </a:solidFill>
+                <a:latin typeface="Bariol Regular"/>
+                <a:cs typeface="Bariol Regular"/>
+              </a:rPr>
+              <a:t>UI</a:t>
+            </a:r>
+            <a:endParaRPr lang="en-US" sz="2000" dirty="0">
+              <a:solidFill>
+                <a:schemeClr val="tx1"/>
+              </a:solidFill>
+              <a:latin typeface="Bariol Regular"/>
+              <a:cs typeface="Bariol Regular"/>
+            </a:endParaRPr>
+          </a:p>
+        </p:txBody>
+      </p:sp>
+      <p:sp>
+        <p:nvSpPr>
+          <p:cNvPr id="35" name="Rectangle 34"/>
+          <p:cNvSpPr/>
+          <p:nvPr/>
+        </p:nvSpPr>
+        <p:spPr>
+          <a:xfrm>
+            <a:off x="372868" y="2357819"/>
+            <a:ext cx="8316941" cy="4309108"/>
+          </a:xfrm>
+          <a:prstGeom prst="rect">
+            <a:avLst/>
+          </a:prstGeom>
+          <a:noFill/>
+          <a:ln>
+            <a:solidFill>
+              <a:schemeClr val="tx1"/>
+            </a:solidFill>
+          </a:ln>
+          <a:effectLst/>
+        </p:spPr>
+        <p:style>
+          <a:lnRef idx="1">
+            <a:schemeClr val="accent1"/>
+          </a:lnRef>
+          <a:fillRef idx="3">
+            <a:schemeClr val="accent1"/>
+          </a:fillRef>
+          <a:effectRef idx="2">
+            <a:schemeClr val="accent1"/>
+          </a:effectRef>
+          <a:fontRef idx="minor">
+            <a:schemeClr val="lt1"/>
+          </a:fontRef>
+        </p:style>
+        <p:txBody>
+          <a:bodyPr rtlCol="0" anchor="ctr"/>
+          <a:lstStyle/>
+          <a:p>
+            <a:pPr algn="ctr"/>
+            <a:endParaRPr lang="en-US" dirty="0">
+              <a:solidFill>
+                <a:schemeClr val="tx1"/>
+              </a:solidFill>
+              <a:latin typeface="Bariol Light"/>
+              <a:cs typeface="Bariol Light"/>
+            </a:endParaRPr>
+          </a:p>
+        </p:txBody>
+      </p:sp>
+      <p:grpSp>
+        <p:nvGrpSpPr>
+          <p:cNvPr id="2" name="Group 1"/>
+          <p:cNvGrpSpPr/>
+          <p:nvPr/>
+        </p:nvGrpSpPr>
+        <p:grpSpPr>
+          <a:xfrm>
+            <a:off x="2310612" y="225159"/>
+            <a:ext cx="1130771" cy="1442048"/>
+            <a:chOff x="1426834" y="493180"/>
+            <a:chExt cx="1130771" cy="1442048"/>
+          </a:xfrm>
+        </p:grpSpPr>
+        <p:pic>
+          <p:nvPicPr>
+            <p:cNvPr id="5" name="Picture 4"/>
+            <p:cNvPicPr>
+              <a:picLocks noChangeAspect="1"/>
+            </p:cNvPicPr>
+            <p:nvPr/>
+          </p:nvPicPr>
+          <p:blipFill>
+            <a:blip r:embed="rId3">
+              <a:biLevel thresh="75000"/>
+            </a:blip>
+            <a:stretch>
+              <a:fillRect/>
+            </a:stretch>
+          </p:blipFill>
+          <p:spPr>
+            <a:xfrm>
+              <a:off x="1574800" y="901524"/>
+              <a:ext cx="826963" cy="1033704"/>
+            </a:xfrm>
+            <a:prstGeom prst="rect">
+              <a:avLst/>
+            </a:prstGeom>
+          </p:spPr>
+        </p:pic>
+        <p:sp>
+          <p:nvSpPr>
+            <p:cNvPr id="31" name="Rectangle 30"/>
+            <p:cNvSpPr/>
+            <p:nvPr/>
+          </p:nvSpPr>
+          <p:spPr>
+            <a:xfrm>
+              <a:off x="1426834" y="493180"/>
+              <a:ext cx="1130771" cy="591115"/>
+            </a:xfrm>
+            <a:prstGeom prst="rect">
+              <a:avLst/>
+            </a:prstGeom>
+            <a:noFill/>
+            <a:ln>
+              <a:noFill/>
+            </a:ln>
+            <a:effectLst/>
+          </p:spPr>
+          <p:style>
+            <a:lnRef idx="1">
+              <a:schemeClr val="accent1"/>
+            </a:lnRef>
+            <a:fillRef idx="3">
+              <a:schemeClr val="accent1"/>
+            </a:fillRef>
+            <a:effectRef idx="2">
+              <a:schemeClr val="accent1"/>
+            </a:effectRef>
+            <a:fontRef idx="minor">
+              <a:schemeClr val="lt1"/>
+            </a:fontRef>
+          </p:style>
+          <p:txBody>
+            <a:bodyPr rtlCol="0" anchor="ctr"/>
+            <a:lstStyle/>
+            <a:p>
+              <a:pPr algn="ctr"/>
+              <a:r>
+                <a:rPr lang="en-US" sz="1600" dirty="0" smtClean="0">
+                  <a:solidFill>
+                    <a:srgbClr val="000000"/>
+                  </a:solidFill>
+                  <a:latin typeface="Bariol Regular"/>
+                  <a:cs typeface="Bariol Regular"/>
+                </a:rPr>
+                <a:t>User</a:t>
+              </a:r>
+            </a:p>
+          </p:txBody>
+        </p:sp>
+      </p:grpSp>
+      <p:grpSp>
+        <p:nvGrpSpPr>
+          <p:cNvPr id="4" name="Group 3"/>
+          <p:cNvGrpSpPr/>
+          <p:nvPr/>
+        </p:nvGrpSpPr>
+        <p:grpSpPr>
+          <a:xfrm>
+            <a:off x="6860061" y="352997"/>
+            <a:ext cx="1130771" cy="1282461"/>
+            <a:chOff x="5256073" y="605966"/>
+            <a:chExt cx="1130771" cy="1282461"/>
+          </a:xfrm>
+        </p:grpSpPr>
+        <p:pic>
+          <p:nvPicPr>
+            <p:cNvPr id="112" name="Picture 111"/>
+            <p:cNvPicPr>
+              <a:picLocks noChangeAspect="1"/>
+            </p:cNvPicPr>
+            <p:nvPr/>
+          </p:nvPicPr>
+          <p:blipFill rotWithShape="1">
+            <a:blip r:embed="rId4"/>
+            <a:srcRect b="17662"/>
+            <a:stretch/>
+          </p:blipFill>
+          <p:spPr>
+            <a:xfrm>
+              <a:off x="5334159" y="952215"/>
+              <a:ext cx="974600" cy="936212"/>
+            </a:xfrm>
+            <a:prstGeom prst="rect">
+              <a:avLst/>
+            </a:prstGeom>
+          </p:spPr>
+        </p:pic>
+        <p:sp>
+          <p:nvSpPr>
+            <p:cNvPr id="32" name="Rectangle 31"/>
+            <p:cNvSpPr/>
+            <p:nvPr/>
+          </p:nvSpPr>
+          <p:spPr>
+            <a:xfrm>
+              <a:off x="5256073" y="605966"/>
+              <a:ext cx="1130771" cy="591115"/>
+            </a:xfrm>
+            <a:prstGeom prst="rect">
+              <a:avLst/>
+            </a:prstGeom>
+            <a:noFill/>
+            <a:ln>
+              <a:noFill/>
+            </a:ln>
+            <a:effectLst/>
+          </p:spPr>
+          <p:style>
+            <a:lnRef idx="1">
+              <a:schemeClr val="accent1"/>
+            </a:lnRef>
+            <a:fillRef idx="3">
+              <a:schemeClr val="accent1"/>
+            </a:fillRef>
+            <a:effectRef idx="2">
+              <a:schemeClr val="accent1"/>
+            </a:effectRef>
+            <a:fontRef idx="minor">
+              <a:schemeClr val="lt1"/>
+            </a:fontRef>
+          </p:style>
+          <p:txBody>
+            <a:bodyPr rtlCol="0" anchor="ctr"/>
+            <a:lstStyle/>
+            <a:p>
+              <a:pPr algn="ctr"/>
+              <a:r>
+                <a:rPr lang="en-US" sz="1600" dirty="0" smtClean="0">
+                  <a:solidFill>
+                    <a:srgbClr val="000000"/>
+                  </a:solidFill>
+                  <a:latin typeface="Bariol Regular"/>
+                  <a:cs typeface="Bariol Regular"/>
+                </a:rPr>
+                <a:t>Crowd</a:t>
+              </a:r>
+            </a:p>
+          </p:txBody>
+        </p:sp>
+      </p:grpSp>
+      <p:sp>
+        <p:nvSpPr>
+          <p:cNvPr id="43" name="Rectangle 42"/>
+          <p:cNvSpPr/>
+          <p:nvPr/>
+        </p:nvSpPr>
+        <p:spPr>
+          <a:xfrm>
+            <a:off x="1924674" y="3193853"/>
+            <a:ext cx="1156270" cy="746451"/>
+          </a:xfrm>
+          <a:prstGeom prst="rect">
+            <a:avLst/>
+          </a:prstGeom>
+          <a:noFill/>
+          <a:ln>
+            <a:solidFill>
+              <a:schemeClr val="tx1"/>
+            </a:solidFill>
+          </a:ln>
+          <a:effectLst/>
+        </p:spPr>
+        <p:style>
+          <a:lnRef idx="1">
+            <a:schemeClr val="accent1"/>
+          </a:lnRef>
+          <a:fillRef idx="3">
+            <a:schemeClr val="accent1"/>
+          </a:fillRef>
+          <a:effectRef idx="2">
+            <a:schemeClr val="accent1"/>
+          </a:effectRef>
+          <a:fontRef idx="minor">
+            <a:schemeClr val="lt1"/>
+          </a:fontRef>
+        </p:style>
+        <p:txBody>
+          <a:bodyPr rtlCol="0" anchor="ctr"/>
+          <a:lstStyle/>
+          <a:p>
+            <a:pPr algn="ctr"/>
+            <a:r>
+              <a:rPr lang="en-US" sz="2000" dirty="0" smtClean="0">
+                <a:solidFill>
+                  <a:schemeClr val="tx1"/>
+                </a:solidFill>
+                <a:latin typeface="Bariol Regular"/>
+                <a:cs typeface="Bariol Regular"/>
+              </a:rPr>
+              <a:t>Hot Swapper</a:t>
+            </a:r>
+            <a:endParaRPr lang="en-US" sz="2000" dirty="0">
+              <a:solidFill>
+                <a:schemeClr val="tx1"/>
+              </a:solidFill>
+              <a:latin typeface="Bariol Regular"/>
+              <a:cs typeface="Bariol Regular"/>
+            </a:endParaRPr>
+          </a:p>
+        </p:txBody>
+      </p:sp>
+      <p:sp>
+        <p:nvSpPr>
+          <p:cNvPr id="47" name="Rectangle 46"/>
+          <p:cNvSpPr/>
+          <p:nvPr/>
+        </p:nvSpPr>
+        <p:spPr>
+          <a:xfrm>
+            <a:off x="3080942" y="3193853"/>
+            <a:ext cx="1883061" cy="744655"/>
+          </a:xfrm>
+          <a:prstGeom prst="rect">
+            <a:avLst/>
+          </a:prstGeom>
+          <a:noFill/>
+          <a:ln>
+            <a:solidFill>
+              <a:schemeClr val="tx1"/>
+            </a:solidFill>
+          </a:ln>
+          <a:effectLst/>
+        </p:spPr>
+        <p:style>
+          <a:lnRef idx="1">
+            <a:schemeClr val="accent1"/>
+          </a:lnRef>
+          <a:fillRef idx="3">
+            <a:schemeClr val="accent1"/>
+          </a:fillRef>
+          <a:effectRef idx="2">
+            <a:schemeClr val="accent1"/>
+          </a:effectRef>
+          <a:fontRef idx="minor">
+            <a:schemeClr val="lt1"/>
+          </a:fontRef>
+        </p:style>
+        <p:txBody>
+          <a:bodyPr rtlCol="0" anchor="ctr"/>
+          <a:lstStyle/>
+          <a:p>
+            <a:pPr algn="ctr"/>
+            <a:r>
+              <a:rPr lang="en-US" sz="2000" dirty="0" smtClean="0">
+                <a:solidFill>
+                  <a:schemeClr val="tx1"/>
+                </a:solidFill>
+                <a:latin typeface="Bariol Regular"/>
+                <a:cs typeface="Bariol Regular"/>
+              </a:rPr>
+              <a:t>DSL Compiler</a:t>
+            </a:r>
+            <a:endParaRPr lang="en-US" sz="2000" dirty="0">
+              <a:solidFill>
+                <a:schemeClr val="tx1"/>
+              </a:solidFill>
+              <a:latin typeface="Bariol Regular"/>
+              <a:cs typeface="Bariol Regular"/>
+            </a:endParaRPr>
+          </a:p>
+        </p:txBody>
+      </p:sp>
+      <p:sp>
+        <p:nvSpPr>
+          <p:cNvPr id="53" name="Rectangle 52"/>
+          <p:cNvSpPr/>
+          <p:nvPr/>
+        </p:nvSpPr>
+        <p:spPr>
+          <a:xfrm>
+            <a:off x="6230335" y="3186481"/>
+            <a:ext cx="2390224" cy="744655"/>
+          </a:xfrm>
+          <a:prstGeom prst="rect">
+            <a:avLst/>
+          </a:prstGeom>
+          <a:noFill/>
+          <a:ln>
+            <a:solidFill>
+              <a:schemeClr val="tx1"/>
+            </a:solidFill>
+          </a:ln>
+          <a:effectLst/>
+        </p:spPr>
+        <p:style>
+          <a:lnRef idx="1">
+            <a:schemeClr val="accent1"/>
+          </a:lnRef>
+          <a:fillRef idx="3">
+            <a:schemeClr val="accent1"/>
+          </a:fillRef>
+          <a:effectRef idx="2">
+            <a:schemeClr val="accent1"/>
+          </a:effectRef>
+          <a:fontRef idx="minor">
+            <a:schemeClr val="lt1"/>
+          </a:fontRef>
+        </p:style>
+        <p:txBody>
+          <a:bodyPr rtlCol="0" anchor="ctr"/>
+          <a:lstStyle/>
+          <a:p>
+            <a:pPr algn="ctr"/>
+            <a:r>
+              <a:rPr lang="en-US" sz="2000" dirty="0" smtClean="0">
+                <a:solidFill>
+                  <a:schemeClr val="tx1"/>
+                </a:solidFill>
+                <a:latin typeface="Bariol Regular"/>
+                <a:cs typeface="Bariol Regular"/>
+              </a:rPr>
+              <a:t>Crowd Manager</a:t>
+            </a:r>
+            <a:endParaRPr lang="en-US" sz="2000" dirty="0">
+              <a:solidFill>
+                <a:schemeClr val="tx1"/>
+              </a:solidFill>
+              <a:latin typeface="Bariol Regular"/>
+              <a:cs typeface="Bariol Regular"/>
+            </a:endParaRPr>
+          </a:p>
+        </p:txBody>
+      </p:sp>
+      <p:sp>
+        <p:nvSpPr>
+          <p:cNvPr id="58" name="Rectangle 57"/>
+          <p:cNvSpPr/>
+          <p:nvPr/>
+        </p:nvSpPr>
+        <p:spPr>
+          <a:xfrm>
+            <a:off x="658123" y="3195649"/>
+            <a:ext cx="1266551" cy="744654"/>
+          </a:xfrm>
+          <a:prstGeom prst="rect">
+            <a:avLst/>
+          </a:prstGeom>
+          <a:noFill/>
+          <a:ln>
+            <a:solidFill>
+              <a:schemeClr val="tx1"/>
+            </a:solidFill>
+          </a:ln>
+          <a:effectLst/>
+        </p:spPr>
+        <p:style>
+          <a:lnRef idx="1">
+            <a:schemeClr val="accent1"/>
+          </a:lnRef>
+          <a:fillRef idx="3">
+            <a:schemeClr val="accent1"/>
+          </a:fillRef>
+          <a:effectRef idx="2">
+            <a:schemeClr val="accent1"/>
+          </a:effectRef>
+          <a:fontRef idx="minor">
+            <a:schemeClr val="lt1"/>
+          </a:fontRef>
+        </p:style>
+        <p:txBody>
+          <a:bodyPr rtlCol="0" anchor="ctr"/>
+          <a:lstStyle/>
+          <a:p>
+            <a:pPr algn="ctr"/>
+            <a:r>
+              <a:rPr lang="en-US" sz="2000" dirty="0" smtClean="0">
+                <a:solidFill>
+                  <a:schemeClr val="tx1"/>
+                </a:solidFill>
+                <a:latin typeface="Bariol Regular"/>
+                <a:cs typeface="Bariol Regular"/>
+              </a:rPr>
+              <a:t>Rec. </a:t>
+            </a:r>
+            <a:r>
+              <a:rPr lang="en-US" sz="2000" dirty="0" smtClean="0">
+                <a:solidFill>
+                  <a:schemeClr val="tx1"/>
+                </a:solidFill>
+                <a:latin typeface="Bariol Regular"/>
+                <a:cs typeface="Bariol Regular"/>
+              </a:rPr>
+              <a:t>Engine</a:t>
+            </a:r>
+            <a:endParaRPr lang="en-US" sz="2000" dirty="0">
+              <a:solidFill>
+                <a:schemeClr val="tx1"/>
+              </a:solidFill>
+              <a:latin typeface="Bariol Regular"/>
+              <a:cs typeface="Bariol Regular"/>
+            </a:endParaRPr>
+          </a:p>
+        </p:txBody>
+      </p:sp>
+      <p:sp>
+        <p:nvSpPr>
+          <p:cNvPr id="61" name="Rectangle 60"/>
+          <p:cNvSpPr/>
+          <p:nvPr/>
+        </p:nvSpPr>
+        <p:spPr>
+          <a:xfrm>
+            <a:off x="6230335" y="1605243"/>
+            <a:ext cx="2390224" cy="649285"/>
+          </a:xfrm>
+          <a:prstGeom prst="rect">
+            <a:avLst/>
+          </a:prstGeom>
+          <a:noFill/>
+          <a:ln>
+            <a:solidFill>
+              <a:schemeClr val="tx1"/>
+            </a:solidFill>
+          </a:ln>
+          <a:effectLst/>
+        </p:spPr>
+        <p:style>
+          <a:lnRef idx="1">
+            <a:schemeClr val="accent1"/>
+          </a:lnRef>
+          <a:fillRef idx="3">
+            <a:schemeClr val="accent1"/>
+          </a:fillRef>
+          <a:effectRef idx="2">
+            <a:schemeClr val="accent1"/>
+          </a:effectRef>
+          <a:fontRef idx="minor">
+            <a:schemeClr val="lt1"/>
+          </a:fontRef>
+        </p:style>
+        <p:txBody>
+          <a:bodyPr rtlCol="0" anchor="ctr"/>
+          <a:lstStyle/>
+          <a:p>
+            <a:pPr algn="ctr"/>
+            <a:r>
+              <a:rPr lang="en-US" sz="2000" dirty="0" smtClean="0">
+                <a:solidFill>
+                  <a:schemeClr val="tx1"/>
+                </a:solidFill>
+                <a:latin typeface="Bariol Regular"/>
+                <a:cs typeface="Bariol Regular"/>
+              </a:rPr>
+              <a:t>Cleaning </a:t>
+            </a:r>
+            <a:r>
+              <a:rPr lang="en-US" sz="2000" dirty="0" smtClean="0">
+                <a:solidFill>
+                  <a:schemeClr val="tx1"/>
+                </a:solidFill>
+                <a:latin typeface="Bariol Regular"/>
+                <a:cs typeface="Bariol Regular"/>
+              </a:rPr>
+              <a:t>UI</a:t>
+            </a:r>
+            <a:endParaRPr lang="en-US" sz="2000" dirty="0">
+              <a:solidFill>
+                <a:schemeClr val="tx1"/>
+              </a:solidFill>
+              <a:latin typeface="Bariol Regular"/>
+              <a:cs typeface="Bariol Regular"/>
+            </a:endParaRPr>
+          </a:p>
+        </p:txBody>
+      </p:sp>
+      <p:cxnSp>
+        <p:nvCxnSpPr>
+          <p:cNvPr id="72" name="Straight Arrow Connector 71"/>
+          <p:cNvCxnSpPr/>
+          <p:nvPr/>
+        </p:nvCxnSpPr>
+        <p:spPr>
+          <a:xfrm flipV="1">
+            <a:off x="7361949" y="2254528"/>
+            <a:ext cx="0" cy="931953"/>
+          </a:xfrm>
+          <a:prstGeom prst="straightConnector1">
+            <a:avLst/>
+          </a:prstGeom>
+          <a:ln w="38100" cmpd="sng">
+            <a:solidFill>
+              <a:srgbClr val="000000"/>
+            </a:solidFill>
+            <a:headEnd type="none"/>
+            <a:tailEnd type="arrow"/>
+          </a:ln>
+          <a:effectLst/>
+        </p:spPr>
+        <p:style>
+          <a:lnRef idx="2">
+            <a:schemeClr val="accent1"/>
+          </a:lnRef>
+          <a:fillRef idx="0">
+            <a:schemeClr val="accent1"/>
+          </a:fillRef>
+          <a:effectRef idx="1">
+            <a:schemeClr val="accent1"/>
+          </a:effectRef>
+          <a:fontRef idx="minor">
+            <a:schemeClr val="tx1"/>
+          </a:fontRef>
+        </p:style>
+      </p:cxnSp>
+      <p:sp>
+        <p:nvSpPr>
+          <p:cNvPr id="84" name="Rectangle 83"/>
+          <p:cNvSpPr/>
+          <p:nvPr/>
+        </p:nvSpPr>
+        <p:spPr>
+          <a:xfrm>
+            <a:off x="4060327" y="2450994"/>
+            <a:ext cx="903676" cy="744655"/>
+          </a:xfrm>
+          <a:prstGeom prst="rect">
+            <a:avLst/>
+          </a:prstGeom>
+          <a:noFill/>
+          <a:ln>
+            <a:solidFill>
+              <a:schemeClr val="tx1"/>
+            </a:solidFill>
+          </a:ln>
+          <a:effectLst/>
+        </p:spPr>
+        <p:style>
+          <a:lnRef idx="1">
+            <a:schemeClr val="accent1"/>
+          </a:lnRef>
+          <a:fillRef idx="3">
+            <a:schemeClr val="accent1"/>
+          </a:fillRef>
+          <a:effectRef idx="2">
+            <a:schemeClr val="accent1"/>
+          </a:effectRef>
+          <a:fontRef idx="minor">
+            <a:schemeClr val="lt1"/>
+          </a:fontRef>
+        </p:style>
+        <p:txBody>
+          <a:bodyPr rtlCol="0" anchor="ctr"/>
+          <a:lstStyle/>
+          <a:p>
+            <a:pPr algn="ctr"/>
+            <a:r>
+              <a:rPr lang="en-US" sz="2000" dirty="0" smtClean="0">
+                <a:solidFill>
+                  <a:schemeClr val="tx1"/>
+                </a:solidFill>
+                <a:latin typeface="Bariol Regular"/>
+                <a:cs typeface="Bariol Regular"/>
+              </a:rPr>
+              <a:t>SAQP</a:t>
+            </a:r>
+            <a:endParaRPr lang="en-US" sz="2000" dirty="0">
+              <a:solidFill>
+                <a:schemeClr val="tx1"/>
+              </a:solidFill>
+              <a:latin typeface="Bariol Regular"/>
+              <a:cs typeface="Bariol Regular"/>
+            </a:endParaRPr>
+          </a:p>
+        </p:txBody>
+      </p:sp>
+      <p:cxnSp>
+        <p:nvCxnSpPr>
+          <p:cNvPr id="104" name="Straight Arrow Connector 103"/>
+          <p:cNvCxnSpPr>
+            <a:stCxn id="47" idx="2"/>
+          </p:cNvCxnSpPr>
+          <p:nvPr/>
+        </p:nvCxnSpPr>
+        <p:spPr>
+          <a:xfrm>
+            <a:off x="4022473" y="3938508"/>
+            <a:ext cx="0" cy="429019"/>
+          </a:xfrm>
+          <a:prstGeom prst="straightConnector1">
+            <a:avLst/>
+          </a:prstGeom>
+          <a:ln w="38100" cmpd="sng">
+            <a:solidFill>
+              <a:srgbClr val="000000"/>
+            </a:solidFill>
+            <a:headEnd type="none"/>
+            <a:tailEnd type="arrow"/>
+          </a:ln>
+          <a:effectLst/>
+        </p:spPr>
+        <p:style>
+          <a:lnRef idx="2">
+            <a:schemeClr val="accent1"/>
+          </a:lnRef>
+          <a:fillRef idx="0">
+            <a:schemeClr val="accent1"/>
+          </a:fillRef>
+          <a:effectRef idx="1">
+            <a:schemeClr val="accent1"/>
+          </a:effectRef>
+          <a:fontRef idx="minor">
+            <a:schemeClr val="tx1"/>
+          </a:fontRef>
+        </p:style>
+      </p:cxnSp>
+      <p:grpSp>
+        <p:nvGrpSpPr>
+          <p:cNvPr id="28" name="Group 27"/>
+          <p:cNvGrpSpPr/>
+          <p:nvPr/>
+        </p:nvGrpSpPr>
+        <p:grpSpPr>
+          <a:xfrm>
+            <a:off x="631836" y="4367527"/>
+            <a:ext cx="7988723" cy="1406740"/>
+            <a:chOff x="3245451" y="2860487"/>
+            <a:chExt cx="7988723" cy="1406740"/>
+          </a:xfrm>
+        </p:grpSpPr>
+        <p:grpSp>
+          <p:nvGrpSpPr>
+            <p:cNvPr id="6" name="Group 5"/>
+            <p:cNvGrpSpPr/>
+            <p:nvPr/>
+          </p:nvGrpSpPr>
+          <p:grpSpPr>
+            <a:xfrm>
+              <a:off x="3245451" y="2860487"/>
+              <a:ext cx="7988723" cy="1406740"/>
+              <a:chOff x="1638401" y="2445119"/>
+              <a:chExt cx="7988723" cy="1406740"/>
+            </a:xfrm>
+          </p:grpSpPr>
+          <p:sp>
+            <p:nvSpPr>
+              <p:cNvPr id="109" name="Rectangle 108"/>
+              <p:cNvSpPr/>
+              <p:nvPr/>
+            </p:nvSpPr>
+            <p:spPr>
+              <a:xfrm>
+                <a:off x="1638401" y="2445119"/>
+                <a:ext cx="7988723" cy="1406740"/>
+              </a:xfrm>
+              <a:prstGeom prst="rect">
+                <a:avLst/>
+              </a:prstGeom>
+              <a:noFill/>
+              <a:ln>
+                <a:solidFill>
+                  <a:schemeClr val="tx1"/>
+                </a:solidFill>
+              </a:ln>
+              <a:effectLst/>
+            </p:spPr>
+            <p:style>
+              <a:lnRef idx="1">
+                <a:schemeClr val="accent1"/>
+              </a:lnRef>
+              <a:fillRef idx="3">
+                <a:schemeClr val="accent1"/>
+              </a:fillRef>
+              <a:effectRef idx="2">
+                <a:schemeClr val="accent1"/>
+              </a:effectRef>
+              <a:fontRef idx="minor">
+                <a:schemeClr val="lt1"/>
+              </a:fontRef>
+            </p:style>
+            <p:txBody>
+              <a:bodyPr rtlCol="0" anchor="ctr"/>
+              <a:lstStyle/>
+              <a:p>
+                <a:pPr algn="ctr"/>
+                <a:endParaRPr lang="en-US" dirty="0">
+                  <a:solidFill>
+                    <a:schemeClr val="tx1"/>
+                  </a:solidFill>
+                  <a:latin typeface="Bariol Light"/>
+                  <a:cs typeface="Bariol Light"/>
+                </a:endParaRPr>
+              </a:p>
+            </p:txBody>
+          </p:sp>
+          <p:sp>
+            <p:nvSpPr>
+              <p:cNvPr id="33" name="Rectangle 32"/>
+              <p:cNvSpPr/>
+              <p:nvPr/>
+            </p:nvSpPr>
+            <p:spPr>
+              <a:xfrm>
+                <a:off x="1823297" y="2505813"/>
+                <a:ext cx="1183517" cy="1032733"/>
+              </a:xfrm>
+              <a:prstGeom prst="rect">
+                <a:avLst/>
+              </a:prstGeom>
+              <a:noFill/>
+              <a:ln>
+                <a:solidFill>
+                  <a:schemeClr val="tx1"/>
+                </a:solidFill>
+              </a:ln>
+              <a:effectLst/>
+            </p:spPr>
+            <p:style>
+              <a:lnRef idx="1">
+                <a:schemeClr val="accent1"/>
+              </a:lnRef>
+              <a:fillRef idx="3">
+                <a:schemeClr val="accent1"/>
+              </a:fillRef>
+              <a:effectRef idx="2">
+                <a:schemeClr val="accent1"/>
+              </a:effectRef>
+              <a:fontRef idx="minor">
+                <a:schemeClr val="lt1"/>
+              </a:fontRef>
+            </p:style>
+            <p:txBody>
+              <a:bodyPr rtlCol="0" anchor="ctr"/>
+              <a:lstStyle/>
+              <a:p>
+                <a:pPr algn="ctr"/>
+                <a:endParaRPr lang="en-US" sz="2000" dirty="0">
+                  <a:solidFill>
+                    <a:schemeClr val="tx1"/>
+                  </a:solidFill>
+                  <a:latin typeface="Bariol Regular"/>
+                  <a:cs typeface="Bariol Regular"/>
+                </a:endParaRPr>
+              </a:p>
+            </p:txBody>
+          </p:sp>
+          <p:sp>
+            <p:nvSpPr>
+              <p:cNvPr id="45" name="Rectangle 44"/>
+              <p:cNvSpPr/>
+              <p:nvPr/>
+            </p:nvSpPr>
+            <p:spPr>
+              <a:xfrm>
+                <a:off x="1638402" y="3562622"/>
+                <a:ext cx="1750982" cy="227101"/>
+              </a:xfrm>
+              <a:prstGeom prst="rect">
+                <a:avLst/>
+              </a:prstGeom>
+              <a:noFill/>
+              <a:ln>
+                <a:noFill/>
+              </a:ln>
+              <a:effectLst/>
+            </p:spPr>
+            <p:style>
+              <a:lnRef idx="1">
+                <a:schemeClr val="accent1"/>
+              </a:lnRef>
+              <a:fillRef idx="3">
+                <a:schemeClr val="accent1"/>
+              </a:fillRef>
+              <a:effectRef idx="2">
+                <a:schemeClr val="accent1"/>
+              </a:effectRef>
+              <a:fontRef idx="minor">
+                <a:schemeClr val="lt1"/>
+              </a:fontRef>
+            </p:style>
+            <p:txBody>
+              <a:bodyPr rtlCol="0" anchor="ctr"/>
+              <a:lstStyle/>
+              <a:p>
+                <a:pPr algn="ctr"/>
+                <a:r>
+                  <a:rPr lang="en-US" sz="1600" dirty="0" smtClean="0">
+                    <a:solidFill>
+                      <a:srgbClr val="000000"/>
+                    </a:solidFill>
+                    <a:latin typeface="Bariol Regular"/>
+                    <a:cs typeface="Bariol Regular"/>
+                  </a:rPr>
+                  <a:t>Cleaning </a:t>
+                </a:r>
+                <a:r>
+                  <a:rPr lang="en-US" sz="1600" dirty="0" smtClean="0">
+                    <a:solidFill>
+                      <a:srgbClr val="000000"/>
+                    </a:solidFill>
+                    <a:latin typeface="Bariol Regular"/>
+                    <a:cs typeface="Bariol Regular"/>
+                  </a:rPr>
+                  <a:t>Pipelines</a:t>
+                </a:r>
+              </a:p>
+            </p:txBody>
+          </p:sp>
+        </p:grpSp>
+        <p:sp>
+          <p:nvSpPr>
+            <p:cNvPr id="12" name="Isosceles Triangle 11"/>
+            <p:cNvSpPr/>
+            <p:nvPr/>
+          </p:nvSpPr>
+          <p:spPr>
+            <a:xfrm>
+              <a:off x="6494657" y="2921181"/>
+              <a:ext cx="1304514" cy="1032733"/>
+            </a:xfrm>
+            <a:prstGeom prst="triangle">
+              <a:avLst/>
+            </a:prstGeom>
+            <a:noFill/>
+            <a:ln>
+              <a:solidFill>
+                <a:schemeClr val="tx1"/>
+              </a:solidFill>
+            </a:ln>
+            <a:effectLst/>
+          </p:spPr>
+          <p:style>
+            <a:lnRef idx="1">
+              <a:schemeClr val="accent1"/>
+            </a:lnRef>
+            <a:fillRef idx="3">
+              <a:schemeClr val="accent1"/>
+            </a:fillRef>
+            <a:effectRef idx="2">
+              <a:schemeClr val="accent1"/>
+            </a:effectRef>
+            <a:fontRef idx="minor">
+              <a:schemeClr val="lt1"/>
+            </a:fontRef>
+          </p:style>
+          <p:txBody>
+            <a:bodyPr rtlCol="0" anchor="ctr"/>
+            <a:lstStyle/>
+            <a:p>
+              <a:pPr algn="ctr"/>
+              <a:endParaRPr lang="en-US"/>
+            </a:p>
+          </p:txBody>
+        </p:sp>
+        <p:sp>
+          <p:nvSpPr>
+            <p:cNvPr id="13" name="Regular Pentagon 12"/>
+            <p:cNvSpPr/>
+            <p:nvPr/>
+          </p:nvSpPr>
+          <p:spPr>
+            <a:xfrm>
+              <a:off x="9473676" y="2921181"/>
+              <a:ext cx="1125514" cy="1032733"/>
+            </a:xfrm>
+            <a:prstGeom prst="pentagon">
+              <a:avLst/>
+            </a:prstGeom>
+            <a:solidFill>
+              <a:srgbClr val="FFFFFF"/>
+            </a:solidFill>
+            <a:ln>
+              <a:solidFill>
+                <a:srgbClr val="000000"/>
+              </a:solidFill>
+            </a:ln>
+            <a:effectLst/>
+          </p:spPr>
+          <p:style>
+            <a:lnRef idx="1">
+              <a:schemeClr val="accent1"/>
+            </a:lnRef>
+            <a:fillRef idx="3">
+              <a:schemeClr val="accent1"/>
+            </a:fillRef>
+            <a:effectRef idx="2">
+              <a:schemeClr val="accent1"/>
+            </a:effectRef>
+            <a:fontRef idx="minor">
+              <a:schemeClr val="lt1"/>
+            </a:fontRef>
+          </p:style>
+          <p:txBody>
+            <a:bodyPr rtlCol="0" anchor="ctr"/>
+            <a:lstStyle/>
+            <a:p>
+              <a:pPr algn="ctr"/>
+              <a:endParaRPr lang="en-US"/>
+            </a:p>
+          </p:txBody>
+        </p:sp>
+        <p:cxnSp>
+          <p:nvCxnSpPr>
+            <p:cNvPr id="50" name="Straight Arrow Connector 49"/>
+            <p:cNvCxnSpPr/>
+            <p:nvPr/>
+          </p:nvCxnSpPr>
+          <p:spPr>
+            <a:xfrm>
+              <a:off x="4825524" y="3437548"/>
+              <a:ext cx="1619251" cy="0"/>
+            </a:xfrm>
+            <a:prstGeom prst="straightConnector1">
+              <a:avLst/>
+            </a:prstGeom>
+            <a:ln w="38100" cmpd="sng">
+              <a:solidFill>
+                <a:srgbClr val="000000"/>
+              </a:solidFill>
+              <a:headEnd type="none"/>
+              <a:tailEnd type="arrow"/>
+            </a:ln>
+            <a:effectLst/>
+          </p:spPr>
+          <p:style>
+            <a:lnRef idx="2">
+              <a:schemeClr val="accent1"/>
+            </a:lnRef>
+            <a:fillRef idx="0">
+              <a:schemeClr val="accent1"/>
+            </a:fillRef>
+            <a:effectRef idx="1">
+              <a:schemeClr val="accent1"/>
+            </a:effectRef>
+            <a:fontRef idx="minor">
+              <a:schemeClr val="tx1"/>
+            </a:fontRef>
+          </p:style>
+        </p:cxnSp>
+        <p:cxnSp>
+          <p:nvCxnSpPr>
+            <p:cNvPr id="54" name="Straight Arrow Connector 53"/>
+            <p:cNvCxnSpPr/>
+            <p:nvPr/>
+          </p:nvCxnSpPr>
+          <p:spPr>
+            <a:xfrm>
+              <a:off x="7722326" y="3437548"/>
+              <a:ext cx="1432756" cy="0"/>
+            </a:xfrm>
+            <a:prstGeom prst="straightConnector1">
+              <a:avLst/>
+            </a:prstGeom>
+            <a:ln w="38100" cmpd="sng">
+              <a:solidFill>
+                <a:srgbClr val="000000"/>
+              </a:solidFill>
+              <a:headEnd type="none"/>
+              <a:tailEnd type="arrow"/>
+            </a:ln>
+            <a:effectLst/>
+          </p:spPr>
+          <p:style>
+            <a:lnRef idx="2">
+              <a:schemeClr val="accent1"/>
+            </a:lnRef>
+            <a:fillRef idx="0">
+              <a:schemeClr val="accent1"/>
+            </a:fillRef>
+            <a:effectRef idx="1">
+              <a:schemeClr val="accent1"/>
+            </a:effectRef>
+            <a:fontRef idx="minor">
+              <a:schemeClr val="tx1"/>
+            </a:fontRef>
+          </p:style>
+        </p:cxnSp>
+        <p:pic>
+          <p:nvPicPr>
+            <p:cNvPr id="77" name="Picture 76"/>
+            <p:cNvPicPr>
+              <a:picLocks noChangeAspect="1"/>
+            </p:cNvPicPr>
+            <p:nvPr/>
+          </p:nvPicPr>
+          <p:blipFill rotWithShape="1">
+            <a:blip r:embed="rId4"/>
+            <a:srcRect b="17662"/>
+            <a:stretch/>
+          </p:blipFill>
+          <p:spPr>
+            <a:xfrm>
+              <a:off x="9772227" y="3152698"/>
+              <a:ext cx="548764" cy="488803"/>
+            </a:xfrm>
+            <a:prstGeom prst="rect">
+              <a:avLst/>
+            </a:prstGeom>
+          </p:spPr>
+        </p:pic>
+        <p:pic>
+          <p:nvPicPr>
+            <p:cNvPr id="26" name="Picture 25" descr="noun_1248_cc.png"/>
+            <p:cNvPicPr>
+              <a:picLocks noChangeAspect="1"/>
+            </p:cNvPicPr>
+            <p:nvPr/>
+          </p:nvPicPr>
+          <p:blipFill rotWithShape="1">
+            <a:blip r:embed="rId5">
+              <a:extLst>
+                <a:ext uri="{28A0092B-C50C-407E-A947-70E740481C1C}">
+                  <a14:useLocalDpi xmlns:a14="http://schemas.microsoft.com/office/drawing/2010/main" val="0"/>
+                </a:ext>
+              </a:extLst>
+            </a:blip>
+            <a:srcRect t="6796" b="21682"/>
+            <a:stretch/>
+          </p:blipFill>
+          <p:spPr>
+            <a:xfrm>
+              <a:off x="6885385" y="3205046"/>
+              <a:ext cx="523057" cy="436455"/>
+            </a:xfrm>
+            <a:prstGeom prst="rect">
+              <a:avLst/>
+            </a:prstGeom>
+          </p:spPr>
+        </p:pic>
+        <p:pic>
+          <p:nvPicPr>
+            <p:cNvPr id="27" name="Picture 26" descr="noun_5393.png"/>
+            <p:cNvPicPr>
+              <a:picLocks noChangeAspect="1"/>
+            </p:cNvPicPr>
+            <p:nvPr/>
+          </p:nvPicPr>
+          <p:blipFill>
+            <a:blip r:embed="rId6">
+              <a:extLst>
+                <a:ext uri="{28A0092B-C50C-407E-A947-70E740481C1C}">
+                  <a14:useLocalDpi xmlns:a14="http://schemas.microsoft.com/office/drawing/2010/main" val="0"/>
+                </a:ext>
+              </a:extLst>
+            </a:blip>
+            <a:stretch>
+              <a:fillRect/>
+            </a:stretch>
+          </p:blipFill>
+          <p:spPr>
+            <a:xfrm>
+              <a:off x="3754032" y="3152698"/>
+              <a:ext cx="536147" cy="536147"/>
+            </a:xfrm>
+            <a:prstGeom prst="rect">
+              <a:avLst/>
+            </a:prstGeom>
+          </p:spPr>
+        </p:pic>
+      </p:grpSp>
+      <p:sp>
+        <p:nvSpPr>
+          <p:cNvPr id="96" name="Rectangle 95"/>
+          <p:cNvSpPr/>
+          <p:nvPr/>
+        </p:nvSpPr>
+        <p:spPr>
+          <a:xfrm>
+            <a:off x="2875998" y="2571747"/>
+            <a:ext cx="1005020" cy="450955"/>
+          </a:xfrm>
+          <a:prstGeom prst="rect">
+            <a:avLst/>
+          </a:prstGeom>
+          <a:noFill/>
+          <a:ln>
+            <a:noFill/>
+          </a:ln>
+          <a:effectLst/>
+        </p:spPr>
+        <p:style>
+          <a:lnRef idx="1">
+            <a:schemeClr val="accent1"/>
+          </a:lnRef>
+          <a:fillRef idx="3">
+            <a:schemeClr val="accent1"/>
+          </a:fillRef>
+          <a:effectRef idx="2">
+            <a:schemeClr val="accent1"/>
+          </a:effectRef>
+          <a:fontRef idx="minor">
+            <a:schemeClr val="lt1"/>
+          </a:fontRef>
+        </p:style>
+        <p:txBody>
+          <a:bodyPr rtlCol="0" anchor="ctr"/>
+          <a:lstStyle/>
+          <a:p>
+            <a:pPr algn="ctr"/>
+            <a:r>
+              <a:rPr lang="en-US" sz="1600" dirty="0" smtClean="0">
+                <a:solidFill>
+                  <a:srgbClr val="000000"/>
+                </a:solidFill>
+                <a:latin typeface="Bariol Regular"/>
+                <a:cs typeface="Bariol Regular"/>
+              </a:rPr>
+              <a:t>Queries &amp;</a:t>
+            </a:r>
+          </a:p>
+          <a:p>
+            <a:pPr algn="ctr"/>
+            <a:r>
+              <a:rPr lang="en-US" sz="1600" dirty="0" smtClean="0">
+                <a:solidFill>
+                  <a:srgbClr val="000000"/>
+                </a:solidFill>
+                <a:latin typeface="Bariol Regular"/>
+                <a:cs typeface="Bariol Regular"/>
+              </a:rPr>
+              <a:t>Results</a:t>
+            </a:r>
+            <a:endParaRPr lang="en-US" sz="1600" dirty="0" smtClean="0">
+              <a:solidFill>
+                <a:srgbClr val="000000"/>
+              </a:solidFill>
+              <a:latin typeface="Bariol Regular"/>
+              <a:cs typeface="Bariol Regular"/>
+            </a:endParaRPr>
+          </a:p>
+        </p:txBody>
+      </p:sp>
+      <p:sp>
+        <p:nvSpPr>
+          <p:cNvPr id="97" name="Rectangle 96"/>
+          <p:cNvSpPr/>
+          <p:nvPr/>
+        </p:nvSpPr>
+        <p:spPr>
+          <a:xfrm>
+            <a:off x="1525114" y="2580300"/>
+            <a:ext cx="1030817" cy="450955"/>
+          </a:xfrm>
+          <a:prstGeom prst="rect">
+            <a:avLst/>
+          </a:prstGeom>
+          <a:noFill/>
+          <a:ln>
+            <a:noFill/>
+          </a:ln>
+          <a:effectLst/>
+        </p:spPr>
+        <p:style>
+          <a:lnRef idx="1">
+            <a:schemeClr val="accent1"/>
+          </a:lnRef>
+          <a:fillRef idx="3">
+            <a:schemeClr val="accent1"/>
+          </a:fillRef>
+          <a:effectRef idx="2">
+            <a:schemeClr val="accent1"/>
+          </a:effectRef>
+          <a:fontRef idx="minor">
+            <a:schemeClr val="lt1"/>
+          </a:fontRef>
+        </p:style>
+        <p:txBody>
+          <a:bodyPr rtlCol="0" anchor="ctr"/>
+          <a:lstStyle/>
+          <a:p>
+            <a:pPr algn="ctr"/>
+            <a:r>
+              <a:rPr lang="en-US" sz="1600" dirty="0" smtClean="0">
+                <a:solidFill>
+                  <a:srgbClr val="000000"/>
+                </a:solidFill>
+                <a:latin typeface="Bariol Regular"/>
+                <a:cs typeface="Bariol Regular"/>
+              </a:rPr>
+              <a:t>Swapping </a:t>
+            </a:r>
+          </a:p>
+          <a:p>
+            <a:pPr algn="ctr"/>
+            <a:r>
+              <a:rPr lang="en-US" sz="1600" dirty="0" smtClean="0">
+                <a:solidFill>
+                  <a:srgbClr val="000000"/>
+                </a:solidFill>
+                <a:latin typeface="Bariol Regular"/>
+                <a:cs typeface="Bariol Regular"/>
+              </a:rPr>
+              <a:t>Actions</a:t>
+            </a:r>
+            <a:endParaRPr lang="en-US" sz="1600" dirty="0" smtClean="0">
+              <a:solidFill>
+                <a:srgbClr val="000000"/>
+              </a:solidFill>
+              <a:latin typeface="Bariol Regular"/>
+              <a:cs typeface="Bariol Regular"/>
+            </a:endParaRPr>
+          </a:p>
+        </p:txBody>
+      </p:sp>
+      <p:cxnSp>
+        <p:nvCxnSpPr>
+          <p:cNvPr id="98" name="Straight Arrow Connector 97"/>
+          <p:cNvCxnSpPr>
+            <a:endCxn id="43" idx="0"/>
+          </p:cNvCxnSpPr>
+          <p:nvPr/>
+        </p:nvCxnSpPr>
+        <p:spPr>
+          <a:xfrm>
+            <a:off x="2502809" y="2261885"/>
+            <a:ext cx="0" cy="931968"/>
+          </a:xfrm>
+          <a:prstGeom prst="straightConnector1">
+            <a:avLst/>
+          </a:prstGeom>
+          <a:ln w="38100" cmpd="sng">
+            <a:solidFill>
+              <a:srgbClr val="000000"/>
+            </a:solidFill>
+            <a:headEnd type="none"/>
+            <a:tailEnd type="arrow"/>
+          </a:ln>
+          <a:effectLst/>
+        </p:spPr>
+        <p:style>
+          <a:lnRef idx="2">
+            <a:schemeClr val="accent1"/>
+          </a:lnRef>
+          <a:fillRef idx="0">
+            <a:schemeClr val="accent1"/>
+          </a:fillRef>
+          <a:effectRef idx="1">
+            <a:schemeClr val="accent1"/>
+          </a:effectRef>
+          <a:fontRef idx="minor">
+            <a:schemeClr val="tx1"/>
+          </a:fontRef>
+        </p:style>
+      </p:cxnSp>
+      <p:cxnSp>
+        <p:nvCxnSpPr>
+          <p:cNvPr id="100" name="Straight Arrow Connector 99"/>
+          <p:cNvCxnSpPr/>
+          <p:nvPr/>
+        </p:nvCxnSpPr>
+        <p:spPr>
+          <a:xfrm flipH="1">
+            <a:off x="3837473" y="2261885"/>
+            <a:ext cx="1200" cy="931968"/>
+          </a:xfrm>
+          <a:prstGeom prst="straightConnector1">
+            <a:avLst/>
+          </a:prstGeom>
+          <a:ln w="38100" cmpd="sng">
+            <a:solidFill>
+              <a:srgbClr val="000000"/>
+            </a:solidFill>
+            <a:headEnd type="none"/>
+            <a:tailEnd type="arrow"/>
+          </a:ln>
+          <a:effectLst/>
+        </p:spPr>
+        <p:style>
+          <a:lnRef idx="2">
+            <a:schemeClr val="accent1"/>
+          </a:lnRef>
+          <a:fillRef idx="0">
+            <a:schemeClr val="accent1"/>
+          </a:fillRef>
+          <a:effectRef idx="1">
+            <a:schemeClr val="accent1"/>
+          </a:effectRef>
+          <a:fontRef idx="minor">
+            <a:schemeClr val="tx1"/>
+          </a:fontRef>
+        </p:style>
+      </p:cxnSp>
+      <p:cxnSp>
+        <p:nvCxnSpPr>
+          <p:cNvPr id="113" name="Straight Arrow Connector 112"/>
+          <p:cNvCxnSpPr>
+            <a:stCxn id="58" idx="0"/>
+          </p:cNvCxnSpPr>
+          <p:nvPr/>
+        </p:nvCxnSpPr>
+        <p:spPr>
+          <a:xfrm flipV="1">
+            <a:off x="1291399" y="2261885"/>
+            <a:ext cx="0" cy="933764"/>
+          </a:xfrm>
+          <a:prstGeom prst="straightConnector1">
+            <a:avLst/>
+          </a:prstGeom>
+          <a:ln w="38100" cmpd="sng">
+            <a:solidFill>
+              <a:srgbClr val="000000"/>
+            </a:solidFill>
+            <a:headEnd type="none"/>
+            <a:tailEnd type="arrow"/>
+          </a:ln>
+          <a:effectLst/>
+        </p:spPr>
+        <p:style>
+          <a:lnRef idx="2">
+            <a:schemeClr val="accent1"/>
+          </a:lnRef>
+          <a:fillRef idx="0">
+            <a:schemeClr val="accent1"/>
+          </a:fillRef>
+          <a:effectRef idx="1">
+            <a:schemeClr val="accent1"/>
+          </a:effectRef>
+          <a:fontRef idx="minor">
+            <a:schemeClr val="tx1"/>
+          </a:fontRef>
+        </p:style>
+      </p:cxnSp>
+      <p:sp>
+        <p:nvSpPr>
+          <p:cNvPr id="114" name="Rectangle 113"/>
+          <p:cNvSpPr/>
+          <p:nvPr/>
+        </p:nvSpPr>
+        <p:spPr>
+          <a:xfrm>
+            <a:off x="283928" y="2571747"/>
+            <a:ext cx="1107941" cy="450955"/>
+          </a:xfrm>
+          <a:prstGeom prst="rect">
+            <a:avLst/>
+          </a:prstGeom>
+          <a:noFill/>
+          <a:ln>
+            <a:noFill/>
+          </a:ln>
+          <a:effectLst/>
+        </p:spPr>
+        <p:style>
+          <a:lnRef idx="1">
+            <a:schemeClr val="accent1"/>
+          </a:lnRef>
+          <a:fillRef idx="3">
+            <a:schemeClr val="accent1"/>
+          </a:fillRef>
+          <a:effectRef idx="2">
+            <a:schemeClr val="accent1"/>
+          </a:effectRef>
+          <a:fontRef idx="minor">
+            <a:schemeClr val="lt1"/>
+          </a:fontRef>
+        </p:style>
+        <p:txBody>
+          <a:bodyPr rtlCol="0" anchor="ctr"/>
+          <a:lstStyle/>
+          <a:p>
+            <a:pPr algn="ctr"/>
+            <a:r>
+              <a:rPr lang="en-US" sz="1600" dirty="0" smtClean="0">
+                <a:solidFill>
+                  <a:srgbClr val="000000"/>
+                </a:solidFill>
+                <a:latin typeface="Bariol Regular"/>
+                <a:cs typeface="Bariol Regular"/>
+              </a:rPr>
+              <a:t>Swapping </a:t>
+            </a:r>
+          </a:p>
+          <a:p>
+            <a:pPr algn="ctr"/>
+            <a:r>
+              <a:rPr lang="en-US" sz="1600" dirty="0" smtClean="0">
+                <a:solidFill>
+                  <a:srgbClr val="000000"/>
+                </a:solidFill>
+                <a:latin typeface="Bariol Regular"/>
+                <a:cs typeface="Bariol Regular"/>
+              </a:rPr>
+              <a:t>Options</a:t>
+            </a:r>
+            <a:endParaRPr lang="en-US" sz="1600" dirty="0" smtClean="0">
+              <a:solidFill>
+                <a:srgbClr val="000000"/>
+              </a:solidFill>
+              <a:latin typeface="Bariol Regular"/>
+              <a:cs typeface="Bariol Regular"/>
+            </a:endParaRPr>
+          </a:p>
+        </p:txBody>
+      </p:sp>
+      <p:cxnSp>
+        <p:nvCxnSpPr>
+          <p:cNvPr id="142" name="Straight Arrow Connector 141"/>
+          <p:cNvCxnSpPr/>
+          <p:nvPr/>
+        </p:nvCxnSpPr>
+        <p:spPr>
+          <a:xfrm flipV="1">
+            <a:off x="3970043" y="2261885"/>
+            <a:ext cx="0" cy="931969"/>
+          </a:xfrm>
+          <a:prstGeom prst="straightConnector1">
+            <a:avLst/>
+          </a:prstGeom>
+          <a:ln w="38100" cmpd="sng">
+            <a:solidFill>
+              <a:srgbClr val="000000"/>
+            </a:solidFill>
+            <a:headEnd type="none"/>
+            <a:tailEnd type="arrow"/>
+          </a:ln>
+          <a:effectLst/>
+        </p:spPr>
+        <p:style>
+          <a:lnRef idx="2">
+            <a:schemeClr val="accent1"/>
+          </a:lnRef>
+          <a:fillRef idx="0">
+            <a:schemeClr val="accent1"/>
+          </a:fillRef>
+          <a:effectRef idx="1">
+            <a:schemeClr val="accent1"/>
+          </a:effectRef>
+          <a:fontRef idx="minor">
+            <a:schemeClr val="tx1"/>
+          </a:fontRef>
+        </p:style>
+      </p:cxnSp>
+      <p:sp>
+        <p:nvSpPr>
+          <p:cNvPr id="169" name="Rectangle 168"/>
+          <p:cNvSpPr/>
+          <p:nvPr/>
+        </p:nvSpPr>
+        <p:spPr>
+          <a:xfrm>
+            <a:off x="6435637" y="2580961"/>
+            <a:ext cx="1005020" cy="450955"/>
+          </a:xfrm>
+          <a:prstGeom prst="rect">
+            <a:avLst/>
+          </a:prstGeom>
+          <a:noFill/>
+          <a:ln>
+            <a:noFill/>
+          </a:ln>
+          <a:effectLst/>
+        </p:spPr>
+        <p:style>
+          <a:lnRef idx="1">
+            <a:schemeClr val="accent1"/>
+          </a:lnRef>
+          <a:fillRef idx="3">
+            <a:schemeClr val="accent1"/>
+          </a:fillRef>
+          <a:effectRef idx="2">
+            <a:schemeClr val="accent1"/>
+          </a:effectRef>
+          <a:fontRef idx="minor">
+            <a:schemeClr val="lt1"/>
+          </a:fontRef>
+        </p:style>
+        <p:txBody>
+          <a:bodyPr rtlCol="0" anchor="ctr"/>
+          <a:lstStyle/>
+          <a:p>
+            <a:pPr algn="ctr"/>
+            <a:r>
+              <a:rPr lang="en-US" sz="1600" dirty="0" smtClean="0">
+                <a:solidFill>
+                  <a:srgbClr val="000000"/>
+                </a:solidFill>
+                <a:latin typeface="Bariol Regular"/>
+                <a:cs typeface="Bariol Regular"/>
+              </a:rPr>
+              <a:t>Cleaning Tasks</a:t>
+            </a:r>
+            <a:endParaRPr lang="en-US" sz="1600" dirty="0" smtClean="0">
+              <a:solidFill>
+                <a:srgbClr val="000000"/>
+              </a:solidFill>
+              <a:latin typeface="Bariol Regular"/>
+              <a:cs typeface="Bariol Regular"/>
+            </a:endParaRPr>
+          </a:p>
+        </p:txBody>
+      </p:sp>
+      <p:cxnSp>
+        <p:nvCxnSpPr>
+          <p:cNvPr id="174" name="Straight Arrow Connector 173"/>
+          <p:cNvCxnSpPr/>
+          <p:nvPr/>
+        </p:nvCxnSpPr>
+        <p:spPr>
+          <a:xfrm>
+            <a:off x="7488945" y="2254528"/>
+            <a:ext cx="0" cy="931953"/>
+          </a:xfrm>
+          <a:prstGeom prst="straightConnector1">
+            <a:avLst/>
+          </a:prstGeom>
+          <a:ln w="38100" cmpd="sng">
+            <a:solidFill>
+              <a:srgbClr val="000000"/>
+            </a:solidFill>
+            <a:headEnd type="none"/>
+            <a:tailEnd type="arrow"/>
+          </a:ln>
+          <a:effectLst/>
+        </p:spPr>
+        <p:style>
+          <a:lnRef idx="2">
+            <a:schemeClr val="accent1"/>
+          </a:lnRef>
+          <a:fillRef idx="0">
+            <a:schemeClr val="accent1"/>
+          </a:fillRef>
+          <a:effectRef idx="1">
+            <a:schemeClr val="accent1"/>
+          </a:effectRef>
+          <a:fontRef idx="minor">
+            <a:schemeClr val="tx1"/>
+          </a:fontRef>
+        </p:style>
+      </p:cxnSp>
+      <p:cxnSp>
+        <p:nvCxnSpPr>
+          <p:cNvPr id="85" name="Straight Arrow Connector 84"/>
+          <p:cNvCxnSpPr/>
+          <p:nvPr/>
+        </p:nvCxnSpPr>
+        <p:spPr>
+          <a:xfrm flipV="1">
+            <a:off x="7338154" y="3927925"/>
+            <a:ext cx="0" cy="553212"/>
+          </a:xfrm>
+          <a:prstGeom prst="straightConnector1">
+            <a:avLst/>
+          </a:prstGeom>
+          <a:ln w="38100" cmpd="sng">
+            <a:solidFill>
+              <a:srgbClr val="000000"/>
+            </a:solidFill>
+            <a:headEnd type="none"/>
+            <a:tailEnd type="arrow"/>
+          </a:ln>
+          <a:effectLst/>
+        </p:spPr>
+        <p:style>
+          <a:lnRef idx="2">
+            <a:schemeClr val="accent1"/>
+          </a:lnRef>
+          <a:fillRef idx="0">
+            <a:schemeClr val="accent1"/>
+          </a:fillRef>
+          <a:effectRef idx="1">
+            <a:schemeClr val="accent1"/>
+          </a:effectRef>
+          <a:fontRef idx="minor">
+            <a:schemeClr val="tx1"/>
+          </a:fontRef>
+        </p:style>
+      </p:cxnSp>
+      <p:cxnSp>
+        <p:nvCxnSpPr>
+          <p:cNvPr id="192" name="Straight Arrow Connector 191"/>
+          <p:cNvCxnSpPr/>
+          <p:nvPr/>
+        </p:nvCxnSpPr>
+        <p:spPr>
+          <a:xfrm>
+            <a:off x="7516636" y="3931136"/>
+            <a:ext cx="0" cy="561743"/>
+          </a:xfrm>
+          <a:prstGeom prst="straightConnector1">
+            <a:avLst/>
+          </a:prstGeom>
+          <a:ln w="38100" cmpd="sng">
+            <a:solidFill>
+              <a:srgbClr val="000000"/>
+            </a:solidFill>
+            <a:headEnd type="none"/>
+            <a:tailEnd type="arrow"/>
+          </a:ln>
+          <a:effectLst/>
+        </p:spPr>
+        <p:style>
+          <a:lnRef idx="2">
+            <a:schemeClr val="accent1"/>
+          </a:lnRef>
+          <a:fillRef idx="0">
+            <a:schemeClr val="accent1"/>
+          </a:fillRef>
+          <a:effectRef idx="1">
+            <a:schemeClr val="accent1"/>
+          </a:effectRef>
+          <a:fontRef idx="minor">
+            <a:schemeClr val="tx1"/>
+          </a:fontRef>
+        </p:style>
+      </p:cxnSp>
+      <p:sp>
+        <p:nvSpPr>
+          <p:cNvPr id="200" name="Can 199"/>
+          <p:cNvSpPr/>
+          <p:nvPr/>
+        </p:nvSpPr>
+        <p:spPr>
+          <a:xfrm>
+            <a:off x="2549838" y="5837764"/>
+            <a:ext cx="4044325" cy="757626"/>
+          </a:xfrm>
+          <a:prstGeom prst="can">
+            <a:avLst/>
+          </a:prstGeom>
+          <a:solidFill>
+            <a:srgbClr val="FFFFFF"/>
+          </a:solidFill>
+          <a:ln>
+            <a:solidFill>
+              <a:srgbClr val="000000"/>
+            </a:solidFill>
+          </a:ln>
+          <a:effectLst/>
+        </p:spPr>
+        <p:style>
+          <a:lnRef idx="1">
+            <a:schemeClr val="accent1"/>
+          </a:lnRef>
+          <a:fillRef idx="3">
+            <a:schemeClr val="accent1"/>
+          </a:fillRef>
+          <a:effectRef idx="2">
+            <a:schemeClr val="accent1"/>
+          </a:effectRef>
+          <a:fontRef idx="minor">
+            <a:schemeClr val="lt1"/>
+          </a:fontRef>
+        </p:style>
+        <p:txBody>
+          <a:bodyPr rtlCol="0" anchor="ctr"/>
+          <a:lstStyle/>
+          <a:p>
+            <a:pPr algn="ctr"/>
+            <a:r>
+              <a:rPr lang="en-US" sz="2000" dirty="0" smtClean="0">
+                <a:solidFill>
+                  <a:srgbClr val="000000"/>
+                </a:solidFill>
+                <a:latin typeface="Bariol Regular"/>
+                <a:cs typeface="Bariol Regular"/>
+              </a:rPr>
+              <a:t>Lineage / Storage</a:t>
+            </a:r>
+            <a:endParaRPr lang="en-US" sz="2000" dirty="0">
+              <a:solidFill>
+                <a:srgbClr val="000000"/>
+              </a:solidFill>
+              <a:latin typeface="Bariol Regular"/>
+              <a:cs typeface="Bariol Regular"/>
+            </a:endParaRPr>
+          </a:p>
+        </p:txBody>
+      </p:sp>
+      <p:cxnSp>
+        <p:nvCxnSpPr>
+          <p:cNvPr id="117" name="Straight Arrow Connector 116"/>
+          <p:cNvCxnSpPr>
+            <a:stCxn id="43" idx="2"/>
+          </p:cNvCxnSpPr>
+          <p:nvPr/>
+        </p:nvCxnSpPr>
+        <p:spPr>
+          <a:xfrm flipH="1">
+            <a:off x="2000249" y="3940304"/>
+            <a:ext cx="502560" cy="771782"/>
+          </a:xfrm>
+          <a:prstGeom prst="straightConnector1">
+            <a:avLst/>
+          </a:prstGeom>
+          <a:ln w="38100" cmpd="sng">
+            <a:solidFill>
+              <a:srgbClr val="000000"/>
+            </a:solidFill>
+            <a:headEnd type="none"/>
+            <a:tailEnd type="arrow"/>
+          </a:ln>
+          <a:effectLst/>
+        </p:spPr>
+        <p:style>
+          <a:lnRef idx="2">
+            <a:schemeClr val="accent1"/>
+          </a:lnRef>
+          <a:fillRef idx="0">
+            <a:schemeClr val="accent1"/>
+          </a:fillRef>
+          <a:effectRef idx="1">
+            <a:schemeClr val="accent1"/>
+          </a:effectRef>
+          <a:fontRef idx="minor">
+            <a:schemeClr val="tx1"/>
+          </a:fontRef>
+        </p:style>
+      </p:cxnSp>
+      <p:cxnSp>
+        <p:nvCxnSpPr>
+          <p:cNvPr id="122" name="Straight Arrow Connector 121"/>
+          <p:cNvCxnSpPr>
+            <a:stCxn id="43" idx="2"/>
+          </p:cNvCxnSpPr>
+          <p:nvPr/>
+        </p:nvCxnSpPr>
+        <p:spPr>
+          <a:xfrm>
+            <a:off x="2502809" y="3940304"/>
+            <a:ext cx="1857524" cy="771782"/>
+          </a:xfrm>
+          <a:prstGeom prst="straightConnector1">
+            <a:avLst/>
+          </a:prstGeom>
+          <a:ln w="38100" cmpd="sng">
+            <a:solidFill>
+              <a:srgbClr val="000000"/>
+            </a:solidFill>
+            <a:headEnd type="none"/>
+            <a:tailEnd type="arrow"/>
+          </a:ln>
+          <a:effectLst/>
+        </p:spPr>
+        <p:style>
+          <a:lnRef idx="2">
+            <a:schemeClr val="accent1"/>
+          </a:lnRef>
+          <a:fillRef idx="0">
+            <a:schemeClr val="accent1"/>
+          </a:fillRef>
+          <a:effectRef idx="1">
+            <a:schemeClr val="accent1"/>
+          </a:effectRef>
+          <a:fontRef idx="minor">
+            <a:schemeClr val="tx1"/>
+          </a:fontRef>
+        </p:style>
+      </p:cxnSp>
+    </p:spTree>
+    <p:extLst>
+      <p:ext uri="{BB962C8B-B14F-4D97-AF65-F5344CB8AC3E}">
+        <p14:creationId xmlns:p14="http://schemas.microsoft.com/office/powerpoint/2010/main" val="1247783450"/>
+      </p:ext>
+    </p:extLst>
+  </p:cSld>
+  <p:clrMapOvr>
+    <a:masterClrMapping/>
+  </p:clrMapOvr>
+  <p:timing>
+    <p:tnLst>
+      <p:par>
+        <p:cTn xmlns:p14="http://schemas.microsoft.com/office/powerpoint/2010/main" id="1" dur="indefinite" restart="never" nodeType="tmRoot"/>
+      </p:par>
+    </p:tnLst>
+  </p:timing>
+</p:sld>
+</file>
+
+<file path=ppt/slides/slide3.xml><?xml version="1.0" encoding="utf-8"?>
+<p:sld xmlns:a="http://schemas.openxmlformats.org/drawingml/2006/main" xmlns:r="http://schemas.openxmlformats.org/officeDocument/2006/relationships" xmlns:p="http://schemas.openxmlformats.org/presentationml/2006/main">
+  <p:cSld>
+    <p:spTree>
+      <p:nvGrpSpPr>
+        <p:cNvPr id="1" name=""/>
+        <p:cNvGrpSpPr/>
+        <p:nvPr/>
+      </p:nvGrpSpPr>
+      <p:grpSpPr>
+        <a:xfrm>
+          <a:off x="0" y="0"/>
+          <a:ext cx="0" cy="0"/>
+          <a:chOff x="0" y="0"/>
+          <a:chExt cx="0" cy="0"/>
+        </a:xfrm>
+      </p:grpSpPr>
+      <p:grpSp>
+        <p:nvGrpSpPr>
+          <p:cNvPr id="25" name="Group 24"/>
+          <p:cNvGrpSpPr/>
+          <p:nvPr/>
+        </p:nvGrpSpPr>
+        <p:grpSpPr>
+          <a:xfrm>
+            <a:off x="1537631" y="1662577"/>
+            <a:ext cx="6068739" cy="3532847"/>
+            <a:chOff x="508251" y="2835056"/>
+            <a:chExt cx="6068739" cy="3532847"/>
+          </a:xfrm>
+        </p:grpSpPr>
+        <p:grpSp>
+          <p:nvGrpSpPr>
+            <p:cNvPr id="22" name="Group 21"/>
+            <p:cNvGrpSpPr/>
+            <p:nvPr/>
+          </p:nvGrpSpPr>
+          <p:grpSpPr>
+            <a:xfrm>
+              <a:off x="508251" y="2835056"/>
+              <a:ext cx="6068739" cy="3532847"/>
+              <a:chOff x="508251" y="277468"/>
+              <a:chExt cx="6068739" cy="3532847"/>
+            </a:xfrm>
+          </p:grpSpPr>
+          <p:grpSp>
+            <p:nvGrpSpPr>
+              <p:cNvPr id="4" name="Group 3"/>
+              <p:cNvGrpSpPr/>
+              <p:nvPr/>
+            </p:nvGrpSpPr>
+            <p:grpSpPr>
+              <a:xfrm>
+                <a:off x="508251" y="277468"/>
+                <a:ext cx="6068739" cy="3532847"/>
+                <a:chOff x="508251" y="-1442436"/>
+                <a:chExt cx="6068739" cy="3532847"/>
+              </a:xfrm>
+            </p:grpSpPr>
+            <p:grpSp>
+              <p:nvGrpSpPr>
+                <p:cNvPr id="5" name="Group 4"/>
+                <p:cNvGrpSpPr/>
+                <p:nvPr/>
+              </p:nvGrpSpPr>
+              <p:grpSpPr>
+                <a:xfrm>
+                  <a:off x="508251" y="-1442436"/>
+                  <a:ext cx="6068739" cy="3532847"/>
+                  <a:chOff x="-1098799" y="-1857804"/>
+                  <a:chExt cx="6068739" cy="3532847"/>
+                </a:xfrm>
+              </p:grpSpPr>
+              <p:sp>
+                <p:nvSpPr>
+                  <p:cNvPr id="13" name="Rectangle 12"/>
+                  <p:cNvSpPr/>
+                  <p:nvPr/>
+                </p:nvSpPr>
+                <p:spPr>
+                  <a:xfrm>
+                    <a:off x="-1098799" y="-1857804"/>
+                    <a:ext cx="6068739" cy="3532847"/>
+                  </a:xfrm>
+                  <a:prstGeom prst="rect">
+                    <a:avLst/>
+                  </a:prstGeom>
+                  <a:noFill/>
+                  <a:ln>
+                    <a:solidFill>
+                      <a:schemeClr val="tx1"/>
+                    </a:solidFill>
+                  </a:ln>
+                  <a:effectLst/>
+                </p:spPr>
+                <p:style>
+                  <a:lnRef idx="1">
+                    <a:schemeClr val="accent1"/>
+                  </a:lnRef>
+                  <a:fillRef idx="3">
+                    <a:schemeClr val="accent1"/>
+                  </a:fillRef>
+                  <a:effectRef idx="2">
+                    <a:schemeClr val="accent1"/>
+                  </a:effectRef>
+                  <a:fontRef idx="minor">
+                    <a:schemeClr val="lt1"/>
+                  </a:fontRef>
+                </p:style>
+                <p:txBody>
+                  <a:bodyPr rtlCol="0" anchor="ctr"/>
+                  <a:lstStyle/>
+                  <a:p>
+                    <a:pPr algn="ctr"/>
+                    <a:endParaRPr lang="en-US" sz="2000" dirty="0">
+                      <a:solidFill>
+                        <a:schemeClr val="tx1"/>
+                      </a:solidFill>
+                      <a:latin typeface="Bariol Regular"/>
+                      <a:cs typeface="Bariol Regular"/>
+                    </a:endParaRPr>
+                  </a:p>
+                </p:txBody>
+              </p:sp>
+              <p:sp>
+                <p:nvSpPr>
+                  <p:cNvPr id="14" name="Rectangle 13"/>
+                  <p:cNvSpPr/>
+                  <p:nvPr/>
+                </p:nvSpPr>
+                <p:spPr>
+                  <a:xfrm>
+                    <a:off x="-966252" y="-1204349"/>
+                    <a:ext cx="910610" cy="770712"/>
+                  </a:xfrm>
+                  <a:prstGeom prst="rect">
+                    <a:avLst/>
+                  </a:prstGeom>
+                  <a:noFill/>
+                  <a:ln>
+                    <a:solidFill>
+                      <a:schemeClr val="tx1"/>
+                    </a:solidFill>
+                  </a:ln>
+                  <a:effectLst/>
+                </p:spPr>
+                <p:style>
+                  <a:lnRef idx="1">
+                    <a:schemeClr val="accent1"/>
+                  </a:lnRef>
+                  <a:fillRef idx="3">
+                    <a:schemeClr val="accent1"/>
+                  </a:fillRef>
+                  <a:effectRef idx="2">
+                    <a:schemeClr val="accent1"/>
+                  </a:effectRef>
+                  <a:fontRef idx="minor">
+                    <a:schemeClr val="lt1"/>
+                  </a:fontRef>
+                </p:style>
+                <p:txBody>
+                  <a:bodyPr rtlCol="0" anchor="ctr"/>
+                  <a:lstStyle/>
+                  <a:p>
+                    <a:pPr algn="ctr"/>
+                    <a:endParaRPr lang="en-US" sz="2000" dirty="0">
+                      <a:solidFill>
+                        <a:schemeClr val="tx1"/>
+                      </a:solidFill>
+                      <a:latin typeface="Bariol Regular"/>
+                      <a:cs typeface="Bariol Regular"/>
+                    </a:endParaRPr>
+                  </a:p>
+                </p:txBody>
+              </p:sp>
+            </p:grpSp>
+            <p:sp>
+              <p:nvSpPr>
+                <p:cNvPr id="6" name="Isosceles Triangle 5"/>
+                <p:cNvSpPr/>
+                <p:nvPr/>
+              </p:nvSpPr>
+              <p:spPr>
+                <a:xfrm>
+                  <a:off x="606095" y="141130"/>
+                  <a:ext cx="1060704" cy="770712"/>
+                </a:xfrm>
+                <a:prstGeom prst="triangle">
+                  <a:avLst/>
+                </a:prstGeom>
+                <a:noFill/>
+                <a:ln>
+                  <a:solidFill>
+                    <a:schemeClr val="tx1"/>
+                  </a:solidFill>
+                </a:ln>
+                <a:effectLst/>
+              </p:spPr>
+              <p:style>
+                <a:lnRef idx="1">
+                  <a:schemeClr val="accent1"/>
+                </a:lnRef>
+                <a:fillRef idx="3">
+                  <a:schemeClr val="accent1"/>
+                </a:fillRef>
+                <a:effectRef idx="2">
+                  <a:schemeClr val="accent1"/>
+                </a:effectRef>
+                <a:fontRef idx="minor">
+                  <a:schemeClr val="lt1"/>
+                </a:fontRef>
+              </p:style>
+              <p:txBody>
+                <a:bodyPr rtlCol="0" anchor="ctr"/>
+                <a:lstStyle/>
+                <a:p>
+                  <a:pPr algn="ctr"/>
+                  <a:endParaRPr lang="en-US" sz="2000">
+                    <a:latin typeface="Bariol Regular"/>
+                    <a:cs typeface="Bariol Regular"/>
+                  </a:endParaRPr>
+                </a:p>
+              </p:txBody>
+            </p:sp>
+            <p:sp>
+              <p:nvSpPr>
+                <p:cNvPr id="7" name="Regular Pentagon 6"/>
+                <p:cNvSpPr/>
+                <p:nvPr/>
+              </p:nvSpPr>
+              <p:spPr>
+                <a:xfrm>
+                  <a:off x="680803" y="1127729"/>
+                  <a:ext cx="837081" cy="770712"/>
+                </a:xfrm>
+                <a:prstGeom prst="pentagon">
+                  <a:avLst/>
+                </a:prstGeom>
+                <a:solidFill>
+                  <a:srgbClr val="FFFFFF"/>
+                </a:solidFill>
+                <a:ln>
+                  <a:solidFill>
+                    <a:srgbClr val="000000"/>
+                  </a:solidFill>
+                </a:ln>
+                <a:effectLst/>
+              </p:spPr>
+              <p:style>
+                <a:lnRef idx="1">
+                  <a:schemeClr val="accent1"/>
+                </a:lnRef>
+                <a:fillRef idx="3">
+                  <a:schemeClr val="accent1"/>
+                </a:fillRef>
+                <a:effectRef idx="2">
+                  <a:schemeClr val="accent1"/>
+                </a:effectRef>
+                <a:fontRef idx="minor">
+                  <a:schemeClr val="lt1"/>
+                </a:fontRef>
+              </p:style>
+              <p:txBody>
+                <a:bodyPr rtlCol="0" anchor="ctr"/>
+                <a:lstStyle/>
+                <a:p>
+                  <a:pPr algn="ctr"/>
+                  <a:endParaRPr lang="en-US" sz="2000">
+                    <a:latin typeface="Bariol Regular"/>
+                    <a:cs typeface="Bariol Regular"/>
+                  </a:endParaRPr>
+                </a:p>
+              </p:txBody>
+            </p:sp>
+            <p:pic>
+              <p:nvPicPr>
+                <p:cNvPr id="10" name="Picture 9"/>
+                <p:cNvPicPr>
+                  <a:picLocks noChangeAspect="1"/>
+                </p:cNvPicPr>
+                <p:nvPr/>
+              </p:nvPicPr>
+              <p:blipFill rotWithShape="1">
+                <a:blip r:embed="rId2"/>
+                <a:srcRect b="17662"/>
+                <a:stretch/>
+              </p:blipFill>
+              <p:spPr>
+                <a:xfrm>
+                  <a:off x="3705589" y="1127729"/>
+                  <a:ext cx="917278" cy="881148"/>
+                </a:xfrm>
+                <a:prstGeom prst="rect">
+                  <a:avLst/>
+                </a:prstGeom>
+              </p:spPr>
+            </p:pic>
+            <p:pic>
+              <p:nvPicPr>
+                <p:cNvPr id="11" name="Picture 10" descr="noun_1248_cc.png"/>
+                <p:cNvPicPr>
+                  <a:picLocks noChangeAspect="1"/>
+                </p:cNvPicPr>
+                <p:nvPr/>
+              </p:nvPicPr>
+              <p:blipFill rotWithShape="1">
+                <a:blip r:embed="rId3">
+                  <a:extLst>
+                    <a:ext uri="{28A0092B-C50C-407E-A947-70E740481C1C}">
+                      <a14:useLocalDpi xmlns:a14="http://schemas.microsoft.com/office/drawing/2010/main" val="0"/>
+                    </a:ext>
+                  </a:extLst>
+                </a:blip>
+                <a:srcRect t="6796" b="21682"/>
+                <a:stretch/>
+              </p:blipFill>
+              <p:spPr>
+                <a:xfrm>
+                  <a:off x="3732085" y="141130"/>
+                  <a:ext cx="846488" cy="706336"/>
+                </a:xfrm>
+                <a:prstGeom prst="rect">
+                  <a:avLst/>
+                </a:prstGeom>
+              </p:spPr>
+            </p:pic>
+            <p:pic>
+              <p:nvPicPr>
+                <p:cNvPr id="12" name="Picture 11" descr="noun_5393.png"/>
+                <p:cNvPicPr>
+                  <a:picLocks noChangeAspect="1"/>
+                </p:cNvPicPr>
+                <p:nvPr/>
+              </p:nvPicPr>
+              <p:blipFill>
+                <a:blip r:embed="rId4">
+                  <a:extLst>
+                    <a:ext uri="{28A0092B-C50C-407E-A947-70E740481C1C}">
+                      <a14:useLocalDpi xmlns:a14="http://schemas.microsoft.com/office/drawing/2010/main" val="0"/>
+                    </a:ext>
+                  </a:extLst>
+                </a:blip>
+                <a:stretch>
+                  <a:fillRect/>
+                </a:stretch>
+              </p:blipFill>
+              <p:spPr>
+                <a:xfrm>
+                  <a:off x="3755829" y="-893834"/>
+                  <a:ext cx="875565" cy="875565"/>
+                </a:xfrm>
+                <a:prstGeom prst="rect">
+                  <a:avLst/>
+                </a:prstGeom>
+              </p:spPr>
+            </p:pic>
+          </p:grpSp>
+          <p:sp>
+            <p:nvSpPr>
+              <p:cNvPr id="16" name="TextBox 15"/>
+              <p:cNvSpPr txBox="1"/>
+              <p:nvPr/>
+            </p:nvSpPr>
+            <p:spPr>
+              <a:xfrm>
+                <a:off x="1666799" y="1134022"/>
+                <a:ext cx="1258699" cy="400110"/>
+              </a:xfrm>
+              <a:prstGeom prst="rect">
+                <a:avLst/>
+              </a:prstGeom>
+              <a:noFill/>
+            </p:spPr>
+            <p:txBody>
+              <a:bodyPr wrap="square" rtlCol="0">
+                <a:spAutoFit/>
+              </a:bodyPr>
+              <a:lstStyle/>
+              <a:p>
+                <a:r>
+                  <a:rPr lang="en-US" sz="2000" dirty="0" smtClean="0">
+                    <a:latin typeface="Bariol Regular"/>
+                    <a:cs typeface="Bariol Regular"/>
+                  </a:rPr>
+                  <a:t>Sampling</a:t>
+                </a:r>
+                <a:endParaRPr lang="en-US" sz="2000" dirty="0">
+                  <a:latin typeface="Bariol Regular"/>
+                  <a:cs typeface="Bariol Regular"/>
+                </a:endParaRPr>
+              </a:p>
+            </p:txBody>
+          </p:sp>
+          <p:sp>
+            <p:nvSpPr>
+              <p:cNvPr id="17" name="TextBox 16"/>
+              <p:cNvSpPr txBox="1"/>
+              <p:nvPr/>
+            </p:nvSpPr>
+            <p:spPr>
+              <a:xfrm>
+                <a:off x="1666799" y="2000856"/>
+                <a:ext cx="1689734" cy="400110"/>
+              </a:xfrm>
+              <a:prstGeom prst="rect">
+                <a:avLst/>
+              </a:prstGeom>
+              <a:noFill/>
+            </p:spPr>
+            <p:txBody>
+              <a:bodyPr wrap="square" rtlCol="0">
+                <a:spAutoFit/>
+              </a:bodyPr>
+              <a:lstStyle/>
+              <a:p>
+                <a:r>
+                  <a:rPr lang="en-US" sz="2000" dirty="0" smtClean="0">
+                    <a:latin typeface="Bariol Regular"/>
+                    <a:cs typeface="Bariol Regular"/>
+                  </a:rPr>
+                  <a:t>Similarity Join</a:t>
+                </a:r>
+                <a:endParaRPr lang="en-US" sz="2000" dirty="0">
+                  <a:latin typeface="Bariol Regular"/>
+                  <a:cs typeface="Bariol Regular"/>
+                </a:endParaRPr>
+              </a:p>
+            </p:txBody>
+          </p:sp>
+          <p:sp>
+            <p:nvSpPr>
+              <p:cNvPr id="18" name="TextBox 17"/>
+              <p:cNvSpPr txBox="1"/>
+              <p:nvPr/>
+            </p:nvSpPr>
+            <p:spPr>
+              <a:xfrm>
+                <a:off x="1666799" y="3100858"/>
+                <a:ext cx="1258699" cy="400110"/>
+              </a:xfrm>
+              <a:prstGeom prst="rect">
+                <a:avLst/>
+              </a:prstGeom>
+              <a:noFill/>
+            </p:spPr>
+            <p:txBody>
+              <a:bodyPr wrap="square" rtlCol="0">
+                <a:spAutoFit/>
+              </a:bodyPr>
+              <a:lstStyle/>
+              <a:p>
+                <a:r>
+                  <a:rPr lang="en-US" sz="2000" dirty="0" smtClean="0">
+                    <a:latin typeface="Bariol Regular"/>
+                    <a:cs typeface="Bariol Regular"/>
+                  </a:rPr>
+                  <a:t>Filtering</a:t>
+                </a:r>
+                <a:endParaRPr lang="en-US" sz="2000" dirty="0">
+                  <a:latin typeface="Bariol Regular"/>
+                  <a:cs typeface="Bariol Regular"/>
+                </a:endParaRPr>
+              </a:p>
+            </p:txBody>
+          </p:sp>
+          <p:sp>
+            <p:nvSpPr>
+              <p:cNvPr id="19" name="TextBox 18"/>
+              <p:cNvSpPr txBox="1"/>
+              <p:nvPr/>
+            </p:nvSpPr>
+            <p:spPr>
+              <a:xfrm>
+                <a:off x="4784504" y="1134022"/>
+                <a:ext cx="1450847" cy="400110"/>
+              </a:xfrm>
+              <a:prstGeom prst="rect">
+                <a:avLst/>
+              </a:prstGeom>
+              <a:noFill/>
+            </p:spPr>
+            <p:txBody>
+              <a:bodyPr wrap="square" rtlCol="0">
+                <a:spAutoFit/>
+              </a:bodyPr>
+              <a:lstStyle/>
+              <a:p>
+                <a:r>
+                  <a:rPr lang="en-US" sz="2000" dirty="0" smtClean="0">
+                    <a:latin typeface="Bariol Regular"/>
+                    <a:cs typeface="Bariol Regular"/>
+                  </a:rPr>
+                  <a:t>Rule-based</a:t>
+                </a:r>
+                <a:endParaRPr lang="en-US" sz="2000" dirty="0">
+                  <a:latin typeface="Bariol Regular"/>
+                  <a:cs typeface="Bariol Regular"/>
+                </a:endParaRPr>
+              </a:p>
+            </p:txBody>
+          </p:sp>
+          <p:sp>
+            <p:nvSpPr>
+              <p:cNvPr id="20" name="TextBox 19"/>
+              <p:cNvSpPr txBox="1"/>
+              <p:nvPr/>
+            </p:nvSpPr>
+            <p:spPr>
+              <a:xfrm>
+                <a:off x="4784504" y="2000856"/>
+                <a:ext cx="1792486" cy="400110"/>
+              </a:xfrm>
+              <a:prstGeom prst="rect">
+                <a:avLst/>
+              </a:prstGeom>
+              <a:noFill/>
+            </p:spPr>
+            <p:txBody>
+              <a:bodyPr wrap="square" rtlCol="0">
+                <a:spAutoFit/>
+              </a:bodyPr>
+              <a:lstStyle/>
+              <a:p>
+                <a:r>
+                  <a:rPr lang="en-US" sz="2000" dirty="0" smtClean="0">
+                    <a:latin typeface="Bariol Regular"/>
+                    <a:cs typeface="Bariol Regular"/>
+                  </a:rPr>
+                  <a:t>Learning-based</a:t>
+                </a:r>
+                <a:endParaRPr lang="en-US" sz="2000" dirty="0">
+                  <a:latin typeface="Bariol Regular"/>
+                  <a:cs typeface="Bariol Regular"/>
+                </a:endParaRPr>
+              </a:p>
+            </p:txBody>
+          </p:sp>
+          <p:sp>
+            <p:nvSpPr>
+              <p:cNvPr id="21" name="TextBox 20"/>
+              <p:cNvSpPr txBox="1"/>
+              <p:nvPr/>
+            </p:nvSpPr>
+            <p:spPr>
+              <a:xfrm>
+                <a:off x="4784504" y="3100858"/>
+                <a:ext cx="1792486" cy="400110"/>
+              </a:xfrm>
+              <a:prstGeom prst="rect">
+                <a:avLst/>
+              </a:prstGeom>
+              <a:noFill/>
+            </p:spPr>
+            <p:txBody>
+              <a:bodyPr wrap="square" rtlCol="0">
+                <a:spAutoFit/>
+              </a:bodyPr>
+              <a:lstStyle/>
+              <a:p>
+                <a:r>
+                  <a:rPr lang="en-US" sz="2000" dirty="0" smtClean="0">
+                    <a:latin typeface="Bariol Regular"/>
+                    <a:cs typeface="Bariol Regular"/>
+                  </a:rPr>
+                  <a:t>Crowd-based</a:t>
+                </a:r>
+                <a:endParaRPr lang="en-US" sz="2000" dirty="0">
+                  <a:latin typeface="Bariol Regular"/>
+                  <a:cs typeface="Bariol Regular"/>
+                </a:endParaRPr>
+              </a:p>
+            </p:txBody>
+          </p:sp>
+        </p:grpSp>
+        <p:sp>
+          <p:nvSpPr>
+            <p:cNvPr id="23" name="TextBox 22"/>
+            <p:cNvSpPr txBox="1"/>
+            <p:nvPr/>
+          </p:nvSpPr>
+          <p:spPr>
+            <a:xfrm>
+              <a:off x="1265073" y="2922311"/>
+              <a:ext cx="1258699" cy="400110"/>
+            </a:xfrm>
+            <a:prstGeom prst="rect">
+              <a:avLst/>
+            </a:prstGeom>
+            <a:noFill/>
+          </p:spPr>
+          <p:txBody>
+            <a:bodyPr wrap="square" rtlCol="0">
+              <a:spAutoFit/>
+            </a:bodyPr>
+            <a:lstStyle/>
+            <a:p>
+              <a:r>
+                <a:rPr lang="en-US" sz="2000" u="sng" dirty="0" smtClean="0">
+                  <a:latin typeface="Bariol Regular"/>
+                  <a:cs typeface="Bariol Regular"/>
+                </a:rPr>
+                <a:t>Operators</a:t>
+              </a:r>
+              <a:endParaRPr lang="en-US" sz="2000" u="sng" dirty="0">
+                <a:latin typeface="Bariol Regular"/>
+                <a:cs typeface="Bariol Regular"/>
+              </a:endParaRPr>
+            </a:p>
+          </p:txBody>
+        </p:sp>
+        <p:sp>
+          <p:nvSpPr>
+            <p:cNvPr id="24" name="TextBox 23"/>
+            <p:cNvSpPr txBox="1"/>
+            <p:nvPr/>
+          </p:nvSpPr>
+          <p:spPr>
+            <a:xfrm>
+              <a:off x="4286393" y="2922311"/>
+              <a:ext cx="1927792" cy="400110"/>
+            </a:xfrm>
+            <a:prstGeom prst="rect">
+              <a:avLst/>
+            </a:prstGeom>
+            <a:noFill/>
+          </p:spPr>
+          <p:txBody>
+            <a:bodyPr wrap="square" rtlCol="0">
+              <a:spAutoFit/>
+            </a:bodyPr>
+            <a:lstStyle/>
+            <a:p>
+              <a:r>
+                <a:rPr lang="en-US" sz="2000" u="sng" dirty="0" smtClean="0">
+                  <a:latin typeface="Bariol Regular"/>
+                  <a:cs typeface="Bariol Regular"/>
+                </a:rPr>
+                <a:t>Implementations</a:t>
+              </a:r>
+              <a:endParaRPr lang="en-US" sz="2000" u="sng" dirty="0">
+                <a:latin typeface="Bariol Regular"/>
+                <a:cs typeface="Bariol Regular"/>
+              </a:endParaRPr>
+            </a:p>
+          </p:txBody>
+        </p:sp>
+      </p:grpSp>
+    </p:spTree>
+    <p:extLst>
+      <p:ext uri="{BB962C8B-B14F-4D97-AF65-F5344CB8AC3E}">
+        <p14:creationId xmlns:p14="http://schemas.microsoft.com/office/powerpoint/2010/main" val="3060178553"/>
+      </p:ext>
+    </p:extLst>
+  </p:cSld>
+  <p:clrMapOvr>
+    <a:masterClrMapping/>
+  </p:clrMapOvr>
 </p:sld>
 </file>
 

</xml_diff>

<commit_message>
fixed and reduce arch diag
</commit_message>
<xml_diff>
--- a/figs/figs.pptx
+++ b/figs/figs.pptx
@@ -5624,8 +5624,8 @@
         </p:nvSpPr>
         <p:spPr>
           <a:xfrm>
-            <a:off x="544703" y="2641601"/>
-            <a:ext cx="4565777" cy="1594336"/>
+            <a:off x="-462970" y="2613924"/>
+            <a:ext cx="4720009" cy="1594336"/>
           </a:xfrm>
           <a:prstGeom prst="rect">
             <a:avLst/>
@@ -5690,8 +5690,8 @@
         </p:nvSpPr>
         <p:spPr>
           <a:xfrm>
-            <a:off x="487680" y="4389120"/>
-            <a:ext cx="7553759" cy="1320799"/>
+            <a:off x="-462970" y="4361443"/>
+            <a:ext cx="7187999" cy="1320799"/>
           </a:xfrm>
           <a:prstGeom prst="rect">
             <a:avLst/>
@@ -5756,8 +5756,8 @@
         </p:nvCxnSpPr>
         <p:spPr>
           <a:xfrm>
-            <a:off x="283928" y="2522114"/>
-            <a:ext cx="8484152" cy="0"/>
+            <a:off x="-462970" y="2494437"/>
+            <a:ext cx="7187999" cy="0"/>
           </a:xfrm>
           <a:prstGeom prst="line">
             <a:avLst/>
@@ -5794,8 +5794,8 @@
         </p:nvSpPr>
         <p:spPr>
           <a:xfrm>
-            <a:off x="738990" y="1879600"/>
-            <a:ext cx="4225013" cy="372125"/>
+            <a:off x="254001" y="1851923"/>
+            <a:ext cx="3152320" cy="372125"/>
           </a:xfrm>
           <a:prstGeom prst="rect">
             <a:avLst/>
@@ -5855,7 +5855,7 @@
         </p:nvGrpSpPr>
         <p:grpSpPr>
           <a:xfrm>
-            <a:off x="2249652" y="479159"/>
+            <a:off x="1299002" y="451482"/>
             <a:ext cx="1130771" cy="1442048"/>
             <a:chOff x="1426834" y="493180"/>
             <a:chExt cx="1130771" cy="1442048"/>
@@ -5948,7 +5948,7 @@
         </p:nvGrpSpPr>
         <p:grpSpPr>
           <a:xfrm>
-            <a:off x="6280941" y="558953"/>
+            <a:off x="4964531" y="531276"/>
             <a:ext cx="1130771" cy="1282461"/>
             <a:chOff x="5256073" y="605966"/>
             <a:chExt cx="1130771" cy="1282461"/>
@@ -6038,7 +6038,7 @@
         </p:nvSpPr>
         <p:spPr>
           <a:xfrm>
-            <a:off x="1975473" y="3414462"/>
+            <a:off x="1024823" y="3386785"/>
             <a:ext cx="1516709" cy="454722"/>
           </a:xfrm>
           <a:prstGeom prst="rect">
@@ -6079,7 +6079,7 @@
                 <a:latin typeface="Gill Sans"/>
                 <a:cs typeface="Gill Sans"/>
               </a:rPr>
-              <a:t>Hit Swapper</a:t>
+              <a:t>Hot Swapper</a:t>
             </a:r>
             <a:endParaRPr lang="en-US" sz="1700" dirty="0">
               <a:solidFill>
@@ -6099,7 +6099,7 @@
         </p:nvSpPr>
         <p:spPr>
           <a:xfrm>
-            <a:off x="3545839" y="3413760"/>
+            <a:off x="2595189" y="3386083"/>
             <a:ext cx="1503681" cy="453628"/>
           </a:xfrm>
           <a:prstGeom prst="rect">
@@ -6160,7 +6160,7 @@
         </p:nvSpPr>
         <p:spPr>
           <a:xfrm>
-            <a:off x="621677" y="3415555"/>
+            <a:off x="-328973" y="3387878"/>
             <a:ext cx="1292838" cy="453627"/>
           </a:xfrm>
           <a:prstGeom prst="rect">
@@ -6201,17 +6201,7 @@
                 <a:latin typeface="Gill Sans"/>
                 <a:cs typeface="Gill Sans"/>
               </a:rPr>
-              <a:t>Rec. </a:t>
-            </a:r>
-            <a:r>
-              <a:rPr lang="en-US" sz="1700" dirty="0" smtClean="0">
-                <a:solidFill>
-                  <a:schemeClr val="tx1"/>
-                </a:solidFill>
-                <a:latin typeface="Gill Sans"/>
-                <a:cs typeface="Gill Sans"/>
-              </a:rPr>
-              <a:t>Engine</a:t>
+              <a:t>Rec. Engine</a:t>
             </a:r>
             <a:endParaRPr lang="en-US" sz="1700" dirty="0">
               <a:solidFill>
@@ -6231,7 +6221,7 @@
         </p:nvCxnSpPr>
         <p:spPr>
           <a:xfrm flipV="1">
-            <a:off x="6782829" y="2254528"/>
+            <a:off x="5466419" y="2226851"/>
             <a:ext cx="0" cy="931953"/>
           </a:xfrm>
           <a:prstGeom prst="straightConnector1">
@@ -6272,7 +6262,7 @@
         </p:nvSpPr>
         <p:spPr>
           <a:xfrm>
-            <a:off x="4145844" y="2888879"/>
+            <a:off x="3195194" y="2861202"/>
             <a:ext cx="903676" cy="452964"/>
           </a:xfrm>
           <a:prstGeom prst="rect">
@@ -6333,7 +6323,7 @@
         </p:nvCxnSpPr>
         <p:spPr>
           <a:xfrm>
-            <a:off x="4572000" y="3869184"/>
+            <a:off x="3621350" y="3841507"/>
             <a:ext cx="0" cy="519936"/>
           </a:xfrm>
           <a:prstGeom prst="straightConnector1">
@@ -6374,7 +6364,7 @@
         </p:nvCxnSpPr>
         <p:spPr>
           <a:xfrm>
-            <a:off x="2294945" y="4959660"/>
+            <a:off x="1141095" y="4931983"/>
             <a:ext cx="4329978" cy="2131"/>
           </a:xfrm>
           <a:prstGeom prst="straightConnector1">
@@ -6415,7 +6405,7 @@
         </p:nvSpPr>
         <p:spPr>
           <a:xfrm>
-            <a:off x="6298420" y="4610486"/>
+            <a:off x="5144570" y="4582809"/>
             <a:ext cx="766317" cy="746839"/>
           </a:xfrm>
           <a:prstGeom prst="pentagon">
@@ -6478,7 +6468,7 @@
         </p:blipFill>
         <p:spPr>
           <a:xfrm>
-            <a:off x="6438543" y="5012591"/>
+            <a:off x="5284693" y="4984914"/>
             <a:ext cx="372759" cy="352662"/>
           </a:xfrm>
           <a:prstGeom prst="rect">
@@ -6498,7 +6488,7 @@
         </p:nvSpPr>
         <p:spPr>
           <a:xfrm>
-            <a:off x="3826933" y="4611664"/>
+            <a:off x="2673083" y="4583987"/>
             <a:ext cx="917834" cy="771765"/>
           </a:xfrm>
           <a:prstGeom prst="triangle">
@@ -6566,7 +6556,7 @@
         </p:blipFill>
         <p:spPr>
           <a:xfrm>
-            <a:off x="3986216" y="5027061"/>
+            <a:off x="2832366" y="4999384"/>
             <a:ext cx="355298" cy="314894"/>
           </a:xfrm>
           <a:prstGeom prst="rect">
@@ -6586,7 +6576,7 @@
         </p:nvSpPr>
         <p:spPr>
           <a:xfrm>
-            <a:off x="2896318" y="2825747"/>
+            <a:off x="1945668" y="2798070"/>
             <a:ext cx="1005020" cy="450955"/>
           </a:xfrm>
           <a:prstGeom prst="rect">
@@ -6651,7 +6641,7 @@
         </p:nvSpPr>
         <p:spPr>
           <a:xfrm>
-            <a:off x="1748634" y="2763180"/>
+            <a:off x="797984" y="2735503"/>
             <a:ext cx="1030817" cy="450955"/>
           </a:xfrm>
           <a:prstGeom prst="rect">
@@ -6720,7 +6710,7 @@
         </p:nvCxnSpPr>
         <p:spPr>
           <a:xfrm>
-            <a:off x="2774468" y="2254528"/>
+            <a:off x="1823818" y="2226851"/>
             <a:ext cx="0" cy="1159934"/>
           </a:xfrm>
           <a:prstGeom prst="straightConnector1">
@@ -6761,7 +6751,7 @@
         </p:nvCxnSpPr>
         <p:spPr>
           <a:xfrm>
-            <a:off x="3826933" y="2251725"/>
+            <a:off x="2876283" y="2224048"/>
             <a:ext cx="10540" cy="1145328"/>
           </a:xfrm>
           <a:prstGeom prst="straightConnector1">
@@ -6802,7 +6792,7 @@
         </p:nvCxnSpPr>
         <p:spPr>
           <a:xfrm flipV="1">
-            <a:off x="1562736" y="2251725"/>
+            <a:off x="612086" y="2224048"/>
             <a:ext cx="0" cy="1163830"/>
           </a:xfrm>
           <a:prstGeom prst="straightConnector1">
@@ -6843,7 +6833,7 @@
         </p:nvSpPr>
         <p:spPr>
           <a:xfrm>
-            <a:off x="578568" y="2754627"/>
+            <a:off x="-372082" y="2726950"/>
             <a:ext cx="1107941" cy="450955"/>
           </a:xfrm>
           <a:prstGeom prst="rect">
@@ -6884,13 +6874,6 @@
               </a:rPr>
               <a:t>Swap Recs</a:t>
             </a:r>
-            <a:endParaRPr lang="en-US" sz="1400" dirty="0" smtClean="0">
-              <a:solidFill>
-                <a:srgbClr val="000000"/>
-              </a:solidFill>
-              <a:latin typeface="Gill Sans"/>
-              <a:cs typeface="Gill Sans"/>
-            </a:endParaRPr>
           </a:p>
         </p:txBody>
       </p:sp>
@@ -6902,7 +6885,7 @@
         </p:nvSpPr>
         <p:spPr>
           <a:xfrm>
-            <a:off x="5856517" y="2621601"/>
+            <a:off x="4540107" y="2593924"/>
             <a:ext cx="1005020" cy="450955"/>
           </a:xfrm>
           <a:prstGeom prst="rect">
@@ -6954,7 +6937,7 @@
         </p:nvCxnSpPr>
         <p:spPr>
           <a:xfrm>
-            <a:off x="6909825" y="2224048"/>
+            <a:off x="5593415" y="2196371"/>
             <a:ext cx="0" cy="931953"/>
           </a:xfrm>
           <a:prstGeom prst="straightConnector1">
@@ -6995,7 +6978,7 @@
         </p:nvCxnSpPr>
         <p:spPr>
           <a:xfrm flipV="1">
-            <a:off x="6759034" y="3887285"/>
+            <a:off x="5442624" y="3859608"/>
             <a:ext cx="0" cy="481515"/>
           </a:xfrm>
           <a:prstGeom prst="straightConnector1">
@@ -7036,7 +7019,7 @@
         </p:nvCxnSpPr>
         <p:spPr>
           <a:xfrm>
-            <a:off x="6937516" y="3890496"/>
+            <a:off x="5621106" y="3862819"/>
             <a:ext cx="0" cy="498624"/>
           </a:xfrm>
           <a:prstGeom prst="straightConnector1">
@@ -7077,8 +7060,8 @@
         </p:nvCxnSpPr>
         <p:spPr>
           <a:xfrm flipH="1">
-            <a:off x="2051050" y="3890496"/>
-            <a:ext cx="259562" cy="750470"/>
+            <a:off x="963865" y="3862819"/>
+            <a:ext cx="396097" cy="750470"/>
           </a:xfrm>
           <a:prstGeom prst="straightConnector1">
             <a:avLst/>
@@ -7120,7 +7103,7 @@
         </p:nvCxnSpPr>
         <p:spPr>
           <a:xfrm>
-            <a:off x="3285541" y="3869184"/>
+            <a:off x="2131691" y="3841507"/>
             <a:ext cx="1000309" cy="742480"/>
           </a:xfrm>
           <a:prstGeom prst="straightConnector1">
@@ -7161,7 +7144,7 @@
         </p:nvSpPr>
         <p:spPr>
           <a:xfrm>
-            <a:off x="1537921" y="4659647"/>
+            <a:off x="384071" y="4631970"/>
             <a:ext cx="757024" cy="701625"/>
           </a:xfrm>
           <a:prstGeom prst="rect">
@@ -7233,7 +7216,7 @@
         </p:blipFill>
         <p:spPr>
           <a:xfrm>
-            <a:off x="1536658" y="5002105"/>
+            <a:off x="382808" y="4974428"/>
             <a:ext cx="364189" cy="386820"/>
           </a:xfrm>
           <a:prstGeom prst="rect">
@@ -7253,7 +7236,7 @@
         </p:nvSpPr>
         <p:spPr>
           <a:xfrm>
-            <a:off x="5651215" y="3145841"/>
+            <a:off x="4334805" y="3118164"/>
             <a:ext cx="2390224" cy="744655"/>
           </a:xfrm>
           <a:prstGeom prst="rect">
@@ -7320,7 +7303,7 @@
         </p:nvSpPr>
         <p:spPr>
           <a:xfrm>
-            <a:off x="5651215" y="1879600"/>
+            <a:off x="4334805" y="1851923"/>
             <a:ext cx="2390224" cy="374928"/>
           </a:xfrm>
           <a:prstGeom prst="rect">
@@ -7387,8 +7370,8 @@
         </p:nvSpPr>
         <p:spPr>
           <a:xfrm>
-            <a:off x="487680" y="5837765"/>
-            <a:ext cx="7553759" cy="512236"/>
+            <a:off x="-462970" y="5810088"/>
+            <a:ext cx="7187999" cy="512236"/>
           </a:xfrm>
           <a:prstGeom prst="rect">
             <a:avLst/>
@@ -7440,6 +7423,532 @@
                   <a:lumOff val="15000"/>
                 </a:schemeClr>
               </a:solidFill>
+              <a:latin typeface="Gill Sans"/>
+              <a:cs typeface="Gill Sans"/>
+            </a:endParaRPr>
+          </a:p>
+        </p:txBody>
+      </p:sp>
+      <p:sp>
+        <p:nvSpPr>
+          <p:cNvPr id="91" name="Rectangle 90"/>
+          <p:cNvSpPr/>
+          <p:nvPr/>
+        </p:nvSpPr>
+        <p:spPr>
+          <a:xfrm>
+            <a:off x="7093510" y="2164790"/>
+            <a:ext cx="418357" cy="354084"/>
+          </a:xfrm>
+          <a:prstGeom prst="rect">
+            <a:avLst/>
+          </a:prstGeom>
+          <a:solidFill>
+            <a:schemeClr val="tx1">
+              <a:lumMod val="50000"/>
+              <a:lumOff val="50000"/>
+            </a:schemeClr>
+          </a:solidFill>
+          <a:ln>
+            <a:noFill/>
+          </a:ln>
+          <a:effectLst/>
+        </p:spPr>
+        <p:style>
+          <a:lnRef idx="1">
+            <a:schemeClr val="accent1"/>
+          </a:lnRef>
+          <a:fillRef idx="3">
+            <a:schemeClr val="accent1"/>
+          </a:fillRef>
+          <a:effectRef idx="2">
+            <a:schemeClr val="accent1"/>
+          </a:effectRef>
+          <a:fontRef idx="minor">
+            <a:schemeClr val="lt1"/>
+          </a:fontRef>
+        </p:style>
+        <p:txBody>
+          <a:bodyPr rtlCol="0" anchor="ctr"/>
+          <a:lstStyle/>
+          <a:p>
+            <a:pPr algn="ctr"/>
+            <a:endParaRPr lang="en-US" sz="2000" dirty="0">
+              <a:solidFill>
+                <a:schemeClr val="tx1"/>
+              </a:solidFill>
+              <a:latin typeface="Gill Sans"/>
+              <a:cs typeface="Gill Sans"/>
+            </a:endParaRPr>
+          </a:p>
+        </p:txBody>
+      </p:sp>
+      <p:sp>
+        <p:nvSpPr>
+          <p:cNvPr id="92" name="Isosceles Triangle 91"/>
+          <p:cNvSpPr/>
+          <p:nvPr/>
+        </p:nvSpPr>
+        <p:spPr>
+          <a:xfrm>
+            <a:off x="7042709" y="2596613"/>
+            <a:ext cx="512583" cy="372445"/>
+          </a:xfrm>
+          <a:prstGeom prst="triangle">
+            <a:avLst/>
+          </a:prstGeom>
+          <a:solidFill>
+            <a:schemeClr val="tx1">
+              <a:lumMod val="50000"/>
+              <a:lumOff val="50000"/>
+            </a:schemeClr>
+          </a:solidFill>
+          <a:ln>
+            <a:noFill/>
+          </a:ln>
+          <a:effectLst/>
+        </p:spPr>
+        <p:style>
+          <a:lnRef idx="1">
+            <a:schemeClr val="accent1"/>
+          </a:lnRef>
+          <a:fillRef idx="3">
+            <a:schemeClr val="accent1"/>
+          </a:fillRef>
+          <a:effectRef idx="2">
+            <a:schemeClr val="accent1"/>
+          </a:effectRef>
+          <a:fontRef idx="minor">
+            <a:schemeClr val="lt1"/>
+          </a:fontRef>
+        </p:style>
+        <p:txBody>
+          <a:bodyPr rtlCol="0" anchor="ctr"/>
+          <a:lstStyle/>
+          <a:p>
+            <a:pPr algn="ctr"/>
+            <a:endParaRPr lang="en-US" sz="2000">
+              <a:latin typeface="Gill Sans"/>
+              <a:cs typeface="Gill Sans"/>
+            </a:endParaRPr>
+          </a:p>
+        </p:txBody>
+      </p:sp>
+      <p:sp>
+        <p:nvSpPr>
+          <p:cNvPr id="93" name="Regular Pentagon 92"/>
+          <p:cNvSpPr/>
+          <p:nvPr/>
+        </p:nvSpPr>
+        <p:spPr>
+          <a:xfrm>
+            <a:off x="7083350" y="3075212"/>
+            <a:ext cx="447884" cy="412373"/>
+          </a:xfrm>
+          <a:prstGeom prst="pentagon">
+            <a:avLst/>
+          </a:prstGeom>
+          <a:solidFill>
+            <a:schemeClr val="tx1">
+              <a:lumMod val="50000"/>
+              <a:lumOff val="50000"/>
+            </a:schemeClr>
+          </a:solidFill>
+          <a:ln>
+            <a:noFill/>
+          </a:ln>
+          <a:effectLst/>
+        </p:spPr>
+        <p:style>
+          <a:lnRef idx="1">
+            <a:schemeClr val="accent1"/>
+          </a:lnRef>
+          <a:fillRef idx="3">
+            <a:schemeClr val="accent1"/>
+          </a:fillRef>
+          <a:effectRef idx="2">
+            <a:schemeClr val="accent1"/>
+          </a:effectRef>
+          <a:fontRef idx="minor">
+            <a:schemeClr val="lt1"/>
+          </a:fontRef>
+        </p:style>
+        <p:txBody>
+          <a:bodyPr rtlCol="0" anchor="ctr"/>
+          <a:lstStyle/>
+          <a:p>
+            <a:pPr algn="ctr"/>
+            <a:endParaRPr lang="en-US" sz="2000">
+              <a:latin typeface="Gill Sans"/>
+              <a:cs typeface="Gill Sans"/>
+            </a:endParaRPr>
+          </a:p>
+        </p:txBody>
+      </p:sp>
+      <p:pic>
+        <p:nvPicPr>
+          <p:cNvPr id="94" name="Picture 93"/>
+          <p:cNvPicPr>
+            <a:picLocks noChangeAspect="1"/>
+          </p:cNvPicPr>
+          <p:nvPr/>
+        </p:nvPicPr>
+        <p:blipFill rotWithShape="1">
+          <a:blip r:embed="rId4"/>
+          <a:srcRect b="17662"/>
+          <a:stretch/>
+        </p:blipFill>
+        <p:spPr>
+          <a:xfrm>
+            <a:off x="7021285" y="5641312"/>
+            <a:ext cx="555841" cy="533947"/>
+          </a:xfrm>
+          <a:prstGeom prst="rect">
+            <a:avLst/>
+          </a:prstGeom>
+        </p:spPr>
+      </p:pic>
+      <p:pic>
+        <p:nvPicPr>
+          <p:cNvPr id="95" name="Picture 94" descr="noun_1248_cc.png"/>
+          <p:cNvPicPr>
+            <a:picLocks noChangeAspect="1"/>
+          </p:cNvPicPr>
+          <p:nvPr/>
+        </p:nvPicPr>
+        <p:blipFill rotWithShape="1">
+          <a:blip r:embed="rId5">
+            <a:extLst>
+              <a:ext uri="{28A0092B-C50C-407E-A947-70E740481C1C}">
+                <a14:useLocalDpi xmlns:a14="http://schemas.microsoft.com/office/drawing/2010/main" val="0"/>
+              </a:ext>
+            </a:extLst>
+          </a:blip>
+          <a:srcRect t="6796" b="21682"/>
+          <a:stretch/>
+        </p:blipFill>
+        <p:spPr>
+          <a:xfrm>
+            <a:off x="7042733" y="5187413"/>
+            <a:ext cx="512944" cy="428016"/>
+          </a:xfrm>
+          <a:prstGeom prst="rect">
+            <a:avLst/>
+          </a:prstGeom>
+        </p:spPr>
+      </p:pic>
+      <p:pic>
+        <p:nvPicPr>
+          <p:cNvPr id="99" name="Picture 98" descr="noun_5393.png"/>
+          <p:cNvPicPr>
+            <a:picLocks noChangeAspect="1"/>
+          </p:cNvPicPr>
+          <p:nvPr/>
+        </p:nvPicPr>
+        <p:blipFill>
+          <a:blip r:embed="rId6">
+            <a:extLst>
+              <a:ext uri="{28A0092B-C50C-407E-A947-70E740481C1C}">
+                <a14:useLocalDpi xmlns:a14="http://schemas.microsoft.com/office/drawing/2010/main" val="0"/>
+              </a:ext>
+            </a:extLst>
+          </a:blip>
+          <a:stretch>
+            <a:fillRect/>
+          </a:stretch>
+        </p:blipFill>
+        <p:spPr>
+          <a:xfrm>
+            <a:off x="7033923" y="4642833"/>
+            <a:ext cx="530564" cy="530564"/>
+          </a:xfrm>
+          <a:prstGeom prst="rect">
+            <a:avLst/>
+          </a:prstGeom>
+        </p:spPr>
+      </p:pic>
+      <p:sp>
+        <p:nvSpPr>
+          <p:cNvPr id="101" name="TextBox 100"/>
+          <p:cNvSpPr txBox="1"/>
+          <p:nvPr/>
+        </p:nvSpPr>
+        <p:spPr>
+          <a:xfrm>
+            <a:off x="7595821" y="2113441"/>
+            <a:ext cx="1258699" cy="369332"/>
+          </a:xfrm>
+          <a:prstGeom prst="rect">
+            <a:avLst/>
+          </a:prstGeom>
+          <a:noFill/>
+        </p:spPr>
+        <p:txBody>
+          <a:bodyPr wrap="square" rtlCol="0">
+            <a:spAutoFit/>
+          </a:bodyPr>
+          <a:lstStyle/>
+          <a:p>
+            <a:r>
+              <a:rPr lang="en-US" dirty="0" smtClean="0">
+                <a:latin typeface="Gill Sans"/>
+                <a:cs typeface="Gill Sans"/>
+              </a:rPr>
+              <a:t>Sampling</a:t>
+            </a:r>
+            <a:endParaRPr lang="en-US" dirty="0">
+              <a:latin typeface="Gill Sans"/>
+              <a:cs typeface="Gill Sans"/>
+            </a:endParaRPr>
+          </a:p>
+        </p:txBody>
+      </p:sp>
+      <p:sp>
+        <p:nvSpPr>
+          <p:cNvPr id="102" name="TextBox 101"/>
+          <p:cNvSpPr txBox="1"/>
+          <p:nvPr/>
+        </p:nvSpPr>
+        <p:spPr>
+          <a:xfrm>
+            <a:off x="7595821" y="2624675"/>
+            <a:ext cx="1689734" cy="369332"/>
+          </a:xfrm>
+          <a:prstGeom prst="rect">
+            <a:avLst/>
+          </a:prstGeom>
+          <a:noFill/>
+        </p:spPr>
+        <p:txBody>
+          <a:bodyPr wrap="square" rtlCol="0">
+            <a:spAutoFit/>
+          </a:bodyPr>
+          <a:lstStyle/>
+          <a:p>
+            <a:r>
+              <a:rPr lang="en-US" dirty="0" smtClean="0">
+                <a:latin typeface="Gill Sans"/>
+                <a:cs typeface="Gill Sans"/>
+              </a:rPr>
+              <a:t>Similarity Join</a:t>
+            </a:r>
+            <a:endParaRPr lang="en-US" dirty="0">
+              <a:latin typeface="Gill Sans"/>
+              <a:cs typeface="Gill Sans"/>
+            </a:endParaRPr>
+          </a:p>
+        </p:txBody>
+      </p:sp>
+      <p:sp>
+        <p:nvSpPr>
+          <p:cNvPr id="103" name="TextBox 102"/>
+          <p:cNvSpPr txBox="1"/>
+          <p:nvPr/>
+        </p:nvSpPr>
+        <p:spPr>
+          <a:xfrm>
+            <a:off x="7595821" y="3104917"/>
+            <a:ext cx="1258699" cy="369332"/>
+          </a:xfrm>
+          <a:prstGeom prst="rect">
+            <a:avLst/>
+          </a:prstGeom>
+          <a:noFill/>
+        </p:spPr>
+        <p:txBody>
+          <a:bodyPr wrap="square" rtlCol="0">
+            <a:spAutoFit/>
+          </a:bodyPr>
+          <a:lstStyle/>
+          <a:p>
+            <a:r>
+              <a:rPr lang="en-US" dirty="0" smtClean="0">
+                <a:latin typeface="Gill Sans"/>
+                <a:cs typeface="Gill Sans"/>
+              </a:rPr>
+              <a:t>Filtering</a:t>
+            </a:r>
+            <a:endParaRPr lang="en-US" dirty="0">
+              <a:latin typeface="Gill Sans"/>
+              <a:cs typeface="Gill Sans"/>
+            </a:endParaRPr>
+          </a:p>
+        </p:txBody>
+      </p:sp>
+      <p:sp>
+        <p:nvSpPr>
+          <p:cNvPr id="105" name="TextBox 104"/>
+          <p:cNvSpPr txBox="1"/>
+          <p:nvPr/>
+        </p:nvSpPr>
+        <p:spPr>
+          <a:xfrm>
+            <a:off x="7595821" y="4694081"/>
+            <a:ext cx="1450847" cy="369332"/>
+          </a:xfrm>
+          <a:prstGeom prst="rect">
+            <a:avLst/>
+          </a:prstGeom>
+          <a:noFill/>
+        </p:spPr>
+        <p:txBody>
+          <a:bodyPr wrap="square" rtlCol="0">
+            <a:spAutoFit/>
+          </a:bodyPr>
+          <a:lstStyle/>
+          <a:p>
+            <a:r>
+              <a:rPr lang="en-US" dirty="0" smtClean="0">
+                <a:latin typeface="Gill Sans"/>
+                <a:cs typeface="Gill Sans"/>
+              </a:rPr>
+              <a:t>Rule-based</a:t>
+            </a:r>
+            <a:endParaRPr lang="en-US" dirty="0">
+              <a:latin typeface="Gill Sans"/>
+              <a:cs typeface="Gill Sans"/>
+            </a:endParaRPr>
+          </a:p>
+        </p:txBody>
+      </p:sp>
+      <p:sp>
+        <p:nvSpPr>
+          <p:cNvPr id="106" name="TextBox 105"/>
+          <p:cNvSpPr txBox="1"/>
+          <p:nvPr/>
+        </p:nvSpPr>
+        <p:spPr>
+          <a:xfrm>
+            <a:off x="7595821" y="5215319"/>
+            <a:ext cx="1792486" cy="369332"/>
+          </a:xfrm>
+          <a:prstGeom prst="rect">
+            <a:avLst/>
+          </a:prstGeom>
+          <a:noFill/>
+        </p:spPr>
+        <p:txBody>
+          <a:bodyPr wrap="square" rtlCol="0">
+            <a:spAutoFit/>
+          </a:bodyPr>
+          <a:lstStyle/>
+          <a:p>
+            <a:r>
+              <a:rPr lang="en-US" dirty="0" smtClean="0">
+                <a:latin typeface="Gill Sans"/>
+                <a:cs typeface="Gill Sans"/>
+              </a:rPr>
+              <a:t>Learning-based</a:t>
+            </a:r>
+            <a:endParaRPr lang="en-US" dirty="0">
+              <a:latin typeface="Gill Sans"/>
+              <a:cs typeface="Gill Sans"/>
+            </a:endParaRPr>
+          </a:p>
+        </p:txBody>
+      </p:sp>
+      <p:sp>
+        <p:nvSpPr>
+          <p:cNvPr id="107" name="TextBox 106"/>
+          <p:cNvSpPr txBox="1"/>
+          <p:nvPr/>
+        </p:nvSpPr>
+        <p:spPr>
+          <a:xfrm>
+            <a:off x="7595821" y="5731604"/>
+            <a:ext cx="1792486" cy="369332"/>
+          </a:xfrm>
+          <a:prstGeom prst="rect">
+            <a:avLst/>
+          </a:prstGeom>
+          <a:noFill/>
+        </p:spPr>
+        <p:txBody>
+          <a:bodyPr wrap="square" rtlCol="0">
+            <a:spAutoFit/>
+          </a:bodyPr>
+          <a:lstStyle/>
+          <a:p>
+            <a:r>
+              <a:rPr lang="en-US" dirty="0" smtClean="0">
+                <a:latin typeface="Gill Sans"/>
+                <a:cs typeface="Gill Sans"/>
+              </a:rPr>
+              <a:t>Crowd-based</a:t>
+            </a:r>
+            <a:endParaRPr lang="en-US" dirty="0">
+              <a:latin typeface="Gill Sans"/>
+              <a:cs typeface="Gill Sans"/>
+            </a:endParaRPr>
+          </a:p>
+        </p:txBody>
+      </p:sp>
+      <p:sp>
+        <p:nvSpPr>
+          <p:cNvPr id="108" name="TextBox 107"/>
+          <p:cNvSpPr txBox="1"/>
+          <p:nvPr/>
+        </p:nvSpPr>
+        <p:spPr>
+          <a:xfrm>
+            <a:off x="6986369" y="1587982"/>
+            <a:ext cx="2060299" cy="415498"/>
+          </a:xfrm>
+          <a:prstGeom prst="rect">
+            <a:avLst/>
+          </a:prstGeom>
+          <a:noFill/>
+        </p:spPr>
+        <p:txBody>
+          <a:bodyPr wrap="square" rtlCol="0">
+            <a:spAutoFit/>
+          </a:bodyPr>
+          <a:lstStyle/>
+          <a:p>
+            <a:r>
+              <a:rPr lang="en-US" sz="2000" dirty="0" smtClean="0">
+                <a:latin typeface="Gill Sans"/>
+                <a:cs typeface="Gill Sans"/>
+              </a:rPr>
+              <a:t>Logical Operators</a:t>
+            </a:r>
+            <a:endParaRPr lang="en-US" sz="2000" dirty="0">
+              <a:latin typeface="Gill Sans"/>
+              <a:cs typeface="Gill Sans"/>
+            </a:endParaRPr>
+          </a:p>
+        </p:txBody>
+      </p:sp>
+      <p:sp>
+        <p:nvSpPr>
+          <p:cNvPr id="110" name="TextBox 109"/>
+          <p:cNvSpPr txBox="1"/>
+          <p:nvPr/>
+        </p:nvSpPr>
+        <p:spPr>
+          <a:xfrm>
+            <a:off x="6986369" y="4238859"/>
+            <a:ext cx="2149605" cy="415498"/>
+          </a:xfrm>
+          <a:prstGeom prst="rect">
+            <a:avLst/>
+          </a:prstGeom>
+          <a:noFill/>
+        </p:spPr>
+        <p:txBody>
+          <a:bodyPr wrap="square" rtlCol="0">
+            <a:spAutoFit/>
+          </a:bodyPr>
+          <a:lstStyle/>
+          <a:p>
+            <a:r>
+              <a:rPr lang="en-US" sz="2000" dirty="0" smtClean="0">
+                <a:latin typeface="Gill Sans"/>
+                <a:cs typeface="Gill Sans"/>
+              </a:rPr>
+              <a:t>Physical Operators</a:t>
+            </a:r>
+            <a:endParaRPr lang="en-US" sz="2000" dirty="0">
               <a:latin typeface="Gill Sans"/>
               <a:cs typeface="Gill Sans"/>
             </a:endParaRPr>
@@ -7483,636 +7992,538 @@
           <a:chExt cx="0" cy="0"/>
         </a:xfrm>
       </p:grpSpPr>
-      <p:grpSp>
-        <p:nvGrpSpPr>
-          <p:cNvPr id="25" name="Group 24"/>
-          <p:cNvGrpSpPr/>
+      <p:sp>
+        <p:nvSpPr>
+          <p:cNvPr id="14" name="Rectangle 13"/>
+          <p:cNvSpPr/>
           <p:nvPr/>
-        </p:nvGrpSpPr>
-        <p:grpSpPr>
-          <a:xfrm>
-            <a:off x="1537631" y="1662577"/>
-            <a:ext cx="6068739" cy="3532847"/>
-            <a:chOff x="508251" y="2835056"/>
-            <a:chExt cx="6068739" cy="3532847"/>
-          </a:xfrm>
-        </p:grpSpPr>
-        <p:grpSp>
-          <p:nvGrpSpPr>
-            <p:cNvPr id="22" name="Group 21"/>
-            <p:cNvGrpSpPr/>
-            <p:nvPr/>
-          </p:nvGrpSpPr>
-          <p:grpSpPr>
-            <a:xfrm>
-              <a:off x="508251" y="2835056"/>
-              <a:ext cx="6068739" cy="3532847"/>
-              <a:chOff x="508251" y="277468"/>
-              <a:chExt cx="6068739" cy="3532847"/>
-            </a:xfrm>
-          </p:grpSpPr>
-          <p:grpSp>
-            <p:nvGrpSpPr>
-              <p:cNvPr id="4" name="Group 3"/>
-              <p:cNvGrpSpPr/>
-              <p:nvPr/>
-            </p:nvGrpSpPr>
-            <p:grpSpPr>
-              <a:xfrm>
-                <a:off x="508251" y="277468"/>
-                <a:ext cx="6068739" cy="3532847"/>
-                <a:chOff x="508251" y="-1442436"/>
-                <a:chExt cx="6068739" cy="3532847"/>
-              </a:xfrm>
-            </p:grpSpPr>
-            <p:grpSp>
-              <p:nvGrpSpPr>
-                <p:cNvPr id="5" name="Group 4"/>
-                <p:cNvGrpSpPr/>
-                <p:nvPr/>
-              </p:nvGrpSpPr>
-              <p:grpSpPr>
-                <a:xfrm>
-                  <a:off x="508251" y="-1442436"/>
-                  <a:ext cx="6068739" cy="3532847"/>
-                  <a:chOff x="-1098799" y="-1857804"/>
-                  <a:chExt cx="6068739" cy="3532847"/>
-                </a:xfrm>
-              </p:grpSpPr>
-              <p:sp>
-                <p:nvSpPr>
-                  <p:cNvPr id="13" name="Rectangle 12"/>
-                  <p:cNvSpPr/>
-                  <p:nvPr/>
-                </p:nvSpPr>
-                <p:spPr>
-                  <a:xfrm>
-                    <a:off x="-1098799" y="-1857804"/>
-                    <a:ext cx="6068739" cy="3532847"/>
-                  </a:xfrm>
-                  <a:prstGeom prst="rect">
-                    <a:avLst/>
-                  </a:prstGeom>
-                  <a:noFill/>
-                  <a:ln>
-                    <a:solidFill>
-                      <a:schemeClr val="tx1"/>
-                    </a:solidFill>
-                  </a:ln>
-                  <a:effectLst/>
-                </p:spPr>
-                <p:style>
-                  <a:lnRef idx="1">
-                    <a:schemeClr val="accent1"/>
-                  </a:lnRef>
-                  <a:fillRef idx="3">
-                    <a:schemeClr val="accent1"/>
-                  </a:fillRef>
-                  <a:effectRef idx="2">
-                    <a:schemeClr val="accent1"/>
-                  </a:effectRef>
-                  <a:fontRef idx="minor">
-                    <a:schemeClr val="lt1"/>
-                  </a:fontRef>
-                </p:style>
-                <p:txBody>
-                  <a:bodyPr rtlCol="0" anchor="ctr"/>
-                  <a:lstStyle/>
-                  <a:p>
-                    <a:pPr algn="ctr"/>
-                    <a:endParaRPr lang="en-US" sz="2000" dirty="0">
-                      <a:solidFill>
-                        <a:schemeClr val="tx1"/>
-                      </a:solidFill>
-                      <a:latin typeface="Bariol Regular"/>
-                      <a:cs typeface="Bariol Regular"/>
-                    </a:endParaRPr>
-                  </a:p>
-                </p:txBody>
-              </p:sp>
-              <p:sp>
-                <p:nvSpPr>
-                  <p:cNvPr id="14" name="Rectangle 13"/>
-                  <p:cNvSpPr/>
-                  <p:nvPr/>
-                </p:nvSpPr>
-                <p:spPr>
-                  <a:xfrm>
-                    <a:off x="-966252" y="-1204349"/>
-                    <a:ext cx="910610" cy="770712"/>
-                  </a:xfrm>
-                  <a:prstGeom prst="rect">
-                    <a:avLst/>
-                  </a:prstGeom>
-                  <a:noFill/>
-                  <a:ln>
-                    <a:solidFill>
-                      <a:schemeClr val="tx1"/>
-                    </a:solidFill>
-                  </a:ln>
-                  <a:effectLst/>
-                </p:spPr>
-                <p:style>
-                  <a:lnRef idx="1">
-                    <a:schemeClr val="accent1"/>
-                  </a:lnRef>
-                  <a:fillRef idx="3">
-                    <a:schemeClr val="accent1"/>
-                  </a:fillRef>
-                  <a:effectRef idx="2">
-                    <a:schemeClr val="accent1"/>
-                  </a:effectRef>
-                  <a:fontRef idx="minor">
-                    <a:schemeClr val="lt1"/>
-                  </a:fontRef>
-                </p:style>
-                <p:txBody>
-                  <a:bodyPr rtlCol="0" anchor="ctr"/>
-                  <a:lstStyle/>
-                  <a:p>
-                    <a:pPr algn="ctr"/>
-                    <a:endParaRPr lang="en-US" sz="2000" dirty="0">
-                      <a:solidFill>
-                        <a:schemeClr val="tx1"/>
-                      </a:solidFill>
-                      <a:latin typeface="Bariol Regular"/>
-                      <a:cs typeface="Bariol Regular"/>
-                    </a:endParaRPr>
-                  </a:p>
-                </p:txBody>
-              </p:sp>
-            </p:grpSp>
-            <p:sp>
-              <p:nvSpPr>
-                <p:cNvPr id="6" name="Isosceles Triangle 5"/>
-                <p:cNvSpPr/>
-                <p:nvPr/>
-              </p:nvSpPr>
-              <p:spPr>
-                <a:xfrm>
-                  <a:off x="606095" y="141130"/>
-                  <a:ext cx="1060704" cy="770712"/>
-                </a:xfrm>
-                <a:prstGeom prst="triangle">
-                  <a:avLst/>
-                </a:prstGeom>
-                <a:noFill/>
-                <a:ln>
-                  <a:solidFill>
-                    <a:schemeClr val="tx1"/>
-                  </a:solidFill>
-                </a:ln>
-                <a:effectLst/>
-              </p:spPr>
-              <p:style>
-                <a:lnRef idx="1">
-                  <a:schemeClr val="accent1"/>
-                </a:lnRef>
-                <a:fillRef idx="3">
-                  <a:schemeClr val="accent1"/>
-                </a:fillRef>
-                <a:effectRef idx="2">
-                  <a:schemeClr val="accent1"/>
-                </a:effectRef>
-                <a:fontRef idx="minor">
-                  <a:schemeClr val="lt1"/>
-                </a:fontRef>
-              </p:style>
-              <p:txBody>
-                <a:bodyPr rtlCol="0" anchor="ctr"/>
-                <a:lstStyle/>
-                <a:p>
-                  <a:pPr algn="ctr"/>
-                  <a:endParaRPr lang="en-US" sz="2000">
-                    <a:latin typeface="Bariol Regular"/>
-                    <a:cs typeface="Bariol Regular"/>
-                  </a:endParaRPr>
-                </a:p>
-              </p:txBody>
-            </p:sp>
-            <p:sp>
-              <p:nvSpPr>
-                <p:cNvPr id="7" name="Regular Pentagon 6"/>
-                <p:cNvSpPr/>
-                <p:nvPr/>
-              </p:nvSpPr>
-              <p:spPr>
-                <a:xfrm>
-                  <a:off x="680803" y="1127729"/>
-                  <a:ext cx="837081" cy="770712"/>
-                </a:xfrm>
-                <a:prstGeom prst="pentagon">
-                  <a:avLst/>
-                </a:prstGeom>
-                <a:solidFill>
-                  <a:srgbClr val="FFFFFF"/>
-                </a:solidFill>
-                <a:ln>
-                  <a:solidFill>
-                    <a:srgbClr val="000000"/>
-                  </a:solidFill>
-                </a:ln>
-                <a:effectLst/>
-              </p:spPr>
-              <p:style>
-                <a:lnRef idx="1">
-                  <a:schemeClr val="accent1"/>
-                </a:lnRef>
-                <a:fillRef idx="3">
-                  <a:schemeClr val="accent1"/>
-                </a:fillRef>
-                <a:effectRef idx="2">
-                  <a:schemeClr val="accent1"/>
-                </a:effectRef>
-                <a:fontRef idx="minor">
-                  <a:schemeClr val="lt1"/>
-                </a:fontRef>
-              </p:style>
-              <p:txBody>
-                <a:bodyPr rtlCol="0" anchor="ctr"/>
-                <a:lstStyle/>
-                <a:p>
-                  <a:pPr algn="ctr"/>
-                  <a:endParaRPr lang="en-US" sz="2000">
-                    <a:latin typeface="Bariol Regular"/>
-                    <a:cs typeface="Bariol Regular"/>
-                  </a:endParaRPr>
-                </a:p>
-              </p:txBody>
-            </p:sp>
-            <p:pic>
-              <p:nvPicPr>
-                <p:cNvPr id="10" name="Picture 9"/>
-                <p:cNvPicPr>
-                  <a:picLocks noChangeAspect="1"/>
-                </p:cNvPicPr>
-                <p:nvPr/>
-              </p:nvPicPr>
-              <p:blipFill rotWithShape="1">
-                <a:blip r:embed="rId2"/>
-                <a:srcRect b="17662"/>
-                <a:stretch/>
-              </p:blipFill>
-              <p:spPr>
-                <a:xfrm>
-                  <a:off x="3705589" y="1127729"/>
-                  <a:ext cx="917278" cy="881148"/>
-                </a:xfrm>
-                <a:prstGeom prst="rect">
-                  <a:avLst/>
-                </a:prstGeom>
-              </p:spPr>
-            </p:pic>
-            <p:pic>
-              <p:nvPicPr>
-                <p:cNvPr id="11" name="Picture 10" descr="noun_1248_cc.png"/>
-                <p:cNvPicPr>
-                  <a:picLocks noChangeAspect="1"/>
-                </p:cNvPicPr>
-                <p:nvPr/>
-              </p:nvPicPr>
-              <p:blipFill rotWithShape="1">
-                <a:blip r:embed="rId3">
-                  <a:extLst>
-                    <a:ext uri="{28A0092B-C50C-407E-A947-70E740481C1C}">
-                      <a14:useLocalDpi xmlns:a14="http://schemas.microsoft.com/office/drawing/2010/main" val="0"/>
-                    </a:ext>
-                  </a:extLst>
-                </a:blip>
-                <a:srcRect t="6796" b="21682"/>
-                <a:stretch/>
-              </p:blipFill>
-              <p:spPr>
-                <a:xfrm>
-                  <a:off x="3732085" y="141130"/>
-                  <a:ext cx="846488" cy="706336"/>
-                </a:xfrm>
-                <a:prstGeom prst="rect">
-                  <a:avLst/>
-                </a:prstGeom>
-              </p:spPr>
-            </p:pic>
-            <p:pic>
-              <p:nvPicPr>
-                <p:cNvPr id="12" name="Picture 11" descr="noun_5393.png"/>
-                <p:cNvPicPr>
-                  <a:picLocks noChangeAspect="1"/>
-                </p:cNvPicPr>
-                <p:nvPr/>
-              </p:nvPicPr>
-              <p:blipFill>
-                <a:blip r:embed="rId4">
-                  <a:extLst>
-                    <a:ext uri="{28A0092B-C50C-407E-A947-70E740481C1C}">
-                      <a14:useLocalDpi xmlns:a14="http://schemas.microsoft.com/office/drawing/2010/main" val="0"/>
-                    </a:ext>
-                  </a:extLst>
-                </a:blip>
-                <a:stretch>
-                  <a:fillRect/>
-                </a:stretch>
-              </p:blipFill>
-              <p:spPr>
-                <a:xfrm>
-                  <a:off x="3755829" y="-893834"/>
-                  <a:ext cx="875565" cy="875565"/>
-                </a:xfrm>
-                <a:prstGeom prst="rect">
-                  <a:avLst/>
-                </a:prstGeom>
-              </p:spPr>
-            </p:pic>
-          </p:grpSp>
-          <p:sp>
-            <p:nvSpPr>
-              <p:cNvPr id="16" name="TextBox 15"/>
-              <p:cNvSpPr txBox="1"/>
-              <p:nvPr/>
-            </p:nvSpPr>
-            <p:spPr>
-              <a:xfrm>
-                <a:off x="1666799" y="1134022"/>
-                <a:ext cx="1258699" cy="400110"/>
-              </a:xfrm>
-              <a:prstGeom prst="rect">
-                <a:avLst/>
-              </a:prstGeom>
-              <a:noFill/>
-            </p:spPr>
-            <p:txBody>
-              <a:bodyPr wrap="square" rtlCol="0">
-                <a:spAutoFit/>
-              </a:bodyPr>
-              <a:lstStyle/>
-              <a:p>
-                <a:r>
-                  <a:rPr lang="en-US" sz="2000" dirty="0" smtClean="0">
-                    <a:latin typeface="Bariol Regular"/>
-                    <a:cs typeface="Bariol Regular"/>
-                  </a:rPr>
-                  <a:t>Sampling</a:t>
-                </a:r>
-                <a:endParaRPr lang="en-US" sz="2000" dirty="0">
-                  <a:latin typeface="Bariol Regular"/>
-                  <a:cs typeface="Bariol Regular"/>
-                </a:endParaRPr>
-              </a:p>
-            </p:txBody>
-          </p:sp>
-          <p:sp>
-            <p:nvSpPr>
-              <p:cNvPr id="17" name="TextBox 16"/>
-              <p:cNvSpPr txBox="1"/>
-              <p:nvPr/>
-            </p:nvSpPr>
-            <p:spPr>
-              <a:xfrm>
-                <a:off x="1666799" y="2000856"/>
-                <a:ext cx="1689734" cy="400110"/>
-              </a:xfrm>
-              <a:prstGeom prst="rect">
-                <a:avLst/>
-              </a:prstGeom>
-              <a:noFill/>
-            </p:spPr>
-            <p:txBody>
-              <a:bodyPr wrap="square" rtlCol="0">
-                <a:spAutoFit/>
-              </a:bodyPr>
-              <a:lstStyle/>
-              <a:p>
-                <a:r>
-                  <a:rPr lang="en-US" sz="2000" dirty="0" smtClean="0">
-                    <a:latin typeface="Bariol Regular"/>
-                    <a:cs typeface="Bariol Regular"/>
-                  </a:rPr>
-                  <a:t>Similarity Join</a:t>
-                </a:r>
-                <a:endParaRPr lang="en-US" sz="2000" dirty="0">
-                  <a:latin typeface="Bariol Regular"/>
-                  <a:cs typeface="Bariol Regular"/>
-                </a:endParaRPr>
-              </a:p>
-            </p:txBody>
-          </p:sp>
-          <p:sp>
-            <p:nvSpPr>
-              <p:cNvPr id="18" name="TextBox 17"/>
-              <p:cNvSpPr txBox="1"/>
-              <p:nvPr/>
-            </p:nvSpPr>
-            <p:spPr>
-              <a:xfrm>
-                <a:off x="1666799" y="3100858"/>
-                <a:ext cx="1258699" cy="400110"/>
-              </a:xfrm>
-              <a:prstGeom prst="rect">
-                <a:avLst/>
-              </a:prstGeom>
-              <a:noFill/>
-            </p:spPr>
-            <p:txBody>
-              <a:bodyPr wrap="square" rtlCol="0">
-                <a:spAutoFit/>
-              </a:bodyPr>
-              <a:lstStyle/>
-              <a:p>
-                <a:r>
-                  <a:rPr lang="en-US" sz="2000" dirty="0" smtClean="0">
-                    <a:latin typeface="Bariol Regular"/>
-                    <a:cs typeface="Bariol Regular"/>
-                  </a:rPr>
-                  <a:t>Filtering</a:t>
-                </a:r>
-                <a:endParaRPr lang="en-US" sz="2000" dirty="0">
-                  <a:latin typeface="Bariol Regular"/>
-                  <a:cs typeface="Bariol Regular"/>
-                </a:endParaRPr>
-              </a:p>
-            </p:txBody>
-          </p:sp>
-          <p:sp>
-            <p:nvSpPr>
-              <p:cNvPr id="19" name="TextBox 18"/>
-              <p:cNvSpPr txBox="1"/>
-              <p:nvPr/>
-            </p:nvSpPr>
-            <p:spPr>
-              <a:xfrm>
-                <a:off x="4784504" y="1134022"/>
-                <a:ext cx="1450847" cy="400110"/>
-              </a:xfrm>
-              <a:prstGeom prst="rect">
-                <a:avLst/>
-              </a:prstGeom>
-              <a:noFill/>
-            </p:spPr>
-            <p:txBody>
-              <a:bodyPr wrap="square" rtlCol="0">
-                <a:spAutoFit/>
-              </a:bodyPr>
-              <a:lstStyle/>
-              <a:p>
-                <a:r>
-                  <a:rPr lang="en-US" sz="2000" dirty="0" smtClean="0">
-                    <a:latin typeface="Bariol Regular"/>
-                    <a:cs typeface="Bariol Regular"/>
-                  </a:rPr>
-                  <a:t>Rule-based</a:t>
-                </a:r>
-                <a:endParaRPr lang="en-US" sz="2000" dirty="0">
-                  <a:latin typeface="Bariol Regular"/>
-                  <a:cs typeface="Bariol Regular"/>
-                </a:endParaRPr>
-              </a:p>
-            </p:txBody>
-          </p:sp>
-          <p:sp>
-            <p:nvSpPr>
-              <p:cNvPr id="20" name="TextBox 19"/>
-              <p:cNvSpPr txBox="1"/>
-              <p:nvPr/>
-            </p:nvSpPr>
-            <p:spPr>
-              <a:xfrm>
-                <a:off x="4784504" y="2000856"/>
-                <a:ext cx="1792486" cy="400110"/>
-              </a:xfrm>
-              <a:prstGeom prst="rect">
-                <a:avLst/>
-              </a:prstGeom>
-              <a:noFill/>
-            </p:spPr>
-            <p:txBody>
-              <a:bodyPr wrap="square" rtlCol="0">
-                <a:spAutoFit/>
-              </a:bodyPr>
-              <a:lstStyle/>
-              <a:p>
-                <a:r>
-                  <a:rPr lang="en-US" sz="2000" dirty="0" smtClean="0">
-                    <a:latin typeface="Bariol Regular"/>
-                    <a:cs typeface="Bariol Regular"/>
-                  </a:rPr>
-                  <a:t>Learning-based</a:t>
-                </a:r>
-                <a:endParaRPr lang="en-US" sz="2000" dirty="0">
-                  <a:latin typeface="Bariol Regular"/>
-                  <a:cs typeface="Bariol Regular"/>
-                </a:endParaRPr>
-              </a:p>
-            </p:txBody>
-          </p:sp>
-          <p:sp>
-            <p:nvSpPr>
-              <p:cNvPr id="21" name="TextBox 20"/>
-              <p:cNvSpPr txBox="1"/>
-              <p:nvPr/>
-            </p:nvSpPr>
-            <p:spPr>
-              <a:xfrm>
-                <a:off x="4784504" y="3100858"/>
-                <a:ext cx="1792486" cy="400110"/>
-              </a:xfrm>
-              <a:prstGeom prst="rect">
-                <a:avLst/>
-              </a:prstGeom>
-              <a:noFill/>
-            </p:spPr>
-            <p:txBody>
-              <a:bodyPr wrap="square" rtlCol="0">
-                <a:spAutoFit/>
-              </a:bodyPr>
-              <a:lstStyle/>
-              <a:p>
-                <a:r>
-                  <a:rPr lang="en-US" sz="2000" dirty="0" smtClean="0">
-                    <a:latin typeface="Bariol Regular"/>
-                    <a:cs typeface="Bariol Regular"/>
-                  </a:rPr>
-                  <a:t>Crowd-based</a:t>
-                </a:r>
-                <a:endParaRPr lang="en-US" sz="2000" dirty="0">
-                  <a:latin typeface="Bariol Regular"/>
-                  <a:cs typeface="Bariol Regular"/>
-                </a:endParaRPr>
-              </a:p>
-            </p:txBody>
-          </p:sp>
-        </p:grpSp>
-        <p:sp>
-          <p:nvSpPr>
-            <p:cNvPr id="23" name="TextBox 22"/>
-            <p:cNvSpPr txBox="1"/>
-            <p:nvPr/>
-          </p:nvSpPr>
-          <p:spPr>
-            <a:xfrm>
-              <a:off x="1265073" y="2922311"/>
-              <a:ext cx="1258699" cy="400110"/>
-            </a:xfrm>
-            <a:prstGeom prst="rect">
-              <a:avLst/>
-            </a:prstGeom>
-            <a:noFill/>
-          </p:spPr>
-          <p:txBody>
-            <a:bodyPr wrap="square" rtlCol="0">
-              <a:spAutoFit/>
-            </a:bodyPr>
-            <a:lstStyle/>
-            <a:p>
-              <a:r>
-                <a:rPr lang="en-US" sz="2000" u="sng" dirty="0" smtClean="0">
-                  <a:latin typeface="Bariol Regular"/>
-                  <a:cs typeface="Bariol Regular"/>
-                </a:rPr>
-                <a:t>Operators</a:t>
-              </a:r>
-              <a:endParaRPr lang="en-US" sz="2000" u="sng" dirty="0">
-                <a:latin typeface="Bariol Regular"/>
-                <a:cs typeface="Bariol Regular"/>
-              </a:endParaRPr>
-            </a:p>
-          </p:txBody>
-        </p:sp>
-        <p:sp>
-          <p:nvSpPr>
-            <p:cNvPr id="24" name="TextBox 23"/>
-            <p:cNvSpPr txBox="1"/>
-            <p:nvPr/>
-          </p:nvSpPr>
-          <p:spPr>
-            <a:xfrm>
-              <a:off x="4286393" y="2922311"/>
-              <a:ext cx="1927792" cy="400110"/>
-            </a:xfrm>
-            <a:prstGeom prst="rect">
-              <a:avLst/>
-            </a:prstGeom>
-            <a:noFill/>
-          </p:spPr>
-          <p:txBody>
-            <a:bodyPr wrap="square" rtlCol="0">
-              <a:spAutoFit/>
-            </a:bodyPr>
-            <a:lstStyle/>
-            <a:p>
-              <a:r>
-                <a:rPr lang="en-US" sz="2000" u="sng" dirty="0" smtClean="0">
-                  <a:latin typeface="Bariol Regular"/>
-                  <a:cs typeface="Bariol Regular"/>
-                </a:rPr>
-                <a:t>Implementations</a:t>
-              </a:r>
-              <a:endParaRPr lang="en-US" sz="2000" u="sng" dirty="0">
-                <a:latin typeface="Bariol Regular"/>
-                <a:cs typeface="Bariol Regular"/>
-              </a:endParaRPr>
-            </a:p>
-          </p:txBody>
-        </p:sp>
-      </p:grpSp>
+        </p:nvSpPr>
+        <p:spPr>
+          <a:xfrm>
+            <a:off x="2132908" y="2346960"/>
+            <a:ext cx="418357" cy="354084"/>
+          </a:xfrm>
+          <a:prstGeom prst="rect">
+            <a:avLst/>
+          </a:prstGeom>
+          <a:solidFill>
+            <a:schemeClr val="tx1">
+              <a:lumMod val="50000"/>
+              <a:lumOff val="50000"/>
+            </a:schemeClr>
+          </a:solidFill>
+          <a:ln>
+            <a:solidFill>
+              <a:srgbClr val="FFFFFF"/>
+            </a:solidFill>
+          </a:ln>
+          <a:effectLst/>
+        </p:spPr>
+        <p:style>
+          <a:lnRef idx="1">
+            <a:schemeClr val="accent1"/>
+          </a:lnRef>
+          <a:fillRef idx="3">
+            <a:schemeClr val="accent1"/>
+          </a:fillRef>
+          <a:effectRef idx="2">
+            <a:schemeClr val="accent1"/>
+          </a:effectRef>
+          <a:fontRef idx="minor">
+            <a:schemeClr val="lt1"/>
+          </a:fontRef>
+        </p:style>
+        <p:txBody>
+          <a:bodyPr rtlCol="0" anchor="ctr"/>
+          <a:lstStyle/>
+          <a:p>
+            <a:pPr algn="ctr"/>
+            <a:endParaRPr lang="en-US" sz="2000" dirty="0">
+              <a:solidFill>
+                <a:schemeClr val="tx1"/>
+              </a:solidFill>
+              <a:latin typeface="Gill Sans"/>
+              <a:cs typeface="Gill Sans"/>
+            </a:endParaRPr>
+          </a:p>
+        </p:txBody>
+      </p:sp>
+      <p:sp>
+        <p:nvSpPr>
+          <p:cNvPr id="6" name="Isosceles Triangle 5"/>
+          <p:cNvSpPr/>
+          <p:nvPr/>
+        </p:nvSpPr>
+        <p:spPr>
+          <a:xfrm>
+            <a:off x="2082107" y="2860063"/>
+            <a:ext cx="512583" cy="372445"/>
+          </a:xfrm>
+          <a:prstGeom prst="triangle">
+            <a:avLst/>
+          </a:prstGeom>
+          <a:solidFill>
+            <a:schemeClr val="tx1">
+              <a:lumMod val="50000"/>
+              <a:lumOff val="50000"/>
+            </a:schemeClr>
+          </a:solidFill>
+          <a:ln>
+            <a:solidFill>
+              <a:srgbClr val="FFFFFF"/>
+            </a:solidFill>
+          </a:ln>
+          <a:effectLst/>
+        </p:spPr>
+        <p:style>
+          <a:lnRef idx="1">
+            <a:schemeClr val="accent1"/>
+          </a:lnRef>
+          <a:fillRef idx="3">
+            <a:schemeClr val="accent1"/>
+          </a:fillRef>
+          <a:effectRef idx="2">
+            <a:schemeClr val="accent1"/>
+          </a:effectRef>
+          <a:fontRef idx="minor">
+            <a:schemeClr val="lt1"/>
+          </a:fontRef>
+        </p:style>
+        <p:txBody>
+          <a:bodyPr rtlCol="0" anchor="ctr"/>
+          <a:lstStyle/>
+          <a:p>
+            <a:pPr algn="ctr"/>
+            <a:endParaRPr lang="en-US" sz="2000">
+              <a:latin typeface="Gill Sans"/>
+              <a:cs typeface="Gill Sans"/>
+            </a:endParaRPr>
+          </a:p>
+        </p:txBody>
+      </p:sp>
+      <p:sp>
+        <p:nvSpPr>
+          <p:cNvPr id="7" name="Regular Pentagon 6"/>
+          <p:cNvSpPr/>
+          <p:nvPr/>
+        </p:nvSpPr>
+        <p:spPr>
+          <a:xfrm>
+            <a:off x="2096415" y="3450422"/>
+            <a:ext cx="484377" cy="445973"/>
+          </a:xfrm>
+          <a:prstGeom prst="pentagon">
+            <a:avLst/>
+          </a:prstGeom>
+          <a:solidFill>
+            <a:schemeClr val="tx1">
+              <a:lumMod val="50000"/>
+              <a:lumOff val="50000"/>
+            </a:schemeClr>
+          </a:solidFill>
+          <a:ln>
+            <a:solidFill>
+              <a:srgbClr val="FFFFFF"/>
+            </a:solidFill>
+          </a:ln>
+          <a:effectLst/>
+        </p:spPr>
+        <p:style>
+          <a:lnRef idx="1">
+            <a:schemeClr val="accent1"/>
+          </a:lnRef>
+          <a:fillRef idx="3">
+            <a:schemeClr val="accent1"/>
+          </a:fillRef>
+          <a:effectRef idx="2">
+            <a:schemeClr val="accent1"/>
+          </a:effectRef>
+          <a:fontRef idx="minor">
+            <a:schemeClr val="lt1"/>
+          </a:fontRef>
+        </p:style>
+        <p:txBody>
+          <a:bodyPr rtlCol="0" anchor="ctr"/>
+          <a:lstStyle/>
+          <a:p>
+            <a:pPr algn="ctr"/>
+            <a:endParaRPr lang="en-US" sz="2000">
+              <a:latin typeface="Gill Sans"/>
+              <a:cs typeface="Gill Sans"/>
+            </a:endParaRPr>
+          </a:p>
+        </p:txBody>
+      </p:sp>
+      <p:pic>
+        <p:nvPicPr>
+          <p:cNvPr id="10" name="Picture 9"/>
+          <p:cNvPicPr>
+            <a:picLocks noChangeAspect="1"/>
+          </p:cNvPicPr>
+          <p:nvPr/>
+        </p:nvPicPr>
+        <p:blipFill rotWithShape="1">
+          <a:blip r:embed="rId2"/>
+          <a:srcRect b="17662"/>
+          <a:stretch/>
+        </p:blipFill>
+        <p:spPr>
+          <a:xfrm>
+            <a:off x="2060683" y="5559322"/>
+            <a:ext cx="555841" cy="533947"/>
+          </a:xfrm>
+          <a:prstGeom prst="rect">
+            <a:avLst/>
+          </a:prstGeom>
+        </p:spPr>
+      </p:pic>
+      <p:pic>
+        <p:nvPicPr>
+          <p:cNvPr id="11" name="Picture 10" descr="noun_1248_cc.png"/>
+          <p:cNvPicPr>
+            <a:picLocks noChangeAspect="1"/>
+          </p:cNvPicPr>
+          <p:nvPr/>
+        </p:nvPicPr>
+        <p:blipFill rotWithShape="1">
+          <a:blip r:embed="rId3">
+            <a:extLst>
+              <a:ext uri="{28A0092B-C50C-407E-A947-70E740481C1C}">
+                <a14:useLocalDpi xmlns:a14="http://schemas.microsoft.com/office/drawing/2010/main" val="0"/>
+              </a:ext>
+            </a:extLst>
+          </a:blip>
+          <a:srcRect t="6796" b="21682"/>
+          <a:stretch/>
+        </p:blipFill>
+        <p:spPr>
+          <a:xfrm>
+            <a:off x="2082131" y="5013983"/>
+            <a:ext cx="512944" cy="428016"/>
+          </a:xfrm>
+          <a:prstGeom prst="rect">
+            <a:avLst/>
+          </a:prstGeom>
+        </p:spPr>
+      </p:pic>
+      <p:pic>
+        <p:nvPicPr>
+          <p:cNvPr id="12" name="Picture 11" descr="noun_5393.png"/>
+          <p:cNvPicPr>
+            <a:picLocks noChangeAspect="1"/>
+          </p:cNvPicPr>
+          <p:nvPr/>
+        </p:nvPicPr>
+        <p:blipFill>
+          <a:blip r:embed="rId4">
+            <a:extLst>
+              <a:ext uri="{28A0092B-C50C-407E-A947-70E740481C1C}">
+                <a14:useLocalDpi xmlns:a14="http://schemas.microsoft.com/office/drawing/2010/main" val="0"/>
+              </a:ext>
+            </a:extLst>
+          </a:blip>
+          <a:stretch>
+            <a:fillRect/>
+          </a:stretch>
+        </p:blipFill>
+        <p:spPr>
+          <a:xfrm>
+            <a:off x="2073321" y="4438923"/>
+            <a:ext cx="530564" cy="530564"/>
+          </a:xfrm>
+          <a:prstGeom prst="rect">
+            <a:avLst/>
+          </a:prstGeom>
+        </p:spPr>
+      </p:pic>
+      <p:sp>
+        <p:nvSpPr>
+          <p:cNvPr id="16" name="TextBox 15"/>
+          <p:cNvSpPr txBox="1"/>
+          <p:nvPr/>
+        </p:nvSpPr>
+        <p:spPr>
+          <a:xfrm>
+            <a:off x="2635219" y="2295611"/>
+            <a:ext cx="1258699" cy="400110"/>
+          </a:xfrm>
+          <a:prstGeom prst="rect">
+            <a:avLst/>
+          </a:prstGeom>
+          <a:noFill/>
+        </p:spPr>
+        <p:txBody>
+          <a:bodyPr wrap="square" rtlCol="0">
+            <a:spAutoFit/>
+          </a:bodyPr>
+          <a:lstStyle/>
+          <a:p>
+            <a:r>
+              <a:rPr lang="en-US" sz="2000" dirty="0" smtClean="0">
+                <a:latin typeface="Gill Sans"/>
+                <a:cs typeface="Gill Sans"/>
+              </a:rPr>
+              <a:t>Sampling</a:t>
+            </a:r>
+            <a:endParaRPr lang="en-US" sz="2000" dirty="0">
+              <a:latin typeface="Gill Sans"/>
+              <a:cs typeface="Gill Sans"/>
+            </a:endParaRPr>
+          </a:p>
+        </p:txBody>
+      </p:sp>
+      <p:sp>
+        <p:nvSpPr>
+          <p:cNvPr id="17" name="TextBox 16"/>
+          <p:cNvSpPr txBox="1"/>
+          <p:nvPr/>
+        </p:nvSpPr>
+        <p:spPr>
+          <a:xfrm>
+            <a:off x="2635219" y="2888125"/>
+            <a:ext cx="1689734" cy="400110"/>
+          </a:xfrm>
+          <a:prstGeom prst="rect">
+            <a:avLst/>
+          </a:prstGeom>
+          <a:noFill/>
+        </p:spPr>
+        <p:txBody>
+          <a:bodyPr wrap="square" rtlCol="0">
+            <a:spAutoFit/>
+          </a:bodyPr>
+          <a:lstStyle/>
+          <a:p>
+            <a:r>
+              <a:rPr lang="en-US" sz="2000" dirty="0" smtClean="0">
+                <a:latin typeface="Gill Sans"/>
+                <a:cs typeface="Gill Sans"/>
+              </a:rPr>
+              <a:t>Similarity Join</a:t>
+            </a:r>
+            <a:endParaRPr lang="en-US" sz="2000" dirty="0">
+              <a:latin typeface="Gill Sans"/>
+              <a:cs typeface="Gill Sans"/>
+            </a:endParaRPr>
+          </a:p>
+        </p:txBody>
+      </p:sp>
+      <p:sp>
+        <p:nvSpPr>
+          <p:cNvPr id="18" name="TextBox 17"/>
+          <p:cNvSpPr txBox="1"/>
+          <p:nvPr/>
+        </p:nvSpPr>
+        <p:spPr>
+          <a:xfrm>
+            <a:off x="2635219" y="3439487"/>
+            <a:ext cx="1258699" cy="400110"/>
+          </a:xfrm>
+          <a:prstGeom prst="rect">
+            <a:avLst/>
+          </a:prstGeom>
+          <a:noFill/>
+        </p:spPr>
+        <p:txBody>
+          <a:bodyPr wrap="square" rtlCol="0">
+            <a:spAutoFit/>
+          </a:bodyPr>
+          <a:lstStyle/>
+          <a:p>
+            <a:r>
+              <a:rPr lang="en-US" sz="2000" dirty="0" smtClean="0">
+                <a:latin typeface="Gill Sans"/>
+                <a:cs typeface="Gill Sans"/>
+              </a:rPr>
+              <a:t>Filtering</a:t>
+            </a:r>
+            <a:endParaRPr lang="en-US" sz="2000" dirty="0">
+              <a:latin typeface="Gill Sans"/>
+              <a:cs typeface="Gill Sans"/>
+            </a:endParaRPr>
+          </a:p>
+        </p:txBody>
+      </p:sp>
+      <p:sp>
+        <p:nvSpPr>
+          <p:cNvPr id="19" name="TextBox 18"/>
+          <p:cNvSpPr txBox="1"/>
+          <p:nvPr/>
+        </p:nvSpPr>
+        <p:spPr>
+          <a:xfrm>
+            <a:off x="2635219" y="4449531"/>
+            <a:ext cx="1450847" cy="400110"/>
+          </a:xfrm>
+          <a:prstGeom prst="rect">
+            <a:avLst/>
+          </a:prstGeom>
+          <a:noFill/>
+        </p:spPr>
+        <p:txBody>
+          <a:bodyPr wrap="square" rtlCol="0">
+            <a:spAutoFit/>
+          </a:bodyPr>
+          <a:lstStyle/>
+          <a:p>
+            <a:r>
+              <a:rPr lang="en-US" sz="2000" dirty="0" smtClean="0">
+                <a:latin typeface="Gill Sans"/>
+                <a:cs typeface="Gill Sans"/>
+              </a:rPr>
+              <a:t>Rule-based</a:t>
+            </a:r>
+            <a:endParaRPr lang="en-US" sz="2000" dirty="0">
+              <a:latin typeface="Gill Sans"/>
+              <a:cs typeface="Gill Sans"/>
+            </a:endParaRPr>
+          </a:p>
+        </p:txBody>
+      </p:sp>
+      <p:sp>
+        <p:nvSpPr>
+          <p:cNvPr id="20" name="TextBox 19"/>
+          <p:cNvSpPr txBox="1"/>
+          <p:nvPr/>
+        </p:nvSpPr>
+        <p:spPr>
+          <a:xfrm>
+            <a:off x="2635219" y="5041889"/>
+            <a:ext cx="1792486" cy="400110"/>
+          </a:xfrm>
+          <a:prstGeom prst="rect">
+            <a:avLst/>
+          </a:prstGeom>
+          <a:noFill/>
+        </p:spPr>
+        <p:txBody>
+          <a:bodyPr wrap="square" rtlCol="0">
+            <a:spAutoFit/>
+          </a:bodyPr>
+          <a:lstStyle/>
+          <a:p>
+            <a:r>
+              <a:rPr lang="en-US" sz="2000" dirty="0" smtClean="0">
+                <a:latin typeface="Gill Sans"/>
+                <a:cs typeface="Gill Sans"/>
+              </a:rPr>
+              <a:t>Learning-based</a:t>
+            </a:r>
+            <a:endParaRPr lang="en-US" sz="2000" dirty="0">
+              <a:latin typeface="Gill Sans"/>
+              <a:cs typeface="Gill Sans"/>
+            </a:endParaRPr>
+          </a:p>
+        </p:txBody>
+      </p:sp>
+      <p:sp>
+        <p:nvSpPr>
+          <p:cNvPr id="21" name="TextBox 20"/>
+          <p:cNvSpPr txBox="1"/>
+          <p:nvPr/>
+        </p:nvSpPr>
+        <p:spPr>
+          <a:xfrm>
+            <a:off x="2635219" y="5629294"/>
+            <a:ext cx="1792486" cy="400110"/>
+          </a:xfrm>
+          <a:prstGeom prst="rect">
+            <a:avLst/>
+          </a:prstGeom>
+          <a:noFill/>
+        </p:spPr>
+        <p:txBody>
+          <a:bodyPr wrap="square" rtlCol="0">
+            <a:spAutoFit/>
+          </a:bodyPr>
+          <a:lstStyle/>
+          <a:p>
+            <a:r>
+              <a:rPr lang="en-US" sz="2000" dirty="0" smtClean="0">
+                <a:latin typeface="Gill Sans"/>
+                <a:cs typeface="Gill Sans"/>
+              </a:rPr>
+              <a:t>Crowd-based</a:t>
+            </a:r>
+            <a:endParaRPr lang="en-US" sz="2000" dirty="0">
+              <a:latin typeface="Gill Sans"/>
+              <a:cs typeface="Gill Sans"/>
+            </a:endParaRPr>
+          </a:p>
+        </p:txBody>
+      </p:sp>
+      <p:sp>
+        <p:nvSpPr>
+          <p:cNvPr id="23" name="TextBox 22"/>
+          <p:cNvSpPr txBox="1"/>
+          <p:nvPr/>
+        </p:nvSpPr>
+        <p:spPr>
+          <a:xfrm>
+            <a:off x="2025767" y="1861592"/>
+            <a:ext cx="2060299" cy="415498"/>
+          </a:xfrm>
+          <a:prstGeom prst="rect">
+            <a:avLst/>
+          </a:prstGeom>
+          <a:noFill/>
+        </p:spPr>
+        <p:txBody>
+          <a:bodyPr wrap="square" rtlCol="0">
+            <a:spAutoFit/>
+          </a:bodyPr>
+          <a:lstStyle/>
+          <a:p>
+            <a:r>
+              <a:rPr lang="en-US" sz="2100" dirty="0" smtClean="0">
+                <a:latin typeface="Gill Sans"/>
+                <a:cs typeface="Gill Sans"/>
+              </a:rPr>
+              <a:t>Operators</a:t>
+            </a:r>
+            <a:endParaRPr lang="en-US" sz="2100" dirty="0">
+              <a:latin typeface="Gill Sans"/>
+              <a:cs typeface="Gill Sans"/>
+            </a:endParaRPr>
+          </a:p>
+        </p:txBody>
+      </p:sp>
+      <p:sp>
+        <p:nvSpPr>
+          <p:cNvPr id="24" name="TextBox 23"/>
+          <p:cNvSpPr txBox="1"/>
+          <p:nvPr/>
+        </p:nvSpPr>
+        <p:spPr>
+          <a:xfrm>
+            <a:off x="2025767" y="3994309"/>
+            <a:ext cx="2310886" cy="415498"/>
+          </a:xfrm>
+          <a:prstGeom prst="rect">
+            <a:avLst/>
+          </a:prstGeom>
+          <a:noFill/>
+        </p:spPr>
+        <p:txBody>
+          <a:bodyPr wrap="square" rtlCol="0">
+            <a:spAutoFit/>
+          </a:bodyPr>
+          <a:lstStyle/>
+          <a:p>
+            <a:r>
+              <a:rPr lang="en-US" sz="2100" dirty="0" smtClean="0">
+                <a:latin typeface="Gill Sans"/>
+                <a:cs typeface="Gill Sans"/>
+              </a:rPr>
+              <a:t>Implementations</a:t>
+            </a:r>
+            <a:endParaRPr lang="en-US" sz="2100" dirty="0">
+              <a:latin typeface="Gill Sans"/>
+              <a:cs typeface="Gill Sans"/>
+            </a:endParaRPr>
+          </a:p>
+        </p:txBody>
+      </p:sp>
     </p:spTree>
     <p:extLst>
       <p:ext uri="{BB962C8B-B14F-4D97-AF65-F5344CB8AC3E}">

</xml_diff>

<commit_message>
fixed up demo figs
</commit_message>
<xml_diff>
--- a/figs/figs.pptx
+++ b/figs/figs.pptx
@@ -7600,7 +7600,7 @@
         </p:blipFill>
         <p:spPr>
           <a:xfrm>
-            <a:off x="7021285" y="5641312"/>
+            <a:off x="7021285" y="5681952"/>
             <a:ext cx="555841" cy="533947"/>
           </a:xfrm>
           <a:prstGeom prst="rect">
@@ -7629,7 +7629,7 @@
         </p:blipFill>
         <p:spPr>
           <a:xfrm>
-            <a:off x="7042733" y="5187413"/>
+            <a:off x="7042733" y="5228053"/>
             <a:ext cx="512944" cy="428016"/>
           </a:xfrm>
           <a:prstGeom prst="rect">
@@ -7659,7 +7659,7 @@
         </p:blipFill>
         <p:spPr>
           <a:xfrm>
-            <a:off x="7033923" y="4642833"/>
+            <a:off x="7033923" y="4683473"/>
             <a:ext cx="530564" cy="530564"/>
           </a:xfrm>
           <a:prstGeom prst="rect">
@@ -7783,7 +7783,7 @@
         </p:nvSpPr>
         <p:spPr>
           <a:xfrm>
-            <a:off x="7595821" y="4694081"/>
+            <a:off x="7595821" y="4734721"/>
             <a:ext cx="1450847" cy="369332"/>
           </a:xfrm>
           <a:prstGeom prst="rect">
@@ -7819,7 +7819,7 @@
         </p:nvSpPr>
         <p:spPr>
           <a:xfrm>
-            <a:off x="7595821" y="5215319"/>
+            <a:off x="7595821" y="5255959"/>
             <a:ext cx="1792486" cy="369332"/>
           </a:xfrm>
           <a:prstGeom prst="rect">
@@ -7855,7 +7855,7 @@
         </p:nvSpPr>
         <p:spPr>
           <a:xfrm>
-            <a:off x="7595821" y="5731604"/>
+            <a:off x="7595821" y="5772244"/>
             <a:ext cx="1792486" cy="369332"/>
           </a:xfrm>
           <a:prstGeom prst="rect">
@@ -7927,7 +7927,7 @@
         </p:nvSpPr>
         <p:spPr>
           <a:xfrm>
-            <a:off x="6986369" y="4238859"/>
+            <a:off x="6986369" y="4279499"/>
             <a:ext cx="2149605" cy="415498"/>
           </a:xfrm>
           <a:prstGeom prst="rect">
@@ -7952,6 +7952,83 @@
               <a:latin typeface="Gill Sans"/>
               <a:cs typeface="Gill Sans"/>
             </a:endParaRPr>
+          </a:p>
+        </p:txBody>
+      </p:sp>
+      <p:sp>
+        <p:nvSpPr>
+          <p:cNvPr id="3" name="Oval 2"/>
+          <p:cNvSpPr/>
+          <p:nvPr/>
+        </p:nvSpPr>
+        <p:spPr>
+          <a:xfrm>
+            <a:off x="7113853" y="3606800"/>
+            <a:ext cx="394387" cy="394387"/>
+          </a:xfrm>
+          <a:prstGeom prst="ellipse">
+            <a:avLst/>
+          </a:prstGeom>
+          <a:solidFill>
+            <a:schemeClr val="bg1">
+              <a:lumMod val="50000"/>
+            </a:schemeClr>
+          </a:solidFill>
+          <a:ln>
+            <a:noFill/>
+          </a:ln>
+          <a:effectLst/>
+        </p:spPr>
+        <p:style>
+          <a:lnRef idx="1">
+            <a:schemeClr val="accent1"/>
+          </a:lnRef>
+          <a:fillRef idx="3">
+            <a:schemeClr val="accent1"/>
+          </a:fillRef>
+          <a:effectRef idx="2">
+            <a:schemeClr val="accent1"/>
+          </a:effectRef>
+          <a:fontRef idx="minor">
+            <a:schemeClr val="lt1"/>
+          </a:fontRef>
+        </p:style>
+        <p:txBody>
+          <a:bodyPr rtlCol="0" anchor="ctr"/>
+          <a:lstStyle/>
+          <a:p>
+            <a:pPr algn="ctr"/>
+            <a:endParaRPr lang="en-US"/>
+          </a:p>
+        </p:txBody>
+      </p:sp>
+      <p:sp>
+        <p:nvSpPr>
+          <p:cNvPr id="6" name="TextBox 5"/>
+          <p:cNvSpPr txBox="1"/>
+          <p:nvPr/>
+        </p:nvSpPr>
+        <p:spPr>
+          <a:xfrm>
+            <a:off x="7595821" y="3606800"/>
+            <a:ext cx="1134934" cy="369332"/>
+          </a:xfrm>
+          <a:prstGeom prst="rect">
+            <a:avLst/>
+          </a:prstGeom>
+          <a:noFill/>
+        </p:spPr>
+        <p:txBody>
+          <a:bodyPr wrap="none" rtlCol="0">
+            <a:spAutoFit/>
+          </a:bodyPr>
+          <a:lstStyle/>
+          <a:p>
+            <a:r>
+              <a:rPr lang="en-US" dirty="0" smtClean="0"/>
+              <a:t>Extraction</a:t>
+            </a:r>
+            <a:endParaRPr lang="en-US" dirty="0"/>
           </a:p>
         </p:txBody>
       </p:sp>

</xml_diff>

<commit_message>
added user to p1 example
</commit_message>
<xml_diff>
--- a/figs/figs.pptx
+++ b/figs/figs.pptx
@@ -8078,7 +8078,7 @@
         </p:nvCxnSpPr>
         <p:spPr>
           <a:xfrm flipV="1">
-            <a:off x="1869440" y="2814510"/>
+            <a:off x="2654607" y="4883863"/>
             <a:ext cx="5069840" cy="5778"/>
           </a:xfrm>
           <a:prstGeom prst="straightConnector1">
@@ -8111,222 +8111,6 @@
           </a:fontRef>
         </p:style>
       </p:cxnSp>
-      <p:cxnSp>
-        <p:nvCxnSpPr>
-          <p:cNvPr id="4" name="Straight Arrow Connector 3"/>
-          <p:cNvCxnSpPr/>
-          <p:nvPr/>
-        </p:nvCxnSpPr>
-        <p:spPr>
-          <a:xfrm>
-            <a:off x="1141095" y="4931983"/>
-            <a:ext cx="4329978" cy="2131"/>
-          </a:xfrm>
-          <a:prstGeom prst="straightConnector1">
-            <a:avLst/>
-          </a:prstGeom>
-          <a:solidFill>
-            <a:srgbClr val="D5B9C5"/>
-          </a:solidFill>
-          <a:ln w="28575" cmpd="sng">
-            <a:solidFill>
-              <a:srgbClr val="F80068"/>
-            </a:solidFill>
-            <a:headEnd type="none"/>
-            <a:tailEnd type="arrow"/>
-          </a:ln>
-          <a:effectLst/>
-        </p:spPr>
-        <p:style>
-          <a:lnRef idx="2">
-            <a:schemeClr val="accent1"/>
-          </a:lnRef>
-          <a:fillRef idx="0">
-            <a:schemeClr val="accent1"/>
-          </a:fillRef>
-          <a:effectRef idx="1">
-            <a:schemeClr val="accent1"/>
-          </a:effectRef>
-          <a:fontRef idx="minor">
-            <a:schemeClr val="tx1"/>
-          </a:fontRef>
-        </p:style>
-      </p:cxnSp>
-      <p:sp>
-        <p:nvSpPr>
-          <p:cNvPr id="5" name="Regular Pentagon 4"/>
-          <p:cNvSpPr/>
-          <p:nvPr/>
-        </p:nvSpPr>
-        <p:spPr>
-          <a:xfrm>
-            <a:off x="5144570" y="4582809"/>
-            <a:ext cx="766317" cy="746839"/>
-          </a:xfrm>
-          <a:prstGeom prst="pentagon">
-            <a:avLst/>
-          </a:prstGeom>
-          <a:solidFill>
-            <a:srgbClr val="FC265C"/>
-          </a:solidFill>
-          <a:ln>
-            <a:noFill/>
-          </a:ln>
-          <a:effectLst/>
-        </p:spPr>
-        <p:style>
-          <a:lnRef idx="1">
-            <a:schemeClr val="accent1"/>
-          </a:lnRef>
-          <a:fillRef idx="3">
-            <a:schemeClr val="accent1"/>
-          </a:fillRef>
-          <a:effectRef idx="2">
-            <a:schemeClr val="accent1"/>
-          </a:effectRef>
-          <a:fontRef idx="minor">
-            <a:schemeClr val="lt1"/>
-          </a:fontRef>
-        </p:style>
-        <p:txBody>
-          <a:bodyPr rtlCol="0" anchor="ctr"/>
-          <a:lstStyle/>
-          <a:p>
-            <a:pPr algn="ctr"/>
-            <a:endParaRPr lang="en-US" sz="1600">
-              <a:latin typeface="Gill Sans"/>
-              <a:cs typeface="Gill Sans"/>
-            </a:endParaRPr>
-          </a:p>
-        </p:txBody>
-      </p:sp>
-      <p:pic>
-        <p:nvPicPr>
-          <p:cNvPr id="6" name="Picture 5"/>
-          <p:cNvPicPr>
-            <a:picLocks noChangeAspect="1"/>
-          </p:cNvPicPr>
-          <p:nvPr/>
-        </p:nvPicPr>
-        <p:blipFill rotWithShape="1">
-          <a:blip r:embed="rId2">
-            <a:duotone>
-              <a:prstClr val="black"/>
-              <a:srgbClr val="FEFDFF">
-                <a:tint val="45000"/>
-                <a:satMod val="400000"/>
-              </a:srgbClr>
-            </a:duotone>
-          </a:blip>
-          <a:srcRect b="17662"/>
-          <a:stretch/>
-        </p:blipFill>
-        <p:spPr>
-          <a:xfrm>
-            <a:off x="5284693" y="4984914"/>
-            <a:ext cx="372759" cy="352662"/>
-          </a:xfrm>
-          <a:prstGeom prst="rect">
-            <a:avLst/>
-          </a:prstGeom>
-          <a:noFill/>
-          <a:ln>
-            <a:noFill/>
-          </a:ln>
-        </p:spPr>
-      </p:pic>
-      <p:sp>
-        <p:nvSpPr>
-          <p:cNvPr id="9" name="Rectangle 8"/>
-          <p:cNvSpPr/>
-          <p:nvPr/>
-        </p:nvSpPr>
-        <p:spPr>
-          <a:xfrm>
-            <a:off x="384071" y="4631970"/>
-            <a:ext cx="757024" cy="701625"/>
-          </a:xfrm>
-          <a:prstGeom prst="rect">
-            <a:avLst/>
-          </a:prstGeom>
-          <a:solidFill>
-            <a:srgbClr val="FC265C"/>
-          </a:solidFill>
-          <a:ln>
-            <a:noFill/>
-          </a:ln>
-          <a:effectLst/>
-        </p:spPr>
-        <p:style>
-          <a:lnRef idx="1">
-            <a:schemeClr val="accent1"/>
-          </a:lnRef>
-          <a:fillRef idx="3">
-            <a:schemeClr val="accent1"/>
-          </a:fillRef>
-          <a:effectRef idx="2">
-            <a:schemeClr val="accent1"/>
-          </a:effectRef>
-          <a:fontRef idx="minor">
-            <a:schemeClr val="lt1"/>
-          </a:fontRef>
-        </p:style>
-        <p:txBody>
-          <a:bodyPr rtlCol="0" anchor="ctr"/>
-          <a:lstStyle/>
-          <a:p>
-            <a:pPr algn="ctr"/>
-            <a:endParaRPr lang="en-US" dirty="0">
-              <a:solidFill>
-                <a:schemeClr val="tx1"/>
-              </a:solidFill>
-              <a:latin typeface="Gill Sans"/>
-              <a:cs typeface="Gill Sans"/>
-            </a:endParaRPr>
-          </a:p>
-        </p:txBody>
-      </p:sp>
-      <p:pic>
-        <p:nvPicPr>
-          <p:cNvPr id="10" name="Picture 9" descr="noun_5393.png"/>
-          <p:cNvPicPr>
-            <a:picLocks noChangeAspect="1"/>
-          </p:cNvPicPr>
-          <p:nvPr/>
-        </p:nvPicPr>
-        <p:blipFill>
-          <a:blip r:embed="rId3">
-            <a:duotone>
-              <a:prstClr val="black"/>
-              <a:srgbClr val="FEFDFF">
-                <a:tint val="45000"/>
-                <a:satMod val="400000"/>
-              </a:srgbClr>
-            </a:duotone>
-            <a:extLst>
-              <a:ext uri="{28A0092B-C50C-407E-A947-70E740481C1C}">
-                <a14:useLocalDpi xmlns:a14="http://schemas.microsoft.com/office/drawing/2010/main" val="0"/>
-              </a:ext>
-            </a:extLst>
-          </a:blip>
-          <a:stretch>
-            <a:fillRect/>
-          </a:stretch>
-        </p:blipFill>
-        <p:spPr>
-          <a:xfrm>
-            <a:off x="382808" y="4974428"/>
-            <a:ext cx="364189" cy="386820"/>
-          </a:xfrm>
-          <a:prstGeom prst="rect">
-            <a:avLst/>
-          </a:prstGeom>
-          <a:noFill/>
-          <a:ln>
-            <a:noFill/>
-          </a:ln>
-        </p:spPr>
-      </p:pic>
       <p:grpSp>
         <p:nvGrpSpPr>
           <p:cNvPr id="36" name="Group 35"/>
@@ -8335,7 +8119,7 @@
         </p:nvGrpSpPr>
         <p:grpSpPr>
           <a:xfrm>
-            <a:off x="2283432" y="2448775"/>
+            <a:off x="3068599" y="4518128"/>
             <a:ext cx="2339703" cy="1233446"/>
             <a:chOff x="2336800" y="2448775"/>
             <a:chExt cx="2339703" cy="1233446"/>
@@ -8409,7 +8193,7 @@
               <p:nvPr/>
             </p:nvPicPr>
             <p:blipFill>
-              <a:blip r:embed="rId3">
+              <a:blip r:embed="rId2">
                 <a:duotone>
                   <a:prstClr val="black"/>
                   <a:srgbClr val="FEFDFF">
@@ -8501,7 +8285,7 @@
         </p:nvGrpSpPr>
         <p:grpSpPr>
           <a:xfrm>
-            <a:off x="5189527" y="2349920"/>
+            <a:off x="5974694" y="4419273"/>
             <a:ext cx="1305127" cy="1332301"/>
             <a:chOff x="5189527" y="2349920"/>
             <a:chExt cx="1305127" cy="1332301"/>
@@ -8564,7 +8348,7 @@
             <p:nvPr/>
           </p:nvPicPr>
           <p:blipFill rotWithShape="1">
-            <a:blip r:embed="rId4">
+            <a:blip r:embed="rId3">
               <a:duotone>
                 <a:prstClr val="black"/>
                 <a:srgbClr val="FEFDFF">
@@ -8640,7 +8424,7 @@
         </p:nvGrpSpPr>
         <p:grpSpPr>
           <a:xfrm>
-            <a:off x="516151" y="2198354"/>
+            <a:off x="1301318" y="4267707"/>
             <a:ext cx="1200889" cy="1622367"/>
             <a:chOff x="516151" y="2198354"/>
             <a:chExt cx="1200889" cy="1622367"/>
@@ -8655,7 +8439,7 @@
             <p:nvPr/>
           </p:nvPicPr>
           <p:blipFill>
-            <a:blip r:embed="rId5"/>
+            <a:blip r:embed="rId4"/>
             <a:stretch>
               <a:fillRect/>
             </a:stretch>
@@ -8679,7 +8463,7 @@
             <p:nvPr/>
           </p:nvPicPr>
           <p:blipFill>
-            <a:blip r:embed="rId6"/>
+            <a:blip r:embed="rId5"/>
             <a:stretch>
               <a:fillRect/>
             </a:stretch>
@@ -8742,6 +8526,354 @@
           </p:txBody>
         </p:sp>
       </p:grpSp>
+      <p:sp>
+        <p:nvSpPr>
+          <p:cNvPr id="38" name="TextBox 37"/>
+          <p:cNvSpPr txBox="1"/>
+          <p:nvPr/>
+        </p:nvSpPr>
+        <p:spPr>
+          <a:xfrm rot="5400000">
+            <a:off x="4988711" y="4090925"/>
+            <a:ext cx="878002" cy="307777"/>
+          </a:xfrm>
+          <a:prstGeom prst="rect">
+            <a:avLst/>
+          </a:prstGeom>
+          <a:noFill/>
+        </p:spPr>
+        <p:txBody>
+          <a:bodyPr wrap="none" rtlCol="0">
+            <a:spAutoFit/>
+          </a:bodyPr>
+          <a:lstStyle/>
+          <a:p>
+            <a:r>
+              <a:rPr lang="en-US" sz="1400" dirty="0" smtClean="0"/>
+              <a:t>Feedback</a:t>
+            </a:r>
+            <a:endParaRPr lang="en-US" sz="1400" dirty="0"/>
+          </a:p>
+        </p:txBody>
+      </p:sp>
+      <p:grpSp>
+        <p:nvGrpSpPr>
+          <p:cNvPr id="39" name="Group 38"/>
+          <p:cNvGrpSpPr/>
+          <p:nvPr/>
+        </p:nvGrpSpPr>
+        <p:grpSpPr>
+          <a:xfrm>
+            <a:off x="4143052" y="1979480"/>
+            <a:ext cx="1130771" cy="1442048"/>
+            <a:chOff x="1426834" y="493180"/>
+            <a:chExt cx="1130771" cy="1442048"/>
+          </a:xfrm>
+        </p:grpSpPr>
+        <p:pic>
+          <p:nvPicPr>
+            <p:cNvPr id="40" name="Picture 39"/>
+            <p:cNvPicPr>
+              <a:picLocks noChangeAspect="1"/>
+            </p:cNvPicPr>
+            <p:nvPr/>
+          </p:nvPicPr>
+          <p:blipFill>
+            <a:blip r:embed="rId6">
+              <a:biLevel thresh="75000"/>
+            </a:blip>
+            <a:stretch>
+              <a:fillRect/>
+            </a:stretch>
+          </p:blipFill>
+          <p:spPr>
+            <a:xfrm>
+              <a:off x="1574800" y="901524"/>
+              <a:ext cx="826963" cy="1033704"/>
+            </a:xfrm>
+            <a:prstGeom prst="rect">
+              <a:avLst/>
+            </a:prstGeom>
+          </p:spPr>
+        </p:pic>
+        <p:sp>
+          <p:nvSpPr>
+            <p:cNvPr id="41" name="Rectangle 40"/>
+            <p:cNvSpPr/>
+            <p:nvPr/>
+          </p:nvSpPr>
+          <p:spPr>
+            <a:xfrm>
+              <a:off x="1426834" y="493180"/>
+              <a:ext cx="1130771" cy="591115"/>
+            </a:xfrm>
+            <a:prstGeom prst="rect">
+              <a:avLst/>
+            </a:prstGeom>
+            <a:noFill/>
+            <a:ln>
+              <a:noFill/>
+            </a:ln>
+            <a:effectLst/>
+          </p:spPr>
+          <p:style>
+            <a:lnRef idx="1">
+              <a:schemeClr val="accent1"/>
+            </a:lnRef>
+            <a:fillRef idx="3">
+              <a:schemeClr val="accent1"/>
+            </a:fillRef>
+            <a:effectRef idx="2">
+              <a:schemeClr val="accent1"/>
+            </a:effectRef>
+            <a:fontRef idx="minor">
+              <a:schemeClr val="lt1"/>
+            </a:fontRef>
+          </p:style>
+          <p:txBody>
+            <a:bodyPr rtlCol="0" anchor="ctr"/>
+            <a:lstStyle/>
+            <a:p>
+              <a:pPr algn="ctr"/>
+              <a:r>
+                <a:rPr lang="en-US" sz="1400" dirty="0" smtClean="0">
+                  <a:solidFill>
+                    <a:srgbClr val="000000"/>
+                  </a:solidFill>
+                  <a:latin typeface="Gill Sans"/>
+                  <a:cs typeface="Gill Sans"/>
+                </a:rPr>
+                <a:t>User</a:t>
+              </a:r>
+            </a:p>
+          </p:txBody>
+        </p:sp>
+      </p:grpSp>
+      <p:cxnSp>
+        <p:nvCxnSpPr>
+          <p:cNvPr id="43" name="Straight Arrow Connector 42"/>
+          <p:cNvCxnSpPr/>
+          <p:nvPr/>
+        </p:nvCxnSpPr>
+        <p:spPr>
+          <a:xfrm flipV="1">
+            <a:off x="5261290" y="3570941"/>
+            <a:ext cx="0" cy="1307331"/>
+          </a:xfrm>
+          <a:prstGeom prst="straightConnector1">
+            <a:avLst/>
+          </a:prstGeom>
+          <a:ln w="19050" cmpd="sng">
+            <a:solidFill>
+              <a:schemeClr val="tx1">
+                <a:lumMod val="50000"/>
+                <a:lumOff val="50000"/>
+              </a:schemeClr>
+            </a:solidFill>
+            <a:headEnd type="arrow"/>
+            <a:tailEnd type="arrow"/>
+          </a:ln>
+          <a:effectLst/>
+        </p:spPr>
+        <p:style>
+          <a:lnRef idx="2">
+            <a:schemeClr val="accent1"/>
+          </a:lnRef>
+          <a:fillRef idx="0">
+            <a:schemeClr val="accent1"/>
+          </a:fillRef>
+          <a:effectRef idx="1">
+            <a:schemeClr val="accent1"/>
+          </a:effectRef>
+          <a:fontRef idx="minor">
+            <a:schemeClr val="tx1"/>
+          </a:fontRef>
+        </p:style>
+      </p:cxnSp>
+      <p:sp>
+        <p:nvSpPr>
+          <p:cNvPr id="49" name="TextBox 48"/>
+          <p:cNvSpPr txBox="1"/>
+          <p:nvPr/>
+        </p:nvSpPr>
+        <p:spPr>
+          <a:xfrm rot="16200000">
+            <a:off x="4502826" y="4071469"/>
+            <a:ext cx="1181846" cy="307777"/>
+          </a:xfrm>
+          <a:prstGeom prst="rect">
+            <a:avLst/>
+          </a:prstGeom>
+          <a:noFill/>
+        </p:spPr>
+        <p:txBody>
+          <a:bodyPr wrap="none" rtlCol="0">
+            <a:spAutoFit/>
+          </a:bodyPr>
+          <a:lstStyle/>
+          <a:p>
+            <a:r>
+              <a:rPr lang="en-US" sz="1400" dirty="0" smtClean="0"/>
+              <a:t>Partial results</a:t>
+            </a:r>
+            <a:endParaRPr lang="en-US" sz="1400" dirty="0"/>
+          </a:p>
+        </p:txBody>
+      </p:sp>
+      <p:sp>
+        <p:nvSpPr>
+          <p:cNvPr id="54" name="TextBox 53"/>
+          <p:cNvSpPr txBox="1"/>
+          <p:nvPr/>
+        </p:nvSpPr>
+        <p:spPr>
+          <a:xfrm rot="5400000">
+            <a:off x="7061947" y="4090926"/>
+            <a:ext cx="878002" cy="307777"/>
+          </a:xfrm>
+          <a:prstGeom prst="rect">
+            <a:avLst/>
+          </a:prstGeom>
+          <a:noFill/>
+        </p:spPr>
+        <p:txBody>
+          <a:bodyPr wrap="none" rtlCol="0">
+            <a:spAutoFit/>
+          </a:bodyPr>
+          <a:lstStyle/>
+          <a:p>
+            <a:r>
+              <a:rPr lang="en-US" sz="1400" dirty="0" smtClean="0"/>
+              <a:t>Feedback</a:t>
+            </a:r>
+            <a:endParaRPr lang="en-US" sz="1400" dirty="0"/>
+          </a:p>
+        </p:txBody>
+      </p:sp>
+      <p:cxnSp>
+        <p:nvCxnSpPr>
+          <p:cNvPr id="55" name="Straight Arrow Connector 54"/>
+          <p:cNvCxnSpPr/>
+          <p:nvPr/>
+        </p:nvCxnSpPr>
+        <p:spPr>
+          <a:xfrm flipV="1">
+            <a:off x="7334526" y="3570942"/>
+            <a:ext cx="0" cy="1307331"/>
+          </a:xfrm>
+          <a:prstGeom prst="straightConnector1">
+            <a:avLst/>
+          </a:prstGeom>
+          <a:ln w="19050" cmpd="sng">
+            <a:solidFill>
+              <a:schemeClr val="tx1">
+                <a:lumMod val="50000"/>
+                <a:lumOff val="50000"/>
+              </a:schemeClr>
+            </a:solidFill>
+            <a:headEnd type="arrow"/>
+            <a:tailEnd type="arrow"/>
+          </a:ln>
+          <a:effectLst/>
+        </p:spPr>
+        <p:style>
+          <a:lnRef idx="2">
+            <a:schemeClr val="accent1"/>
+          </a:lnRef>
+          <a:fillRef idx="0">
+            <a:schemeClr val="accent1"/>
+          </a:fillRef>
+          <a:effectRef idx="1">
+            <a:schemeClr val="accent1"/>
+          </a:effectRef>
+          <a:fontRef idx="minor">
+            <a:schemeClr val="tx1"/>
+          </a:fontRef>
+        </p:style>
+      </p:cxnSp>
+      <p:sp>
+        <p:nvSpPr>
+          <p:cNvPr id="56" name="TextBox 55"/>
+          <p:cNvSpPr txBox="1"/>
+          <p:nvPr/>
+        </p:nvSpPr>
+        <p:spPr>
+          <a:xfrm rot="16200000">
+            <a:off x="6576062" y="4071470"/>
+            <a:ext cx="1181846" cy="307777"/>
+          </a:xfrm>
+          <a:prstGeom prst="rect">
+            <a:avLst/>
+          </a:prstGeom>
+          <a:noFill/>
+        </p:spPr>
+        <p:txBody>
+          <a:bodyPr wrap="none" rtlCol="0">
+            <a:spAutoFit/>
+          </a:bodyPr>
+          <a:lstStyle/>
+          <a:p>
+            <a:r>
+              <a:rPr lang="en-US" sz="1400" dirty="0" smtClean="0"/>
+              <a:t>Partial results</a:t>
+            </a:r>
+            <a:endParaRPr lang="en-US" sz="1400" dirty="0"/>
+          </a:p>
+        </p:txBody>
+      </p:sp>
+      <p:sp>
+        <p:nvSpPr>
+          <p:cNvPr id="57" name="Left Brace 56"/>
+          <p:cNvSpPr/>
+          <p:nvPr/>
+        </p:nvSpPr>
+        <p:spPr>
+          <a:xfrm rot="5400000">
+            <a:off x="4601193" y="376181"/>
+            <a:ext cx="138200" cy="6108307"/>
+          </a:xfrm>
+          <a:prstGeom prst="leftBrace">
+            <a:avLst>
+              <a:gd name="adj1" fmla="val 116874"/>
+              <a:gd name="adj2" fmla="val 49263"/>
+            </a:avLst>
+          </a:prstGeom>
+          <a:ln w="19050" cmpd="sng">
+            <a:solidFill>
+              <a:schemeClr val="tx1">
+                <a:lumMod val="50000"/>
+                <a:lumOff val="50000"/>
+              </a:schemeClr>
+            </a:solidFill>
+            <a:prstDash val="solid"/>
+            <a:headEnd type="none"/>
+            <a:tailEnd type="none"/>
+          </a:ln>
+          <a:effectLst/>
+        </p:spPr>
+        <p:style>
+          <a:lnRef idx="2">
+            <a:schemeClr val="accent1"/>
+          </a:lnRef>
+          <a:fillRef idx="0">
+            <a:schemeClr val="accent1"/>
+          </a:fillRef>
+          <a:effectRef idx="1">
+            <a:schemeClr val="accent1"/>
+          </a:effectRef>
+          <a:fontRef idx="minor">
+            <a:schemeClr val="tx1"/>
+          </a:fontRef>
+        </p:style>
+        <p:txBody>
+          <a:bodyPr rtlCol="0" anchor="ctr"/>
+          <a:lstStyle/>
+          <a:p>
+            <a:pPr algn="ctr"/>
+            <a:endParaRPr lang="en-US"/>
+          </a:p>
+        </p:txBody>
+      </p:sp>
     </p:spTree>
     <p:extLst>
       <p:ext uri="{BB962C8B-B14F-4D97-AF65-F5344CB8AC3E}">

</xml_diff>